<commit_message>
Slide e java quase atualizados
</commit_message>
<xml_diff>
--- a/Documentação/slide v2.1.pptx
+++ b/Documentação/slide v2.1.pptx
@@ -11,15 +11,16 @@
     <p:sldId id="301" r:id="rId5"/>
     <p:sldId id="299" r:id="rId6"/>
     <p:sldId id="291" r:id="rId7"/>
-    <p:sldId id="288" r:id="rId8"/>
-    <p:sldId id="309" r:id="rId9"/>
+    <p:sldId id="309" r:id="rId8"/>
+    <p:sldId id="288" r:id="rId9"/>
     <p:sldId id="306" r:id="rId10"/>
     <p:sldId id="284" r:id="rId11"/>
     <p:sldId id="285" r:id="rId12"/>
     <p:sldId id="307" r:id="rId13"/>
-    <p:sldId id="308" r:id="rId14"/>
-    <p:sldId id="292" r:id="rId15"/>
-    <p:sldId id="305" r:id="rId16"/>
+    <p:sldId id="310" r:id="rId14"/>
+    <p:sldId id="308" r:id="rId15"/>
+    <p:sldId id="292" r:id="rId16"/>
+    <p:sldId id="305" r:id="rId17"/>
   </p:sldIdLst>
   <p:sldSz cx="12192000" cy="6858000"/>
   <p:notesSz cx="6858000" cy="9144000"/>
@@ -274,7 +275,7 @@
           <a:p>
             <a:fld id="{F50B35C2-D55D-43EC-A9F9-87B33DB15AB7}" type="datetimeFigureOut">
               <a:rPr lang="pt-BR" smtClean="0"/>
-              <a:t>23/10/2020</a:t>
+              <a:t>26/10/2020</a:t>
             </a:fld>
             <a:endParaRPr lang="pt-BR"/>
           </a:p>
@@ -442,7 +443,7 @@
           <a:p>
             <a:fld id="{F50B35C2-D55D-43EC-A9F9-87B33DB15AB7}" type="datetimeFigureOut">
               <a:rPr lang="pt-BR" smtClean="0"/>
-              <a:t>23/10/2020</a:t>
+              <a:t>26/10/2020</a:t>
             </a:fld>
             <a:endParaRPr lang="pt-BR"/>
           </a:p>
@@ -620,7 +621,7 @@
           <a:p>
             <a:fld id="{F50B35C2-D55D-43EC-A9F9-87B33DB15AB7}" type="datetimeFigureOut">
               <a:rPr lang="pt-BR" smtClean="0"/>
-              <a:t>23/10/2020</a:t>
+              <a:t>26/10/2020</a:t>
             </a:fld>
             <a:endParaRPr lang="pt-BR"/>
           </a:p>
@@ -788,7 +789,7 @@
           <a:p>
             <a:fld id="{F50B35C2-D55D-43EC-A9F9-87B33DB15AB7}" type="datetimeFigureOut">
               <a:rPr lang="pt-BR" smtClean="0"/>
-              <a:t>23/10/2020</a:t>
+              <a:t>26/10/2020</a:t>
             </a:fld>
             <a:endParaRPr lang="pt-BR"/>
           </a:p>
@@ -1033,7 +1034,7 @@
           <a:p>
             <a:fld id="{F50B35C2-D55D-43EC-A9F9-87B33DB15AB7}" type="datetimeFigureOut">
               <a:rPr lang="pt-BR" smtClean="0"/>
-              <a:t>23/10/2020</a:t>
+              <a:t>26/10/2020</a:t>
             </a:fld>
             <a:endParaRPr lang="pt-BR"/>
           </a:p>
@@ -1262,7 +1263,7 @@
           <a:p>
             <a:fld id="{F50B35C2-D55D-43EC-A9F9-87B33DB15AB7}" type="datetimeFigureOut">
               <a:rPr lang="pt-BR" smtClean="0"/>
-              <a:t>23/10/2020</a:t>
+              <a:t>26/10/2020</a:t>
             </a:fld>
             <a:endParaRPr lang="pt-BR"/>
           </a:p>
@@ -1626,7 +1627,7 @@
           <a:p>
             <a:fld id="{F50B35C2-D55D-43EC-A9F9-87B33DB15AB7}" type="datetimeFigureOut">
               <a:rPr lang="pt-BR" smtClean="0"/>
-              <a:t>23/10/2020</a:t>
+              <a:t>26/10/2020</a:t>
             </a:fld>
             <a:endParaRPr lang="pt-BR"/>
           </a:p>
@@ -1743,7 +1744,7 @@
           <a:p>
             <a:fld id="{F50B35C2-D55D-43EC-A9F9-87B33DB15AB7}" type="datetimeFigureOut">
               <a:rPr lang="pt-BR" smtClean="0"/>
-              <a:t>23/10/2020</a:t>
+              <a:t>26/10/2020</a:t>
             </a:fld>
             <a:endParaRPr lang="pt-BR"/>
           </a:p>
@@ -1838,7 +1839,7 @@
           <a:p>
             <a:fld id="{F50B35C2-D55D-43EC-A9F9-87B33DB15AB7}" type="datetimeFigureOut">
               <a:rPr lang="pt-BR" smtClean="0"/>
-              <a:t>23/10/2020</a:t>
+              <a:t>26/10/2020</a:t>
             </a:fld>
             <a:endParaRPr lang="pt-BR"/>
           </a:p>
@@ -2113,7 +2114,7 @@
           <a:p>
             <a:fld id="{F50B35C2-D55D-43EC-A9F9-87B33DB15AB7}" type="datetimeFigureOut">
               <a:rPr lang="pt-BR" smtClean="0"/>
-              <a:t>23/10/2020</a:t>
+              <a:t>26/10/2020</a:t>
             </a:fld>
             <a:endParaRPr lang="pt-BR"/>
           </a:p>
@@ -2365,7 +2366,7 @@
           <a:p>
             <a:fld id="{F50B35C2-D55D-43EC-A9F9-87B33DB15AB7}" type="datetimeFigureOut">
               <a:rPr lang="pt-BR" smtClean="0"/>
-              <a:t>23/10/2020</a:t>
+              <a:t>26/10/2020</a:t>
             </a:fld>
             <a:endParaRPr lang="pt-BR"/>
           </a:p>
@@ -2576,7 +2577,7 @@
           <a:p>
             <a:fld id="{F50B35C2-D55D-43EC-A9F9-87B33DB15AB7}" type="datetimeFigureOut">
               <a:rPr lang="pt-BR" smtClean="0"/>
-              <a:t>23/10/2020</a:t>
+              <a:t>26/10/2020</a:t>
             </a:fld>
             <a:endParaRPr lang="pt-BR"/>
           </a:p>
@@ -2986,7 +2987,7 @@
           <p:cNvPr id="2" name="Rectangle: Rounded Corners 1">
             <a:extLst>
               <a:ext uri="{FF2B5EF4-FFF2-40B4-BE49-F238E27FC236}">
-                <a16:creationId xmlns:a16="http://schemas.microsoft.com/office/drawing/2014/main" id="{1678591B-5872-4D1A-943E-5BC3264C3CFB}"/>
+                <a16:creationId xmlns:a16="http://schemas.microsoft.com/office/drawing/2014/main" xmlns="" id="{1678591B-5872-4D1A-943E-5BC3264C3CFB}"/>
               </a:ext>
             </a:extLst>
           </p:cNvPr>
@@ -3040,7 +3041,7 @@
           <p:cNvPr id="2050" name="Picture 2">
             <a:extLst>
               <a:ext uri="{FF2B5EF4-FFF2-40B4-BE49-F238E27FC236}">
-                <a16:creationId xmlns:a16="http://schemas.microsoft.com/office/drawing/2014/main" id="{C727CAE5-80E2-41CE-B37E-BBFAE305DF84}"/>
+                <a16:creationId xmlns:a16="http://schemas.microsoft.com/office/drawing/2014/main" xmlns="" id="{C727CAE5-80E2-41CE-B37E-BBFAE305DF84}"/>
               </a:ext>
             </a:extLst>
           </p:cNvPr>
@@ -3087,7 +3088,7 @@
           <p:cNvPr id="4" name="Rectangle: Rounded Corners 3">
             <a:extLst>
               <a:ext uri="{FF2B5EF4-FFF2-40B4-BE49-F238E27FC236}">
-                <a16:creationId xmlns:a16="http://schemas.microsoft.com/office/drawing/2014/main" id="{C0D744C7-2B31-44CA-BA1F-D2700F2BF96D}"/>
+                <a16:creationId xmlns:a16="http://schemas.microsoft.com/office/drawing/2014/main" xmlns="" id="{C0D744C7-2B31-44CA-BA1F-D2700F2BF96D}"/>
               </a:ext>
             </a:extLst>
           </p:cNvPr>
@@ -3269,7 +3270,7 @@
           <p:cNvPr id="4" name="Straight Arrow Connector 3">
             <a:extLst>
               <a:ext uri="{FF2B5EF4-FFF2-40B4-BE49-F238E27FC236}">
-                <a16:creationId xmlns:a16="http://schemas.microsoft.com/office/drawing/2014/main" id="{2E47AAF4-0703-407A-9375-DE4A2497442E}"/>
+                <a16:creationId xmlns:a16="http://schemas.microsoft.com/office/drawing/2014/main" xmlns="" id="{2E47AAF4-0703-407A-9375-DE4A2497442E}"/>
               </a:ext>
             </a:extLst>
           </p:cNvPr>
@@ -3310,7 +3311,7 @@
           <p:cNvPr id="7" name="Título 1">
             <a:extLst>
               <a:ext uri="{FF2B5EF4-FFF2-40B4-BE49-F238E27FC236}">
-                <a16:creationId xmlns:a16="http://schemas.microsoft.com/office/drawing/2014/main" id="{99F76FBE-1BC2-4EE6-B90A-22263BF7BDCD}"/>
+                <a16:creationId xmlns:a16="http://schemas.microsoft.com/office/drawing/2014/main" xmlns="" id="{99F76FBE-1BC2-4EE6-B90A-22263BF7BDCD}"/>
               </a:ext>
             </a:extLst>
           </p:cNvPr>
@@ -3373,7 +3374,7 @@
           <p:cNvPr id="3" name="Picture 2">
             <a:extLst>
               <a:ext uri="{FF2B5EF4-FFF2-40B4-BE49-F238E27FC236}">
-                <a16:creationId xmlns:a16="http://schemas.microsoft.com/office/drawing/2014/main" id="{5C89B846-E8B4-41E5-A2FD-3C9F96F43158}"/>
+                <a16:creationId xmlns:a16="http://schemas.microsoft.com/office/drawing/2014/main" xmlns="" id="{5C89B846-E8B4-41E5-A2FD-3C9F96F43158}"/>
               </a:ext>
             </a:extLst>
           </p:cNvPr>
@@ -3420,7 +3421,7 @@
           <p:cNvPr id="5" name="Imagem 4" descr="Desenho de uma pessoa&#10;&#10;Descrição gerada automaticamente">
             <a:extLst>
               <a:ext uri="{FF2B5EF4-FFF2-40B4-BE49-F238E27FC236}">
-                <a16:creationId xmlns:a16="http://schemas.microsoft.com/office/drawing/2014/main" id="{65B6D792-5394-44C7-88F8-DC482A934804}"/>
+                <a16:creationId xmlns:a16="http://schemas.microsoft.com/office/drawing/2014/main" xmlns="" id="{65B6D792-5394-44C7-88F8-DC482A934804}"/>
               </a:ext>
             </a:extLst>
           </p:cNvPr>
@@ -3456,7 +3457,7 @@
           <p:cNvPr id="8" name="AutoShape 4">
             <a:extLst>
               <a:ext uri="{FF2B5EF4-FFF2-40B4-BE49-F238E27FC236}">
-                <a16:creationId xmlns:a16="http://schemas.microsoft.com/office/drawing/2014/main" id="{CBC49F37-024F-43BA-BF41-65835263DDCC}"/>
+                <a16:creationId xmlns:a16="http://schemas.microsoft.com/office/drawing/2014/main" xmlns="" id="{CBC49F37-024F-43BA-BF41-65835263DDCC}"/>
               </a:ext>
             </a:extLst>
           </p:cNvPr>
@@ -3501,7 +3502,7 @@
           <p:cNvPr id="10" name="Imagem 9" descr="Diagrama&#10;&#10;Descrição gerada automaticamente">
             <a:extLst>
               <a:ext uri="{FF2B5EF4-FFF2-40B4-BE49-F238E27FC236}">
-                <a16:creationId xmlns:a16="http://schemas.microsoft.com/office/drawing/2014/main" id="{EC31F9B0-BA3A-445B-901B-FC2332FEF663}"/>
+                <a16:creationId xmlns:a16="http://schemas.microsoft.com/office/drawing/2014/main" xmlns="" id="{EC31F9B0-BA3A-445B-901B-FC2332FEF663}"/>
               </a:ext>
             </a:extLst>
           </p:cNvPr>
@@ -3807,7 +3808,7 @@
           <p:cNvPr id="7" name="Título 1">
             <a:extLst>
               <a:ext uri="{FF2B5EF4-FFF2-40B4-BE49-F238E27FC236}">
-                <a16:creationId xmlns:a16="http://schemas.microsoft.com/office/drawing/2014/main" id="{99F76FBE-1BC2-4EE6-B90A-22263BF7BDCD}"/>
+                <a16:creationId xmlns:a16="http://schemas.microsoft.com/office/drawing/2014/main" xmlns="" id="{99F76FBE-1BC2-4EE6-B90A-22263BF7BDCD}"/>
               </a:ext>
             </a:extLst>
           </p:cNvPr>
@@ -3870,7 +3871,7 @@
           <p:cNvPr id="4" name="Picture 2">
             <a:extLst>
               <a:ext uri="{FF2B5EF4-FFF2-40B4-BE49-F238E27FC236}">
-                <a16:creationId xmlns:a16="http://schemas.microsoft.com/office/drawing/2014/main" id="{3CF36ED0-FCD8-45D8-A912-5D4DD5032DBE}"/>
+                <a16:creationId xmlns:a16="http://schemas.microsoft.com/office/drawing/2014/main" xmlns="" id="{3CF36ED0-FCD8-45D8-A912-5D4DD5032DBE}"/>
               </a:ext>
             </a:extLst>
           </p:cNvPr>
@@ -3917,7 +3918,7 @@
           <p:cNvPr id="2" name="Straight Arrow Connector 1">
             <a:extLst>
               <a:ext uri="{FF2B5EF4-FFF2-40B4-BE49-F238E27FC236}">
-                <a16:creationId xmlns:a16="http://schemas.microsoft.com/office/drawing/2014/main" id="{EF6676ED-9702-4820-B9D8-8B178C2BC9D8}"/>
+                <a16:creationId xmlns:a16="http://schemas.microsoft.com/office/drawing/2014/main" xmlns="" id="{EF6676ED-9702-4820-B9D8-8B178C2BC9D8}"/>
               </a:ext>
             </a:extLst>
           </p:cNvPr>
@@ -3958,7 +3959,7 @@
           <p:cNvPr id="19" name="Agrupar 18">
             <a:extLst>
               <a:ext uri="{FF2B5EF4-FFF2-40B4-BE49-F238E27FC236}">
-                <a16:creationId xmlns:a16="http://schemas.microsoft.com/office/drawing/2014/main" id="{84BF6789-3335-4920-AA85-D1861BE5B03E}"/>
+                <a16:creationId xmlns:a16="http://schemas.microsoft.com/office/drawing/2014/main" xmlns="" id="{84BF6789-3335-4920-AA85-D1861BE5B03E}"/>
               </a:ext>
             </a:extLst>
           </p:cNvPr>
@@ -3978,7 +3979,7 @@
             <p:cNvPr id="6" name="Google Shape;1752;p44">
               <a:extLst>
                 <a:ext uri="{FF2B5EF4-FFF2-40B4-BE49-F238E27FC236}">
-                  <a16:creationId xmlns:a16="http://schemas.microsoft.com/office/drawing/2014/main" id="{DB60E812-6938-4298-A78E-5CA545FDF3CB}"/>
+                  <a16:creationId xmlns:a16="http://schemas.microsoft.com/office/drawing/2014/main" xmlns="" id="{DB60E812-6938-4298-A78E-5CA545FDF3CB}"/>
                 </a:ext>
               </a:extLst>
             </p:cNvPr>
@@ -4004,7 +4005,7 @@
               <p:cNvPr id="8" name="Google Shape;1753;p44">
                 <a:extLst>
                   <a:ext uri="{FF2B5EF4-FFF2-40B4-BE49-F238E27FC236}">
-                    <a16:creationId xmlns:a16="http://schemas.microsoft.com/office/drawing/2014/main" id="{0DBB088E-379B-44B1-85B0-053B377E1558}"/>
+                    <a16:creationId xmlns:a16="http://schemas.microsoft.com/office/drawing/2014/main" xmlns="" id="{0DBB088E-379B-44B1-85B0-053B377E1558}"/>
                   </a:ext>
                 </a:extLst>
               </p:cNvPr>
@@ -4105,7 +4106,7 @@
               <p:cNvPr id="10" name="Google Shape;1754;p44">
                 <a:extLst>
                   <a:ext uri="{FF2B5EF4-FFF2-40B4-BE49-F238E27FC236}">
-                    <a16:creationId xmlns:a16="http://schemas.microsoft.com/office/drawing/2014/main" id="{3B04B96F-32C9-4ACA-B368-E0F84F216A79}"/>
+                    <a16:creationId xmlns:a16="http://schemas.microsoft.com/office/drawing/2014/main" xmlns="" id="{3B04B96F-32C9-4ACA-B368-E0F84F216A79}"/>
                   </a:ext>
                 </a:extLst>
               </p:cNvPr>
@@ -4191,7 +4192,7 @@
               <p:cNvPr id="11" name="Google Shape;1755;p44">
                 <a:extLst>
                   <a:ext uri="{FF2B5EF4-FFF2-40B4-BE49-F238E27FC236}">
-                    <a16:creationId xmlns:a16="http://schemas.microsoft.com/office/drawing/2014/main" id="{CF34BFC8-6B5D-4040-98EA-203295F3E25E}"/>
+                    <a16:creationId xmlns:a16="http://schemas.microsoft.com/office/drawing/2014/main" xmlns="" id="{CF34BFC8-6B5D-4040-98EA-203295F3E25E}"/>
                   </a:ext>
                 </a:extLst>
               </p:cNvPr>
@@ -4268,7 +4269,7 @@
             <p:cNvPr id="5" name="Imagem 4">
               <a:extLst>
                 <a:ext uri="{FF2B5EF4-FFF2-40B4-BE49-F238E27FC236}">
-                  <a16:creationId xmlns:a16="http://schemas.microsoft.com/office/drawing/2014/main" id="{760D5DD0-6CC9-481F-9766-56BD13589309}"/>
+                  <a16:creationId xmlns:a16="http://schemas.microsoft.com/office/drawing/2014/main" xmlns="" id="{760D5DD0-6CC9-481F-9766-56BD13589309}"/>
                 </a:ext>
               </a:extLst>
             </p:cNvPr>
@@ -4299,7 +4300,7 @@
           <p:cNvPr id="20" name="Agrupar 19">
             <a:extLst>
               <a:ext uri="{FF2B5EF4-FFF2-40B4-BE49-F238E27FC236}">
-                <a16:creationId xmlns:a16="http://schemas.microsoft.com/office/drawing/2014/main" id="{91CE4868-6806-4F0D-AD70-2D78D9090FA8}"/>
+                <a16:creationId xmlns:a16="http://schemas.microsoft.com/office/drawing/2014/main" xmlns="" id="{91CE4868-6806-4F0D-AD70-2D78D9090FA8}"/>
               </a:ext>
             </a:extLst>
           </p:cNvPr>
@@ -4319,7 +4320,7 @@
             <p:cNvPr id="13" name="Google Shape;1592;p73">
               <a:extLst>
                 <a:ext uri="{FF2B5EF4-FFF2-40B4-BE49-F238E27FC236}">
-                  <a16:creationId xmlns:a16="http://schemas.microsoft.com/office/drawing/2014/main" id="{9D82DDB8-54A1-4DD7-9030-06F75FEFFD86}"/>
+                  <a16:creationId xmlns:a16="http://schemas.microsoft.com/office/drawing/2014/main" xmlns="" id="{9D82DDB8-54A1-4DD7-9030-06F75FEFFD86}"/>
                 </a:ext>
               </a:extLst>
             </p:cNvPr>
@@ -4409,7 +4410,7 @@
             <p:cNvPr id="15" name="Imagem 14">
               <a:extLst>
                 <a:ext uri="{FF2B5EF4-FFF2-40B4-BE49-F238E27FC236}">
-                  <a16:creationId xmlns:a16="http://schemas.microsoft.com/office/drawing/2014/main" id="{3F367BA2-89AF-4926-8925-741DC524A38E}"/>
+                  <a16:creationId xmlns:a16="http://schemas.microsoft.com/office/drawing/2014/main" xmlns="" id="{3F367BA2-89AF-4926-8925-741DC524A38E}"/>
                 </a:ext>
               </a:extLst>
             </p:cNvPr>
@@ -4439,7 +4440,7 @@
           <p:cNvPr id="23" name="Agrupar 22">
             <a:extLst>
               <a:ext uri="{FF2B5EF4-FFF2-40B4-BE49-F238E27FC236}">
-                <a16:creationId xmlns:a16="http://schemas.microsoft.com/office/drawing/2014/main" id="{7E13A691-743F-4036-8B2B-FA415A2786A6}"/>
+                <a16:creationId xmlns:a16="http://schemas.microsoft.com/office/drawing/2014/main" xmlns="" id="{7E13A691-743F-4036-8B2B-FA415A2786A6}"/>
               </a:ext>
             </a:extLst>
           </p:cNvPr>
@@ -4459,7 +4460,7 @@
             <p:cNvPr id="16" name="Google Shape;1634;p74">
               <a:extLst>
                 <a:ext uri="{FF2B5EF4-FFF2-40B4-BE49-F238E27FC236}">
-                  <a16:creationId xmlns:a16="http://schemas.microsoft.com/office/drawing/2014/main" id="{8013B569-1E04-4E77-BAB8-7D2458AFDE47}"/>
+                  <a16:creationId xmlns:a16="http://schemas.microsoft.com/office/drawing/2014/main" xmlns="" id="{8013B569-1E04-4E77-BAB8-7D2458AFDE47}"/>
                 </a:ext>
               </a:extLst>
             </p:cNvPr>
@@ -4479,7 +4480,7 @@
               <p:cNvPr id="17" name="Google Shape;1635;p74">
                 <a:extLst>
                   <a:ext uri="{FF2B5EF4-FFF2-40B4-BE49-F238E27FC236}">
-                    <a16:creationId xmlns:a16="http://schemas.microsoft.com/office/drawing/2014/main" id="{8872BE14-B3C6-4215-AEB3-09725A52F24B}"/>
+                    <a16:creationId xmlns:a16="http://schemas.microsoft.com/office/drawing/2014/main" xmlns="" id="{8872BE14-B3C6-4215-AEB3-09725A52F24B}"/>
                   </a:ext>
                 </a:extLst>
               </p:cNvPr>
@@ -4569,7 +4570,7 @@
               <p:cNvPr id="18" name="Google Shape;1636;p74">
                 <a:extLst>
                   <a:ext uri="{FF2B5EF4-FFF2-40B4-BE49-F238E27FC236}">
-                    <a16:creationId xmlns:a16="http://schemas.microsoft.com/office/drawing/2014/main" id="{9B8CC2B5-5256-4C0B-9076-F8772294115C}"/>
+                    <a16:creationId xmlns:a16="http://schemas.microsoft.com/office/drawing/2014/main" xmlns="" id="{9B8CC2B5-5256-4C0B-9076-F8772294115C}"/>
                   </a:ext>
                 </a:extLst>
               </p:cNvPr>
@@ -4648,7 +4649,7 @@
             <p:cNvPr id="22" name="Imagem 21">
               <a:extLst>
                 <a:ext uri="{FF2B5EF4-FFF2-40B4-BE49-F238E27FC236}">
-                  <a16:creationId xmlns:a16="http://schemas.microsoft.com/office/drawing/2014/main" id="{4DE0FC26-C0D0-4230-84C8-5188379905E2}"/>
+                  <a16:creationId xmlns:a16="http://schemas.microsoft.com/office/drawing/2014/main" xmlns="" id="{4DE0FC26-C0D0-4230-84C8-5188379905E2}"/>
                 </a:ext>
               </a:extLst>
             </p:cNvPr>
@@ -4679,7 +4680,7 @@
           <p:cNvPr id="2050" name="Picture 2" descr="Useful sites for Learning HTML/CSS/Javacript – Sriki's Stack">
             <a:extLst>
               <a:ext uri="{FF2B5EF4-FFF2-40B4-BE49-F238E27FC236}">
-                <a16:creationId xmlns:a16="http://schemas.microsoft.com/office/drawing/2014/main" id="{F4798657-4CCC-4049-9AC1-551FB4D36DE7}"/>
+                <a16:creationId xmlns:a16="http://schemas.microsoft.com/office/drawing/2014/main" xmlns="" id="{F4798657-4CCC-4049-9AC1-551FB4D36DE7}"/>
               </a:ext>
             </a:extLst>
           </p:cNvPr>
@@ -4726,7 +4727,7 @@
           <p:cNvPr id="2052" name="Picture 4" descr="Bootstrap (and CSS) Useful Tips. I've been on some project in which I… | by  Fatah Nur Alam Majid | Medium">
             <a:extLst>
               <a:ext uri="{FF2B5EF4-FFF2-40B4-BE49-F238E27FC236}">
-                <a16:creationId xmlns:a16="http://schemas.microsoft.com/office/drawing/2014/main" id="{9EDFA597-D68D-47F3-BD54-A81339D58AA7}"/>
+                <a16:creationId xmlns:a16="http://schemas.microsoft.com/office/drawing/2014/main" xmlns="" id="{9EDFA597-D68D-47F3-BD54-A81339D58AA7}"/>
               </a:ext>
             </a:extLst>
           </p:cNvPr>
@@ -5149,7 +5150,7 @@
           <p:cNvPr id="7" name="Título 1">
             <a:extLst>
               <a:ext uri="{FF2B5EF4-FFF2-40B4-BE49-F238E27FC236}">
-                <a16:creationId xmlns:a16="http://schemas.microsoft.com/office/drawing/2014/main" id="{99F76FBE-1BC2-4EE6-B90A-22263BF7BDCD}"/>
+                <a16:creationId xmlns:a16="http://schemas.microsoft.com/office/drawing/2014/main" xmlns="" id="{99F76FBE-1BC2-4EE6-B90A-22263BF7BDCD}"/>
               </a:ext>
             </a:extLst>
           </p:cNvPr>
@@ -5212,7 +5213,7 @@
           <p:cNvPr id="4" name="Picture 2">
             <a:extLst>
               <a:ext uri="{FF2B5EF4-FFF2-40B4-BE49-F238E27FC236}">
-                <a16:creationId xmlns:a16="http://schemas.microsoft.com/office/drawing/2014/main" id="{3CF36ED0-FCD8-45D8-A912-5D4DD5032DBE}"/>
+                <a16:creationId xmlns:a16="http://schemas.microsoft.com/office/drawing/2014/main" xmlns="" id="{3CF36ED0-FCD8-45D8-A912-5D4DD5032DBE}"/>
               </a:ext>
             </a:extLst>
           </p:cNvPr>
@@ -5259,7 +5260,7 @@
           <p:cNvPr id="2" name="Straight Arrow Connector 1">
             <a:extLst>
               <a:ext uri="{FF2B5EF4-FFF2-40B4-BE49-F238E27FC236}">
-                <a16:creationId xmlns:a16="http://schemas.microsoft.com/office/drawing/2014/main" id="{EF6676ED-9702-4820-B9D8-8B178C2BC9D8}"/>
+                <a16:creationId xmlns:a16="http://schemas.microsoft.com/office/drawing/2014/main" xmlns="" id="{EF6676ED-9702-4820-B9D8-8B178C2BC9D8}"/>
               </a:ext>
             </a:extLst>
           </p:cNvPr>
@@ -5302,7 +5303,7 @@
           <p:cNvPr id="8" name="Google Shape;2568;p50">
             <a:extLst>
               <a:ext uri="{FF2B5EF4-FFF2-40B4-BE49-F238E27FC236}">
-                <a16:creationId xmlns:a16="http://schemas.microsoft.com/office/drawing/2014/main" id="{44646ED0-70CF-4F53-BCA6-F864DC8D8CE7}"/>
+                <a16:creationId xmlns:a16="http://schemas.microsoft.com/office/drawing/2014/main" xmlns="" id="{44646ED0-70CF-4F53-BCA6-F864DC8D8CE7}"/>
               </a:ext>
             </a:extLst>
           </p:cNvPr>
@@ -5322,7 +5323,7 @@
             <p:cNvPr id="9" name="Google Shape;2569;p50">
               <a:extLst>
                 <a:ext uri="{FF2B5EF4-FFF2-40B4-BE49-F238E27FC236}">
-                  <a16:creationId xmlns:a16="http://schemas.microsoft.com/office/drawing/2014/main" id="{FB65BD16-0480-48B4-9C70-4F7B1C20B16C}"/>
+                  <a16:creationId xmlns:a16="http://schemas.microsoft.com/office/drawing/2014/main" xmlns="" id="{FB65BD16-0480-48B4-9C70-4F7B1C20B16C}"/>
                 </a:ext>
               </a:extLst>
             </p:cNvPr>
@@ -5409,7 +5410,7 @@
             <p:cNvPr id="10" name="Google Shape;2570;p50">
               <a:extLst>
                 <a:ext uri="{FF2B5EF4-FFF2-40B4-BE49-F238E27FC236}">
-                  <a16:creationId xmlns:a16="http://schemas.microsoft.com/office/drawing/2014/main" id="{12A45219-8D11-4C29-9591-30268EABA08C}"/>
+                  <a16:creationId xmlns:a16="http://schemas.microsoft.com/office/drawing/2014/main" xmlns="" id="{12A45219-8D11-4C29-9591-30268EABA08C}"/>
                 </a:ext>
               </a:extLst>
             </p:cNvPr>
@@ -5486,7 +5487,7 @@
             <p:cNvPr id="11" name="Google Shape;2571;p50">
               <a:extLst>
                 <a:ext uri="{FF2B5EF4-FFF2-40B4-BE49-F238E27FC236}">
-                  <a16:creationId xmlns:a16="http://schemas.microsoft.com/office/drawing/2014/main" id="{F59228A5-A741-4378-BE36-B7E19A2718D5}"/>
+                  <a16:creationId xmlns:a16="http://schemas.microsoft.com/office/drawing/2014/main" xmlns="" id="{F59228A5-A741-4378-BE36-B7E19A2718D5}"/>
                 </a:ext>
               </a:extLst>
             </p:cNvPr>
@@ -5553,7 +5554,7 @@
             <p:cNvPr id="12" name="Google Shape;2572;p50">
               <a:extLst>
                 <a:ext uri="{FF2B5EF4-FFF2-40B4-BE49-F238E27FC236}">
-                  <a16:creationId xmlns:a16="http://schemas.microsoft.com/office/drawing/2014/main" id="{BD730A34-147B-4163-9308-7D0D671AD525}"/>
+                  <a16:creationId xmlns:a16="http://schemas.microsoft.com/office/drawing/2014/main" xmlns="" id="{BD730A34-147B-4163-9308-7D0D671AD525}"/>
                 </a:ext>
               </a:extLst>
             </p:cNvPr>
@@ -5857,7 +5858,7 @@
           <p:cNvPr id="7" name="Título 1">
             <a:extLst>
               <a:ext uri="{FF2B5EF4-FFF2-40B4-BE49-F238E27FC236}">
-                <a16:creationId xmlns:a16="http://schemas.microsoft.com/office/drawing/2014/main" id="{99F76FBE-1BC2-4EE6-B90A-22263BF7BDCD}"/>
+                <a16:creationId xmlns:a16="http://schemas.microsoft.com/office/drawing/2014/main" xmlns="" id="{99F76FBE-1BC2-4EE6-B90A-22263BF7BDCD}"/>
               </a:ext>
             </a:extLst>
           </p:cNvPr>
@@ -5868,7 +5869,7 @@
         </p:nvSpPr>
         <p:spPr>
           <a:xfrm>
-            <a:off x="838200" y="258639"/>
+            <a:off x="838200" y="-160017"/>
             <a:ext cx="10515600" cy="1325563"/>
           </a:xfrm>
           <a:prstGeom prst="rect">
@@ -5901,7 +5902,7 @@
           <a:p>
             <a:pPr algn="ctr"/>
             <a:r>
-              <a:rPr lang="pt-BR" dirty="0">
+              <a:rPr lang="pt-BR" dirty="0" smtClean="0">
                 <a:solidFill>
                   <a:schemeClr val="tx1">
                     <a:lumMod val="75000"/>
@@ -5910,17 +5911,26 @@
                 </a:solidFill>
                 <a:latin typeface="Bariol Bold" panose="02000506040000020003" pitchFamily="2" charset="0"/>
               </a:rPr>
-              <a:t>Planner</a:t>
+              <a:t>Aplicação Java</a:t>
             </a:r>
+            <a:endParaRPr lang="pt-BR" dirty="0">
+              <a:solidFill>
+                <a:schemeClr val="tx1">
+                  <a:lumMod val="75000"/>
+                  <a:lumOff val="25000"/>
+                </a:schemeClr>
+              </a:solidFill>
+              <a:latin typeface="Bariol Bold" panose="02000506040000020003" pitchFamily="2" charset="0"/>
+            </a:endParaRPr>
           </a:p>
         </p:txBody>
       </p:sp>
       <p:pic>
         <p:nvPicPr>
-          <p:cNvPr id="3" name="Picture 2">
+          <p:cNvPr id="4" name="Picture 2">
             <a:extLst>
               <a:ext uri="{FF2B5EF4-FFF2-40B4-BE49-F238E27FC236}">
-                <a16:creationId xmlns:a16="http://schemas.microsoft.com/office/drawing/2014/main" id="{A9070500-5C9F-415F-8DFF-FBCAA846F638}"/>
+                <a16:creationId xmlns:a16="http://schemas.microsoft.com/office/drawing/2014/main" xmlns="" id="{3CF36ED0-FCD8-45D8-A912-5D4DD5032DBE}"/>
               </a:ext>
             </a:extLst>
           </p:cNvPr>
@@ -5967,7 +5977,385 @@
           <p:cNvPr id="2" name="Straight Arrow Connector 1">
             <a:extLst>
               <a:ext uri="{FF2B5EF4-FFF2-40B4-BE49-F238E27FC236}">
-                <a16:creationId xmlns:a16="http://schemas.microsoft.com/office/drawing/2014/main" id="{4E523067-FB64-412F-AE09-1E914EEC9A82}"/>
+                <a16:creationId xmlns:a16="http://schemas.microsoft.com/office/drawing/2014/main" xmlns="" id="{EF6676ED-9702-4820-B9D8-8B178C2BC9D8}"/>
+              </a:ext>
+            </a:extLst>
+          </p:cNvPr>
+          <p:cNvCxnSpPr>
+            <a:cxnSpLocks/>
+          </p:cNvCxnSpPr>
+          <p:nvPr/>
+        </p:nvCxnSpPr>
+        <p:spPr>
+          <a:xfrm>
+            <a:off x="3750365" y="777737"/>
+            <a:ext cx="4691270" cy="0"/>
+          </a:xfrm>
+          <a:prstGeom prst="straightConnector1">
+            <a:avLst/>
+          </a:prstGeom>
+          <a:ln>
+            <a:solidFill>
+              <a:srgbClr val="C00000"/>
+            </a:solidFill>
+          </a:ln>
+        </p:spPr>
+        <p:style>
+          <a:lnRef idx="3">
+            <a:schemeClr val="dk1"/>
+          </a:lnRef>
+          <a:fillRef idx="0">
+            <a:schemeClr val="dk1"/>
+          </a:fillRef>
+          <a:effectRef idx="2">
+            <a:schemeClr val="dk1"/>
+          </a:effectRef>
+          <a:fontRef idx="minor">
+            <a:schemeClr val="tx1"/>
+          </a:fontRef>
+        </p:style>
+      </p:cxnSp>
+      <p:pic>
+        <p:nvPicPr>
+          <p:cNvPr id="3" name="Imagem 2"/>
+          <p:cNvPicPr>
+            <a:picLocks noChangeAspect="1"/>
+          </p:cNvPicPr>
+          <p:nvPr/>
+        </p:nvPicPr>
+        <p:blipFill>
+          <a:blip r:embed="rId3"/>
+          <a:stretch>
+            <a:fillRect/>
+          </a:stretch>
+        </p:blipFill>
+        <p:spPr>
+          <a:xfrm>
+            <a:off x="1842473" y="1165546"/>
+            <a:ext cx="8891789" cy="4327337"/>
+          </a:xfrm>
+          <a:prstGeom prst="rect">
+            <a:avLst/>
+          </a:prstGeom>
+        </p:spPr>
+      </p:pic>
+    </p:spTree>
+    <p:extLst>
+      <p:ext uri="{BB962C8B-B14F-4D97-AF65-F5344CB8AC3E}">
+        <p14:creationId xmlns:p14="http://schemas.microsoft.com/office/powerpoint/2010/main" val="3553014712"/>
+      </p:ext>
+    </p:extLst>
+  </p:cSld>
+  <p:clrMapOvr>
+    <a:masterClrMapping/>
+  </p:clrMapOvr>
+  <mc:AlternateContent xmlns:mc="http://schemas.openxmlformats.org/markup-compatibility/2006" xmlns:p14="http://schemas.microsoft.com/office/powerpoint/2010/main">
+    <mc:Choice Requires="p14">
+      <p:transition spd="med" p14:dur="700">
+        <p:fade/>
+      </p:transition>
+    </mc:Choice>
+    <mc:Fallback xmlns="">
+      <p:transition spd="med">
+        <p:fade/>
+      </p:transition>
+    </mc:Fallback>
+  </mc:AlternateContent>
+  <p:timing>
+    <p:tnLst>
+      <p:par>
+        <p:cTn id="1" dur="indefinite" restart="never" nodeType="tmRoot">
+          <p:childTnLst>
+            <p:seq concurrent="1" nextAc="seek">
+              <p:cTn id="2" dur="indefinite" nodeType="mainSeq">
+                <p:childTnLst>
+                  <p:par>
+                    <p:cTn id="3" fill="hold">
+                      <p:stCondLst>
+                        <p:cond delay="indefinite"/>
+                        <p:cond evt="onBegin" delay="0">
+                          <p:tn val="2"/>
+                        </p:cond>
+                      </p:stCondLst>
+                      <p:childTnLst>
+                        <p:par>
+                          <p:cTn id="4" fill="hold">
+                            <p:stCondLst>
+                              <p:cond delay="0"/>
+                            </p:stCondLst>
+                            <p:childTnLst>
+                              <p:par>
+                                <p:cTn id="5" presetID="10" presetClass="entr" presetSubtype="0" fill="hold" grpId="0" nodeType="afterEffect">
+                                  <p:stCondLst>
+                                    <p:cond delay="0"/>
+                                  </p:stCondLst>
+                                  <p:childTnLst>
+                                    <p:set>
+                                      <p:cBhvr>
+                                        <p:cTn id="6" dur="1" fill="hold">
+                                          <p:stCondLst>
+                                            <p:cond delay="0"/>
+                                          </p:stCondLst>
+                                        </p:cTn>
+                                        <p:tgtEl>
+                                          <p:spTgt spid="7"/>
+                                        </p:tgtEl>
+                                        <p:attrNameLst>
+                                          <p:attrName>style.visibility</p:attrName>
+                                        </p:attrNameLst>
+                                      </p:cBhvr>
+                                      <p:to>
+                                        <p:strVal val="visible"/>
+                                      </p:to>
+                                    </p:set>
+                                    <p:animEffect transition="in" filter="fade">
+                                      <p:cBhvr>
+                                        <p:cTn id="7" dur="500"/>
+                                        <p:tgtEl>
+                                          <p:spTgt spid="7"/>
+                                        </p:tgtEl>
+                                      </p:cBhvr>
+                                    </p:animEffect>
+                                  </p:childTnLst>
+                                </p:cTn>
+                              </p:par>
+                              <p:par>
+                                <p:cTn id="8" presetID="10" presetClass="entr" presetSubtype="0" fill="hold" nodeType="withEffect">
+                                  <p:stCondLst>
+                                    <p:cond delay="0"/>
+                                  </p:stCondLst>
+                                  <p:childTnLst>
+                                    <p:set>
+                                      <p:cBhvr>
+                                        <p:cTn id="9" dur="1" fill="hold">
+                                          <p:stCondLst>
+                                            <p:cond delay="0"/>
+                                          </p:stCondLst>
+                                        </p:cTn>
+                                        <p:tgtEl>
+                                          <p:spTgt spid="4"/>
+                                        </p:tgtEl>
+                                        <p:attrNameLst>
+                                          <p:attrName>style.visibility</p:attrName>
+                                        </p:attrNameLst>
+                                      </p:cBhvr>
+                                      <p:to>
+                                        <p:strVal val="visible"/>
+                                      </p:to>
+                                    </p:set>
+                                    <p:animEffect transition="in" filter="fade">
+                                      <p:cBhvr>
+                                        <p:cTn id="10" dur="500"/>
+                                        <p:tgtEl>
+                                          <p:spTgt spid="4"/>
+                                        </p:tgtEl>
+                                      </p:cBhvr>
+                                    </p:animEffect>
+                                  </p:childTnLst>
+                                </p:cTn>
+                              </p:par>
+                              <p:par>
+                                <p:cTn id="11" presetID="10" presetClass="entr" presetSubtype="0" fill="hold" nodeType="withEffect">
+                                  <p:stCondLst>
+                                    <p:cond delay="0"/>
+                                  </p:stCondLst>
+                                  <p:childTnLst>
+                                    <p:set>
+                                      <p:cBhvr>
+                                        <p:cTn id="12" dur="1" fill="hold">
+                                          <p:stCondLst>
+                                            <p:cond delay="0"/>
+                                          </p:stCondLst>
+                                        </p:cTn>
+                                        <p:tgtEl>
+                                          <p:spTgt spid="2"/>
+                                        </p:tgtEl>
+                                        <p:attrNameLst>
+                                          <p:attrName>style.visibility</p:attrName>
+                                        </p:attrNameLst>
+                                      </p:cBhvr>
+                                      <p:to>
+                                        <p:strVal val="visible"/>
+                                      </p:to>
+                                    </p:set>
+                                    <p:animEffect transition="in" filter="fade">
+                                      <p:cBhvr>
+                                        <p:cTn id="13" dur="500"/>
+                                        <p:tgtEl>
+                                          <p:spTgt spid="2"/>
+                                        </p:tgtEl>
+                                      </p:cBhvr>
+                                    </p:animEffect>
+                                  </p:childTnLst>
+                                </p:cTn>
+                              </p:par>
+                            </p:childTnLst>
+                          </p:cTn>
+                        </p:par>
+                      </p:childTnLst>
+                    </p:cTn>
+                  </p:par>
+                </p:childTnLst>
+              </p:cTn>
+              <p:prevCondLst>
+                <p:cond evt="onPrev" delay="0">
+                  <p:tgtEl>
+                    <p:sldTgt/>
+                  </p:tgtEl>
+                </p:cond>
+              </p:prevCondLst>
+              <p:nextCondLst>
+                <p:cond evt="onNext" delay="0">
+                  <p:tgtEl>
+                    <p:sldTgt/>
+                  </p:tgtEl>
+                </p:cond>
+              </p:nextCondLst>
+            </p:seq>
+          </p:childTnLst>
+        </p:cTn>
+      </p:par>
+    </p:tnLst>
+    <p:bldLst>
+      <p:bldP spid="7" grpId="0"/>
+    </p:bldLst>
+  </p:timing>
+</p:sld>
+</file>
+
+<file path=ppt/slides/slide14.xml><?xml version="1.0" encoding="utf-8"?>
+<p:sld xmlns:a="http://schemas.openxmlformats.org/drawingml/2006/main" xmlns:r="http://schemas.openxmlformats.org/officeDocument/2006/relationships" xmlns:p="http://schemas.openxmlformats.org/presentationml/2006/main">
+  <p:cSld>
+    <p:spTree>
+      <p:nvGrpSpPr>
+        <p:cNvPr id="1" name=""/>
+        <p:cNvGrpSpPr/>
+        <p:nvPr/>
+      </p:nvGrpSpPr>
+      <p:grpSpPr>
+        <a:xfrm>
+          <a:off x="0" y="0"/>
+          <a:ext cx="0" cy="0"/>
+          <a:chOff x="0" y="0"/>
+          <a:chExt cx="0" cy="0"/>
+        </a:xfrm>
+      </p:grpSpPr>
+      <p:sp>
+        <p:nvSpPr>
+          <p:cNvPr id="7" name="Título 1">
+            <a:extLst>
+              <a:ext uri="{FF2B5EF4-FFF2-40B4-BE49-F238E27FC236}">
+                <a16:creationId xmlns:a16="http://schemas.microsoft.com/office/drawing/2014/main" xmlns="" id="{99F76FBE-1BC2-4EE6-B90A-22263BF7BDCD}"/>
+              </a:ext>
+            </a:extLst>
+          </p:cNvPr>
+          <p:cNvSpPr txBox="1">
+            <a:spLocks/>
+          </p:cNvSpPr>
+          <p:nvPr/>
+        </p:nvSpPr>
+        <p:spPr>
+          <a:xfrm>
+            <a:off x="838200" y="258639"/>
+            <a:ext cx="10515600" cy="1325563"/>
+          </a:xfrm>
+          <a:prstGeom prst="rect">
+            <a:avLst/>
+          </a:prstGeom>
+        </p:spPr>
+        <p:txBody>
+          <a:bodyPr vert="horz" lIns="91440" tIns="45720" rIns="91440" bIns="45720" rtlCol="0" anchor="ctr">
+            <a:normAutofit/>
+          </a:bodyPr>
+          <a:lstStyle>
+            <a:lvl1pPr algn="l" defTabSz="914400" rtl="0" eaLnBrk="1" latinLnBrk="0" hangingPunct="1">
+              <a:lnSpc>
+                <a:spcPct val="90000"/>
+              </a:lnSpc>
+              <a:spcBef>
+                <a:spcPct val="0"/>
+              </a:spcBef>
+              <a:buNone/>
+              <a:defRPr sz="4400" kern="1200">
+                <a:solidFill>
+                  <a:schemeClr val="tx1"/>
+                </a:solidFill>
+                <a:latin typeface="+mj-lt"/>
+                <a:ea typeface="+mj-ea"/>
+                <a:cs typeface="+mj-cs"/>
+              </a:defRPr>
+            </a:lvl1pPr>
+          </a:lstStyle>
+          <a:p>
+            <a:pPr algn="ctr"/>
+            <a:r>
+              <a:rPr lang="pt-BR" dirty="0">
+                <a:solidFill>
+                  <a:schemeClr val="tx1">
+                    <a:lumMod val="75000"/>
+                    <a:lumOff val="25000"/>
+                  </a:schemeClr>
+                </a:solidFill>
+                <a:latin typeface="Bariol Bold" panose="02000506040000020003" pitchFamily="2" charset="0"/>
+              </a:rPr>
+              <a:t>Planner</a:t>
+            </a:r>
+          </a:p>
+        </p:txBody>
+      </p:sp>
+      <p:pic>
+        <p:nvPicPr>
+          <p:cNvPr id="3" name="Picture 2">
+            <a:extLst>
+              <a:ext uri="{FF2B5EF4-FFF2-40B4-BE49-F238E27FC236}">
+                <a16:creationId xmlns:a16="http://schemas.microsoft.com/office/drawing/2014/main" xmlns="" id="{A9070500-5C9F-415F-8DFF-FBCAA846F638}"/>
+              </a:ext>
+            </a:extLst>
+          </p:cNvPr>
+          <p:cNvPicPr>
+            <a:picLocks noChangeAspect="1" noChangeArrowheads="1"/>
+          </p:cNvPicPr>
+          <p:nvPr/>
+        </p:nvPicPr>
+        <p:blipFill>
+          <a:blip r:embed="rId2" cstate="print">
+            <a:extLst>
+              <a:ext uri="{28A0092B-C50C-407E-A947-70E740481C1C}">
+                <a14:useLocalDpi xmlns:a14="http://schemas.microsoft.com/office/drawing/2010/main" val="0"/>
+              </a:ext>
+            </a:extLst>
+          </a:blip>
+          <a:srcRect/>
+          <a:stretch>
+            <a:fillRect/>
+          </a:stretch>
+        </p:blipFill>
+        <p:spPr bwMode="auto">
+          <a:xfrm>
+            <a:off x="10734262" y="6232246"/>
+            <a:ext cx="1143368" cy="473355"/>
+          </a:xfrm>
+          <a:prstGeom prst="rect">
+            <a:avLst/>
+          </a:prstGeom>
+          <a:noFill/>
+          <a:extLst>
+            <a:ext uri="{909E8E84-426E-40DD-AFC4-6F175D3DCCD1}">
+              <a14:hiddenFill xmlns:a14="http://schemas.microsoft.com/office/drawing/2010/main">
+                <a:solidFill>
+                  <a:srgbClr val="FFFFFF"/>
+                </a:solidFill>
+              </a14:hiddenFill>
+            </a:ext>
+          </a:extLst>
+        </p:spPr>
+      </p:pic>
+      <p:cxnSp>
+        <p:nvCxnSpPr>
+          <p:cNvPr id="2" name="Straight Arrow Connector 1">
+            <a:extLst>
+              <a:ext uri="{FF2B5EF4-FFF2-40B4-BE49-F238E27FC236}">
+                <a16:creationId xmlns:a16="http://schemas.microsoft.com/office/drawing/2014/main" xmlns="" id="{4E523067-FB64-412F-AE09-1E914EEC9A82}"/>
               </a:ext>
             </a:extLst>
           </p:cNvPr>
@@ -6010,7 +6398,7 @@
           <p:cNvPr id="9" name="Imagem 8">
             <a:extLst>
               <a:ext uri="{FF2B5EF4-FFF2-40B4-BE49-F238E27FC236}">
-                <a16:creationId xmlns:a16="http://schemas.microsoft.com/office/drawing/2014/main" id="{814E4E03-513D-4D7F-B842-33DE1E24CA83}"/>
+                <a16:creationId xmlns:a16="http://schemas.microsoft.com/office/drawing/2014/main" xmlns="" id="{814E4E03-513D-4D7F-B842-33DE1E24CA83}"/>
               </a:ext>
             </a:extLst>
           </p:cNvPr>
@@ -6260,7 +6648,7 @@
 </p:sld>
 </file>
 
-<file path=ppt/slides/slide14.xml><?xml version="1.0" encoding="utf-8"?>
+<file path=ppt/slides/slide15.xml><?xml version="1.0" encoding="utf-8"?>
 <p:sld xmlns:a="http://schemas.openxmlformats.org/drawingml/2006/main" xmlns:r="http://schemas.openxmlformats.org/officeDocument/2006/relationships" xmlns:p="http://schemas.openxmlformats.org/presentationml/2006/main">
   <p:cSld>
     <p:spTree>
@@ -6282,7 +6670,7 @@
           <p:cNvPr id="7" name="Título 1">
             <a:extLst>
               <a:ext uri="{FF2B5EF4-FFF2-40B4-BE49-F238E27FC236}">
-                <a16:creationId xmlns:a16="http://schemas.microsoft.com/office/drawing/2014/main" id="{99F76FBE-1BC2-4EE6-B90A-22263BF7BDCD}"/>
+                <a16:creationId xmlns:a16="http://schemas.microsoft.com/office/drawing/2014/main" xmlns="" id="{99F76FBE-1BC2-4EE6-B90A-22263BF7BDCD}"/>
               </a:ext>
             </a:extLst>
           </p:cNvPr>
@@ -6345,7 +6733,7 @@
           <p:cNvPr id="3" name="Imagem 2" descr="Desenho de uma pessoa&#10;&#10;Descrição gerada automaticamente">
             <a:extLst>
               <a:ext uri="{FF2B5EF4-FFF2-40B4-BE49-F238E27FC236}">
-                <a16:creationId xmlns:a16="http://schemas.microsoft.com/office/drawing/2014/main" id="{ED02D286-F5A0-4509-8E48-BFA54F34D076}"/>
+                <a16:creationId xmlns:a16="http://schemas.microsoft.com/office/drawing/2014/main" xmlns="" id="{ED02D286-F5A0-4509-8E48-BFA54F34D076}"/>
               </a:ext>
             </a:extLst>
           </p:cNvPr>
@@ -6381,7 +6769,7 @@
           <p:cNvPr id="4" name="Picture 2">
             <a:extLst>
               <a:ext uri="{FF2B5EF4-FFF2-40B4-BE49-F238E27FC236}">
-                <a16:creationId xmlns:a16="http://schemas.microsoft.com/office/drawing/2014/main" id="{CDDD861E-3766-442F-8F52-68E1AE2C3753}"/>
+                <a16:creationId xmlns:a16="http://schemas.microsoft.com/office/drawing/2014/main" xmlns="" id="{CDDD861E-3766-442F-8F52-68E1AE2C3753}"/>
               </a:ext>
             </a:extLst>
           </p:cNvPr>
@@ -6428,7 +6816,7 @@
           <p:cNvPr id="2" name="Straight Arrow Connector 1">
             <a:extLst>
               <a:ext uri="{FF2B5EF4-FFF2-40B4-BE49-F238E27FC236}">
-                <a16:creationId xmlns:a16="http://schemas.microsoft.com/office/drawing/2014/main" id="{825D95E1-8250-4172-ABA3-976541C2807C}"/>
+                <a16:creationId xmlns:a16="http://schemas.microsoft.com/office/drawing/2014/main" xmlns="" id="{825D95E1-8250-4172-ABA3-976541C2807C}"/>
               </a:ext>
             </a:extLst>
           </p:cNvPr>
@@ -6683,7 +7071,7 @@
 </p:sld>
 </file>
 
-<file path=ppt/slides/slide15.xml><?xml version="1.0" encoding="utf-8"?>
+<file path=ppt/slides/slide16.xml><?xml version="1.0" encoding="utf-8"?>
 <p:sld xmlns:a="http://schemas.openxmlformats.org/drawingml/2006/main" xmlns:r="http://schemas.openxmlformats.org/officeDocument/2006/relationships" xmlns:p="http://schemas.openxmlformats.org/presentationml/2006/main">
   <p:cSld>
     <p:spTree>
@@ -6705,7 +7093,7 @@
           <p:cNvPr id="7" name="Título 1">
             <a:extLst>
               <a:ext uri="{FF2B5EF4-FFF2-40B4-BE49-F238E27FC236}">
-                <a16:creationId xmlns:a16="http://schemas.microsoft.com/office/drawing/2014/main" id="{99F76FBE-1BC2-4EE6-B90A-22263BF7BDCD}"/>
+                <a16:creationId xmlns:a16="http://schemas.microsoft.com/office/drawing/2014/main" xmlns="" id="{99F76FBE-1BC2-4EE6-B90A-22263BF7BDCD}"/>
               </a:ext>
             </a:extLst>
           </p:cNvPr>
@@ -6768,7 +7156,7 @@
           <p:cNvPr id="3" name="Picture 2">
             <a:extLst>
               <a:ext uri="{FF2B5EF4-FFF2-40B4-BE49-F238E27FC236}">
-                <a16:creationId xmlns:a16="http://schemas.microsoft.com/office/drawing/2014/main" id="{A5E95E14-1174-4815-814A-3FB16E71EF46}"/>
+                <a16:creationId xmlns:a16="http://schemas.microsoft.com/office/drawing/2014/main" xmlns="" id="{A5E95E14-1174-4815-814A-3FB16E71EF46}"/>
               </a:ext>
             </a:extLst>
           </p:cNvPr>
@@ -6815,7 +7203,7 @@
           <p:cNvPr id="4" name="Imagem 3" descr="Uma imagem contendo homem, atletismo, mulher, segurando&#10;&#10;Descrição gerada automaticamente">
             <a:extLst>
               <a:ext uri="{FF2B5EF4-FFF2-40B4-BE49-F238E27FC236}">
-                <a16:creationId xmlns:a16="http://schemas.microsoft.com/office/drawing/2014/main" id="{8C7F91F0-DCD8-4436-A809-E9763D748E22}"/>
+                <a16:creationId xmlns:a16="http://schemas.microsoft.com/office/drawing/2014/main" xmlns="" id="{8C7F91F0-DCD8-4436-A809-E9763D748E22}"/>
               </a:ext>
             </a:extLst>
           </p:cNvPr>
@@ -6851,7 +7239,7 @@
           <p:cNvPr id="6" name="Straight Arrow Connector 1">
             <a:extLst>
               <a:ext uri="{FF2B5EF4-FFF2-40B4-BE49-F238E27FC236}">
-                <a16:creationId xmlns:a16="http://schemas.microsoft.com/office/drawing/2014/main" id="{EF317FC1-ACAE-4693-9AF7-C538ED9B538A}"/>
+                <a16:creationId xmlns:a16="http://schemas.microsoft.com/office/drawing/2014/main" xmlns="" id="{EF317FC1-ACAE-4693-9AF7-C538ED9B538A}"/>
               </a:ext>
             </a:extLst>
           </p:cNvPr>
@@ -7128,7 +7516,7 @@
           <p:cNvPr id="3" name="Straight Arrow Connector 2">
             <a:extLst>
               <a:ext uri="{FF2B5EF4-FFF2-40B4-BE49-F238E27FC236}">
-                <a16:creationId xmlns:a16="http://schemas.microsoft.com/office/drawing/2014/main" id="{238B6891-9D9A-4548-BDE4-47054128BA41}"/>
+                <a16:creationId xmlns:a16="http://schemas.microsoft.com/office/drawing/2014/main" xmlns="" id="{238B6891-9D9A-4548-BDE4-47054128BA41}"/>
               </a:ext>
             </a:extLst>
           </p:cNvPr>
@@ -7169,7 +7557,7 @@
           <p:cNvPr id="7" name="Título 1">
             <a:extLst>
               <a:ext uri="{FF2B5EF4-FFF2-40B4-BE49-F238E27FC236}">
-                <a16:creationId xmlns:a16="http://schemas.microsoft.com/office/drawing/2014/main" id="{99F76FBE-1BC2-4EE6-B90A-22263BF7BDCD}"/>
+                <a16:creationId xmlns:a16="http://schemas.microsoft.com/office/drawing/2014/main" xmlns="" id="{99F76FBE-1BC2-4EE6-B90A-22263BF7BDCD}"/>
               </a:ext>
             </a:extLst>
           </p:cNvPr>
@@ -7232,7 +7620,7 @@
           <p:cNvPr id="10" name="Título 1">
             <a:extLst>
               <a:ext uri="{FF2B5EF4-FFF2-40B4-BE49-F238E27FC236}">
-                <a16:creationId xmlns:a16="http://schemas.microsoft.com/office/drawing/2014/main" id="{678E41F7-516A-49E2-B205-0A126C574C2E}"/>
+                <a16:creationId xmlns:a16="http://schemas.microsoft.com/office/drawing/2014/main" xmlns="" id="{678E41F7-516A-49E2-B205-0A126C574C2E}"/>
               </a:ext>
             </a:extLst>
           </p:cNvPr>
@@ -7310,7 +7698,7 @@
           <p:cNvPr id="11" name="Título 1">
             <a:extLst>
               <a:ext uri="{FF2B5EF4-FFF2-40B4-BE49-F238E27FC236}">
-                <a16:creationId xmlns:a16="http://schemas.microsoft.com/office/drawing/2014/main" id="{0CD946CA-FF61-4363-B296-4AF3D7FBC896}"/>
+                <a16:creationId xmlns:a16="http://schemas.microsoft.com/office/drawing/2014/main" xmlns="" id="{0CD946CA-FF61-4363-B296-4AF3D7FBC896}"/>
               </a:ext>
             </a:extLst>
           </p:cNvPr>
@@ -7388,7 +7776,7 @@
           <p:cNvPr id="12" name="Título 1">
             <a:extLst>
               <a:ext uri="{FF2B5EF4-FFF2-40B4-BE49-F238E27FC236}">
-                <a16:creationId xmlns:a16="http://schemas.microsoft.com/office/drawing/2014/main" id="{AB9726E8-CEB5-4829-BE8F-0EAF85278B5A}"/>
+                <a16:creationId xmlns:a16="http://schemas.microsoft.com/office/drawing/2014/main" xmlns="" id="{AB9726E8-CEB5-4829-BE8F-0EAF85278B5A}"/>
               </a:ext>
             </a:extLst>
           </p:cNvPr>
@@ -7466,7 +7854,7 @@
           <p:cNvPr id="15" name="Título 1">
             <a:extLst>
               <a:ext uri="{FF2B5EF4-FFF2-40B4-BE49-F238E27FC236}">
-                <a16:creationId xmlns:a16="http://schemas.microsoft.com/office/drawing/2014/main" id="{2EEDD670-B386-40A2-A879-9CF8F33DA40F}"/>
+                <a16:creationId xmlns:a16="http://schemas.microsoft.com/office/drawing/2014/main" xmlns="" id="{2EEDD670-B386-40A2-A879-9CF8F33DA40F}"/>
               </a:ext>
             </a:extLst>
           </p:cNvPr>
@@ -7544,7 +7932,7 @@
           <p:cNvPr id="16" name="Título 1">
             <a:extLst>
               <a:ext uri="{FF2B5EF4-FFF2-40B4-BE49-F238E27FC236}">
-                <a16:creationId xmlns:a16="http://schemas.microsoft.com/office/drawing/2014/main" id="{229589FA-FF5C-47DD-A54E-805F02B40D56}"/>
+                <a16:creationId xmlns:a16="http://schemas.microsoft.com/office/drawing/2014/main" xmlns="" id="{229589FA-FF5C-47DD-A54E-805F02B40D56}"/>
               </a:ext>
             </a:extLst>
           </p:cNvPr>
@@ -7622,7 +8010,7 @@
           <p:cNvPr id="17" name="Título 1">
             <a:extLst>
               <a:ext uri="{FF2B5EF4-FFF2-40B4-BE49-F238E27FC236}">
-                <a16:creationId xmlns:a16="http://schemas.microsoft.com/office/drawing/2014/main" id="{9A6A319D-B6D1-48C9-B967-DAB049B71962}"/>
+                <a16:creationId xmlns:a16="http://schemas.microsoft.com/office/drawing/2014/main" xmlns="" id="{9A6A319D-B6D1-48C9-B967-DAB049B71962}"/>
               </a:ext>
             </a:extLst>
           </p:cNvPr>
@@ -7700,7 +8088,7 @@
           <p:cNvPr id="18" name="Imagem 17">
             <a:extLst>
               <a:ext uri="{FF2B5EF4-FFF2-40B4-BE49-F238E27FC236}">
-                <a16:creationId xmlns:a16="http://schemas.microsoft.com/office/drawing/2014/main" id="{A69155FD-5341-487B-81D7-5E2880E09683}"/>
+                <a16:creationId xmlns:a16="http://schemas.microsoft.com/office/drawing/2014/main" xmlns="" id="{A69155FD-5341-487B-81D7-5E2880E09683}"/>
               </a:ext>
             </a:extLst>
           </p:cNvPr>
@@ -7736,7 +8124,7 @@
           <p:cNvPr id="5" name="Imagem 4" descr="Uma imagem contendo pessoa, no interior, homem, olhando&#10;&#10;Descrição gerada automaticamente">
             <a:extLst>
               <a:ext uri="{FF2B5EF4-FFF2-40B4-BE49-F238E27FC236}">
-                <a16:creationId xmlns:a16="http://schemas.microsoft.com/office/drawing/2014/main" id="{6C745D24-199A-4881-AE89-46E21608BE16}"/>
+                <a16:creationId xmlns:a16="http://schemas.microsoft.com/office/drawing/2014/main" xmlns="" id="{6C745D24-199A-4881-AE89-46E21608BE16}"/>
               </a:ext>
             </a:extLst>
           </p:cNvPr>
@@ -7772,7 +8160,7 @@
           <p:cNvPr id="8" name="Imagem 7" descr="Mulher de óculos posando para foto&#10;&#10;Descrição gerada automaticamente">
             <a:extLst>
               <a:ext uri="{FF2B5EF4-FFF2-40B4-BE49-F238E27FC236}">
-                <a16:creationId xmlns:a16="http://schemas.microsoft.com/office/drawing/2014/main" id="{FC4E1664-FD72-473B-9AA6-576FEBE87B95}"/>
+                <a16:creationId xmlns:a16="http://schemas.microsoft.com/office/drawing/2014/main" xmlns="" id="{FC4E1664-FD72-473B-9AA6-576FEBE87B95}"/>
               </a:ext>
             </a:extLst>
           </p:cNvPr>
@@ -7808,7 +8196,7 @@
           <p:cNvPr id="13" name="Imagem 12" descr="Menino sorrindo posando para foto&#10;&#10;Descrição gerada automaticamente">
             <a:extLst>
               <a:ext uri="{FF2B5EF4-FFF2-40B4-BE49-F238E27FC236}">
-                <a16:creationId xmlns:a16="http://schemas.microsoft.com/office/drawing/2014/main" id="{9CE75B2B-4F48-4749-8C51-76B8AF200AB6}"/>
+                <a16:creationId xmlns:a16="http://schemas.microsoft.com/office/drawing/2014/main" xmlns="" id="{9CE75B2B-4F48-4749-8C51-76B8AF200AB6}"/>
               </a:ext>
             </a:extLst>
           </p:cNvPr>
@@ -7844,7 +8232,7 @@
           <p:cNvPr id="19" name="Imagem 18" descr="Uma imagem contendo pessoa, vestuário, mulher, chapéu&#10;&#10;Descrição gerada automaticamente">
             <a:extLst>
               <a:ext uri="{FF2B5EF4-FFF2-40B4-BE49-F238E27FC236}">
-                <a16:creationId xmlns:a16="http://schemas.microsoft.com/office/drawing/2014/main" id="{EAADD116-6D5D-4F23-9BA1-67E971C3F6FD}"/>
+                <a16:creationId xmlns:a16="http://schemas.microsoft.com/office/drawing/2014/main" xmlns="" id="{EAADD116-6D5D-4F23-9BA1-67E971C3F6FD}"/>
               </a:ext>
             </a:extLst>
           </p:cNvPr>
@@ -7880,7 +8268,7 @@
           <p:cNvPr id="21" name="Imagem 20" descr="Menino de camisa preta&#10;&#10;Descrição gerada automaticamente">
             <a:extLst>
               <a:ext uri="{FF2B5EF4-FFF2-40B4-BE49-F238E27FC236}">
-                <a16:creationId xmlns:a16="http://schemas.microsoft.com/office/drawing/2014/main" id="{22A12B27-089B-438B-97E5-38C10B35395A}"/>
+                <a16:creationId xmlns:a16="http://schemas.microsoft.com/office/drawing/2014/main" xmlns="" id="{22A12B27-089B-438B-97E5-38C10B35395A}"/>
               </a:ext>
             </a:extLst>
           </p:cNvPr>
@@ -7916,7 +8304,7 @@
           <p:cNvPr id="20" name="Picture 2">
             <a:extLst>
               <a:ext uri="{FF2B5EF4-FFF2-40B4-BE49-F238E27FC236}">
-                <a16:creationId xmlns:a16="http://schemas.microsoft.com/office/drawing/2014/main" id="{5823B29F-7B62-4389-9250-63EBA3ABE63F}"/>
+                <a16:creationId xmlns:a16="http://schemas.microsoft.com/office/drawing/2014/main" xmlns="" id="{5823B29F-7B62-4389-9250-63EBA3ABE63F}"/>
               </a:ext>
             </a:extLst>
           </p:cNvPr>
@@ -8599,7 +8987,7 @@
           <p:cNvPr id="2" name="Straight Arrow Connector 1">
             <a:extLst>
               <a:ext uri="{FF2B5EF4-FFF2-40B4-BE49-F238E27FC236}">
-                <a16:creationId xmlns:a16="http://schemas.microsoft.com/office/drawing/2014/main" id="{2A50C13F-38CB-4726-A175-5BC057C23492}"/>
+                <a16:creationId xmlns:a16="http://schemas.microsoft.com/office/drawing/2014/main" xmlns="" id="{2A50C13F-38CB-4726-A175-5BC057C23492}"/>
               </a:ext>
             </a:extLst>
           </p:cNvPr>
@@ -8640,7 +9028,7 @@
           <p:cNvPr id="7" name="Título 1">
             <a:extLst>
               <a:ext uri="{FF2B5EF4-FFF2-40B4-BE49-F238E27FC236}">
-                <a16:creationId xmlns:a16="http://schemas.microsoft.com/office/drawing/2014/main" id="{99F76FBE-1BC2-4EE6-B90A-22263BF7BDCD}"/>
+                <a16:creationId xmlns:a16="http://schemas.microsoft.com/office/drawing/2014/main" xmlns="" id="{99F76FBE-1BC2-4EE6-B90A-22263BF7BDCD}"/>
               </a:ext>
             </a:extLst>
           </p:cNvPr>
@@ -8703,7 +9091,7 @@
           <p:cNvPr id="4098" name="Picture 2" descr="Imagens Telemarketing | Vetores, fotos de arquivo e PSD grátis">
             <a:extLst>
               <a:ext uri="{FF2B5EF4-FFF2-40B4-BE49-F238E27FC236}">
-                <a16:creationId xmlns:a16="http://schemas.microsoft.com/office/drawing/2014/main" id="{3E46EC94-A677-40FE-ADA9-5B9036F756D9}"/>
+                <a16:creationId xmlns:a16="http://schemas.microsoft.com/office/drawing/2014/main" xmlns="" id="{3E46EC94-A677-40FE-ADA9-5B9036F756D9}"/>
               </a:ext>
             </a:extLst>
           </p:cNvPr>
@@ -8750,7 +9138,7 @@
           <p:cNvPr id="4" name="Picture 2">
             <a:extLst>
               <a:ext uri="{FF2B5EF4-FFF2-40B4-BE49-F238E27FC236}">
-                <a16:creationId xmlns:a16="http://schemas.microsoft.com/office/drawing/2014/main" id="{95805BE3-4A1A-4523-A540-D89AD3DB5CFB}"/>
+                <a16:creationId xmlns:a16="http://schemas.microsoft.com/office/drawing/2014/main" xmlns="" id="{95805BE3-4A1A-4523-A540-D89AD3DB5CFB}"/>
               </a:ext>
             </a:extLst>
           </p:cNvPr>
@@ -8797,7 +9185,7 @@
           <p:cNvPr id="6" name="Título 1">
             <a:extLst>
               <a:ext uri="{FF2B5EF4-FFF2-40B4-BE49-F238E27FC236}">
-                <a16:creationId xmlns:a16="http://schemas.microsoft.com/office/drawing/2014/main" id="{B6F48679-00C5-4A77-A553-A620B378115E}"/>
+                <a16:creationId xmlns:a16="http://schemas.microsoft.com/office/drawing/2014/main" xmlns="" id="{B6F48679-00C5-4A77-A553-A620B378115E}"/>
               </a:ext>
             </a:extLst>
           </p:cNvPr>
@@ -9180,7 +9568,7 @@
           <p:cNvPr id="7" name="Título 1">
             <a:extLst>
               <a:ext uri="{FF2B5EF4-FFF2-40B4-BE49-F238E27FC236}">
-                <a16:creationId xmlns:a16="http://schemas.microsoft.com/office/drawing/2014/main" id="{99F76FBE-1BC2-4EE6-B90A-22263BF7BDCD}"/>
+                <a16:creationId xmlns:a16="http://schemas.microsoft.com/office/drawing/2014/main" xmlns="" id="{99F76FBE-1BC2-4EE6-B90A-22263BF7BDCD}"/>
               </a:ext>
             </a:extLst>
           </p:cNvPr>
@@ -9243,7 +9631,7 @@
           <p:cNvPr id="9" name="Imagem 8">
             <a:extLst>
               <a:ext uri="{FF2B5EF4-FFF2-40B4-BE49-F238E27FC236}">
-                <a16:creationId xmlns:a16="http://schemas.microsoft.com/office/drawing/2014/main" id="{CD24726A-903B-41C4-B6DF-760C4CFE61AA}"/>
+                <a16:creationId xmlns:a16="http://schemas.microsoft.com/office/drawing/2014/main" xmlns="" id="{CD24726A-903B-41C4-B6DF-760C4CFE61AA}"/>
               </a:ext>
             </a:extLst>
           </p:cNvPr>
@@ -9279,7 +9667,7 @@
           <p:cNvPr id="4" name="Picture 2">
             <a:extLst>
               <a:ext uri="{FF2B5EF4-FFF2-40B4-BE49-F238E27FC236}">
-                <a16:creationId xmlns:a16="http://schemas.microsoft.com/office/drawing/2014/main" id="{F42FB2A8-7F94-4D7A-BF31-87B8DC9FEACF}"/>
+                <a16:creationId xmlns:a16="http://schemas.microsoft.com/office/drawing/2014/main" xmlns="" id="{F42FB2A8-7F94-4D7A-BF31-87B8DC9FEACF}"/>
               </a:ext>
             </a:extLst>
           </p:cNvPr>
@@ -9326,7 +9714,7 @@
           <p:cNvPr id="2" name="Straight Arrow Connector 1">
             <a:extLst>
               <a:ext uri="{FF2B5EF4-FFF2-40B4-BE49-F238E27FC236}">
-                <a16:creationId xmlns:a16="http://schemas.microsoft.com/office/drawing/2014/main" id="{767E2C2F-9178-48A2-B56C-EB623F4CF011}"/>
+                <a16:creationId xmlns:a16="http://schemas.microsoft.com/office/drawing/2014/main" xmlns="" id="{767E2C2F-9178-48A2-B56C-EB623F4CF011}"/>
               </a:ext>
             </a:extLst>
           </p:cNvPr>
@@ -9367,7 +9755,7 @@
           <p:cNvPr id="8" name="Título 1">
             <a:extLst>
               <a:ext uri="{FF2B5EF4-FFF2-40B4-BE49-F238E27FC236}">
-                <a16:creationId xmlns:a16="http://schemas.microsoft.com/office/drawing/2014/main" id="{AC3CD658-6C4C-49F8-8B83-5AE503BD9F21}"/>
+                <a16:creationId xmlns:a16="http://schemas.microsoft.com/office/drawing/2014/main" xmlns="" id="{AC3CD658-6C4C-49F8-8B83-5AE503BD9F21}"/>
               </a:ext>
             </a:extLst>
           </p:cNvPr>
@@ -9459,8 +9847,23 @@
               <a:rPr lang="pt-BR" sz="2800" dirty="0">
                 <a:latin typeface="Bariol Bold" panose="02000506040000020003"/>
               </a:rPr>
-              <a:t> Comunicação ruim com o suporte;</a:t>
+              <a:t> </a:t>
             </a:r>
+            <a:r>
+              <a:rPr lang="pt-BR" sz="2800" dirty="0" smtClean="0">
+                <a:latin typeface="Bariol Bold" panose="02000506040000020003"/>
+              </a:rPr>
+              <a:t>Funcionários que tentam burlar regras</a:t>
+            </a:r>
+            <a:r>
+              <a:rPr lang="pt-BR" sz="2800" dirty="0" smtClean="0">
+                <a:latin typeface="Bariol Bold" panose="02000506040000020003"/>
+              </a:rPr>
+              <a:t>;</a:t>
+            </a:r>
+            <a:endParaRPr lang="pt-BR" sz="2800" dirty="0">
+              <a:latin typeface="Bariol Bold" panose="02000506040000020003"/>
+            </a:endParaRPr>
           </a:p>
         </p:txBody>
       </p:sp>
@@ -9750,7 +10153,7 @@
           <p:cNvPr id="2" name="Straight Arrow Connector 1">
             <a:extLst>
               <a:ext uri="{FF2B5EF4-FFF2-40B4-BE49-F238E27FC236}">
-                <a16:creationId xmlns:a16="http://schemas.microsoft.com/office/drawing/2014/main" id="{8067B5E4-5CC9-4738-A6C6-0C51E8FD5F7E}"/>
+                <a16:creationId xmlns:a16="http://schemas.microsoft.com/office/drawing/2014/main" xmlns="" id="{8067B5E4-5CC9-4738-A6C6-0C51E8FD5F7E}"/>
               </a:ext>
             </a:extLst>
           </p:cNvPr>
@@ -9791,7 +10194,7 @@
           <p:cNvPr id="7" name="Título 1">
             <a:extLst>
               <a:ext uri="{FF2B5EF4-FFF2-40B4-BE49-F238E27FC236}">
-                <a16:creationId xmlns:a16="http://schemas.microsoft.com/office/drawing/2014/main" id="{99F76FBE-1BC2-4EE6-B90A-22263BF7BDCD}"/>
+                <a16:creationId xmlns:a16="http://schemas.microsoft.com/office/drawing/2014/main" xmlns="" id="{99F76FBE-1BC2-4EE6-B90A-22263BF7BDCD}"/>
               </a:ext>
             </a:extLst>
           </p:cNvPr>
@@ -9854,7 +10257,7 @@
           <p:cNvPr id="3" name="Imagem 2" descr="Uma imagem contendo atletismo, homem, mulher, jovem&#10;&#10;Descrição gerada automaticamente">
             <a:extLst>
               <a:ext uri="{FF2B5EF4-FFF2-40B4-BE49-F238E27FC236}">
-                <a16:creationId xmlns:a16="http://schemas.microsoft.com/office/drawing/2014/main" id="{C1A98800-58DC-4483-87DF-2963DFDEA1E7}"/>
+                <a16:creationId xmlns:a16="http://schemas.microsoft.com/office/drawing/2014/main" xmlns="" id="{C1A98800-58DC-4483-87DF-2963DFDEA1E7}"/>
               </a:ext>
             </a:extLst>
           </p:cNvPr>
@@ -9890,7 +10293,7 @@
           <p:cNvPr id="4" name="Picture 2">
             <a:extLst>
               <a:ext uri="{FF2B5EF4-FFF2-40B4-BE49-F238E27FC236}">
-                <a16:creationId xmlns:a16="http://schemas.microsoft.com/office/drawing/2014/main" id="{81A7A57C-8BAD-40FC-9628-0A271DFBCD32}"/>
+                <a16:creationId xmlns:a16="http://schemas.microsoft.com/office/drawing/2014/main" xmlns="" id="{81A7A57C-8BAD-40FC-9628-0A271DFBCD32}"/>
               </a:ext>
             </a:extLst>
           </p:cNvPr>
@@ -9937,7 +10340,7 @@
           <p:cNvPr id="8" name="Título 1">
             <a:extLst>
               <a:ext uri="{FF2B5EF4-FFF2-40B4-BE49-F238E27FC236}">
-                <a16:creationId xmlns:a16="http://schemas.microsoft.com/office/drawing/2014/main" id="{D8EF5F0E-CD81-4152-8D0B-8902A213ECB2}"/>
+                <a16:creationId xmlns:a16="http://schemas.microsoft.com/office/drawing/2014/main" xmlns="" id="{D8EF5F0E-CD81-4152-8D0B-8902A213ECB2}"/>
               </a:ext>
             </a:extLst>
           </p:cNvPr>
@@ -10320,7 +10723,7 @@
           <p:cNvPr id="2" name="Straight Arrow Connector 1">
             <a:extLst>
               <a:ext uri="{FF2B5EF4-FFF2-40B4-BE49-F238E27FC236}">
-                <a16:creationId xmlns:a16="http://schemas.microsoft.com/office/drawing/2014/main" id="{E8D38C0A-F3C1-4051-ABE3-35FA8150390A}"/>
+                <a16:creationId xmlns:a16="http://schemas.microsoft.com/office/drawing/2014/main" xmlns="" id="{E8D38C0A-F3C1-4051-ABE3-35FA8150390A}"/>
               </a:ext>
             </a:extLst>
           </p:cNvPr>
@@ -10361,7 +10764,7 @@
           <p:cNvPr id="7" name="Título 1">
             <a:extLst>
               <a:ext uri="{FF2B5EF4-FFF2-40B4-BE49-F238E27FC236}">
-                <a16:creationId xmlns:a16="http://schemas.microsoft.com/office/drawing/2014/main" id="{99F76FBE-1BC2-4EE6-B90A-22263BF7BDCD}"/>
+                <a16:creationId xmlns:a16="http://schemas.microsoft.com/office/drawing/2014/main" xmlns="" id="{99F76FBE-1BC2-4EE6-B90A-22263BF7BDCD}"/>
               </a:ext>
             </a:extLst>
           </p:cNvPr>
@@ -10424,7 +10827,7 @@
           <p:cNvPr id="3" name="Imagem 2" descr="Uma imagem contendo mesa, atletismo&#10;&#10;Descrição gerada automaticamente">
             <a:extLst>
               <a:ext uri="{FF2B5EF4-FFF2-40B4-BE49-F238E27FC236}">
-                <a16:creationId xmlns:a16="http://schemas.microsoft.com/office/drawing/2014/main" id="{4F1DEA53-EAA9-41BE-AAAD-67147C20EFA3}"/>
+                <a16:creationId xmlns:a16="http://schemas.microsoft.com/office/drawing/2014/main" xmlns="" id="{4F1DEA53-EAA9-41BE-AAAD-67147C20EFA3}"/>
               </a:ext>
             </a:extLst>
           </p:cNvPr>
@@ -10460,7 +10863,7 @@
           <p:cNvPr id="4" name="Picture 2">
             <a:extLst>
               <a:ext uri="{FF2B5EF4-FFF2-40B4-BE49-F238E27FC236}">
-                <a16:creationId xmlns:a16="http://schemas.microsoft.com/office/drawing/2014/main" id="{D63799FE-FD58-46C7-8DD5-1902EEB7FE5C}"/>
+                <a16:creationId xmlns:a16="http://schemas.microsoft.com/office/drawing/2014/main" xmlns="" id="{D63799FE-FD58-46C7-8DD5-1902EEB7FE5C}"/>
               </a:ext>
             </a:extLst>
           </p:cNvPr>
@@ -10743,7 +11146,7 @@
           <p:cNvPr id="7" name="Título 1">
             <a:extLst>
               <a:ext uri="{FF2B5EF4-FFF2-40B4-BE49-F238E27FC236}">
-                <a16:creationId xmlns:a16="http://schemas.microsoft.com/office/drawing/2014/main" id="{99F76FBE-1BC2-4EE6-B90A-22263BF7BDCD}"/>
+                <a16:creationId xmlns:a16="http://schemas.microsoft.com/office/drawing/2014/main" xmlns="" id="{99F76FBE-1BC2-4EE6-B90A-22263BF7BDCD}"/>
               </a:ext>
             </a:extLst>
           </p:cNvPr>
@@ -10796,7 +11199,7 @@
                 </a:solidFill>
                 <a:latin typeface="Bariol Bold" panose="02000506040000020003" pitchFamily="2" charset="0"/>
               </a:rPr>
-              <a:t>LLD</a:t>
+              <a:t>HLD</a:t>
             </a:r>
           </a:p>
         </p:txBody>
@@ -10806,7 +11209,432 @@
           <p:cNvPr id="2" name="Straight Arrow Connector 1">
             <a:extLst>
               <a:ext uri="{FF2B5EF4-FFF2-40B4-BE49-F238E27FC236}">
-                <a16:creationId xmlns:a16="http://schemas.microsoft.com/office/drawing/2014/main" id="{8BC350D6-EEE4-4369-B0B7-E605D1C2FDBA}"/>
+                <a16:creationId xmlns:a16="http://schemas.microsoft.com/office/drawing/2014/main" xmlns="" id="{8BC350D6-EEE4-4369-B0B7-E605D1C2FDBA}"/>
+              </a:ext>
+            </a:extLst>
+          </p:cNvPr>
+          <p:cNvCxnSpPr>
+            <a:cxnSpLocks/>
+          </p:cNvCxnSpPr>
+          <p:nvPr/>
+        </p:nvCxnSpPr>
+        <p:spPr>
+          <a:xfrm>
+            <a:off x="5605670" y="766969"/>
+            <a:ext cx="1046921" cy="0"/>
+          </a:xfrm>
+          <a:prstGeom prst="straightConnector1">
+            <a:avLst/>
+          </a:prstGeom>
+          <a:ln>
+            <a:solidFill>
+              <a:srgbClr val="C00000"/>
+            </a:solidFill>
+          </a:ln>
+        </p:spPr>
+        <p:style>
+          <a:lnRef idx="3">
+            <a:schemeClr val="dk1"/>
+          </a:lnRef>
+          <a:fillRef idx="0">
+            <a:schemeClr val="dk1"/>
+          </a:fillRef>
+          <a:effectRef idx="2">
+            <a:schemeClr val="dk1"/>
+          </a:effectRef>
+          <a:fontRef idx="minor">
+            <a:schemeClr val="tx1"/>
+          </a:fontRef>
+        </p:style>
+      </p:cxnSp>
+      <p:pic>
+        <p:nvPicPr>
+          <p:cNvPr id="5" name="Imagem 4">
+            <a:extLst>
+              <a:ext uri="{FF2B5EF4-FFF2-40B4-BE49-F238E27FC236}">
+                <a16:creationId xmlns:a16="http://schemas.microsoft.com/office/drawing/2014/main" xmlns="" id="{F92141F6-050D-4FB0-8986-4F5D8D4F96B3}"/>
+              </a:ext>
+            </a:extLst>
+          </p:cNvPr>
+          <p:cNvPicPr>
+            <a:picLocks noChangeAspect="1"/>
+          </p:cNvPicPr>
+          <p:nvPr/>
+        </p:nvPicPr>
+        <p:blipFill>
+          <a:blip r:embed="rId2">
+            <a:extLst>
+              <a:ext uri="{28A0092B-C50C-407E-A947-70E740481C1C}">
+                <a14:useLocalDpi xmlns:a14="http://schemas.microsoft.com/office/drawing/2010/main" val="0"/>
+              </a:ext>
+            </a:extLst>
+          </a:blip>
+          <a:stretch>
+            <a:fillRect/>
+          </a:stretch>
+        </p:blipFill>
+        <p:spPr>
+          <a:xfrm>
+            <a:off x="1464365" y="1142120"/>
+            <a:ext cx="9329530" cy="5214506"/>
+          </a:xfrm>
+          <a:prstGeom prst="rect">
+            <a:avLst/>
+          </a:prstGeom>
+        </p:spPr>
+      </p:pic>
+      <p:pic>
+        <p:nvPicPr>
+          <p:cNvPr id="4" name="Picture 2">
+            <a:extLst>
+              <a:ext uri="{FF2B5EF4-FFF2-40B4-BE49-F238E27FC236}">
+                <a16:creationId xmlns:a16="http://schemas.microsoft.com/office/drawing/2014/main" xmlns="" id="{EF083EFE-E484-4847-A645-55EC0AADCCE5}"/>
+              </a:ext>
+            </a:extLst>
+          </p:cNvPr>
+          <p:cNvPicPr>
+            <a:picLocks noChangeAspect="1" noChangeArrowheads="1"/>
+          </p:cNvPicPr>
+          <p:nvPr/>
+        </p:nvPicPr>
+        <p:blipFill>
+          <a:blip r:embed="rId3" cstate="print">
+            <a:extLst>
+              <a:ext uri="{28A0092B-C50C-407E-A947-70E740481C1C}">
+                <a14:useLocalDpi xmlns:a14="http://schemas.microsoft.com/office/drawing/2010/main" val="0"/>
+              </a:ext>
+            </a:extLst>
+          </a:blip>
+          <a:srcRect/>
+          <a:stretch>
+            <a:fillRect/>
+          </a:stretch>
+        </p:blipFill>
+        <p:spPr bwMode="auto">
+          <a:xfrm>
+            <a:off x="10734262" y="6232246"/>
+            <a:ext cx="1143368" cy="473355"/>
+          </a:xfrm>
+          <a:prstGeom prst="rect">
+            <a:avLst/>
+          </a:prstGeom>
+          <a:noFill/>
+          <a:extLst>
+            <a:ext uri="{909E8E84-426E-40DD-AFC4-6F175D3DCCD1}">
+              <a14:hiddenFill xmlns:a14="http://schemas.microsoft.com/office/drawing/2010/main">
+                <a:solidFill>
+                  <a:srgbClr val="FFFFFF"/>
+                </a:solidFill>
+              </a14:hiddenFill>
+            </a:ext>
+          </a:extLst>
+        </p:spPr>
+      </p:pic>
+    </p:spTree>
+    <p:extLst>
+      <p:ext uri="{BB962C8B-B14F-4D97-AF65-F5344CB8AC3E}">
+        <p14:creationId xmlns:p14="http://schemas.microsoft.com/office/powerpoint/2010/main" val="2849501205"/>
+      </p:ext>
+    </p:extLst>
+  </p:cSld>
+  <p:clrMapOvr>
+    <a:masterClrMapping/>
+  </p:clrMapOvr>
+  <mc:AlternateContent xmlns:mc="http://schemas.openxmlformats.org/markup-compatibility/2006" xmlns:p14="http://schemas.microsoft.com/office/powerpoint/2010/main">
+    <mc:Choice Requires="p14">
+      <p:transition spd="med" p14:dur="700">
+        <p:fade/>
+      </p:transition>
+    </mc:Choice>
+    <mc:Fallback xmlns="">
+      <p:transition spd="med">
+        <p:fade/>
+      </p:transition>
+    </mc:Fallback>
+  </mc:AlternateContent>
+  <p:timing>
+    <p:tnLst>
+      <p:par>
+        <p:cTn id="1" dur="indefinite" restart="never" nodeType="tmRoot">
+          <p:childTnLst>
+            <p:seq concurrent="1" nextAc="seek">
+              <p:cTn id="2" dur="indefinite" nodeType="mainSeq">
+                <p:childTnLst>
+                  <p:par>
+                    <p:cTn id="3" fill="hold">
+                      <p:stCondLst>
+                        <p:cond delay="indefinite"/>
+                        <p:cond evt="onBegin" delay="0">
+                          <p:tn val="2"/>
+                        </p:cond>
+                      </p:stCondLst>
+                      <p:childTnLst>
+                        <p:par>
+                          <p:cTn id="4" fill="hold">
+                            <p:stCondLst>
+                              <p:cond delay="0"/>
+                            </p:stCondLst>
+                            <p:childTnLst>
+                              <p:par>
+                                <p:cTn id="5" presetID="10" presetClass="entr" presetSubtype="0" fill="hold" grpId="0" nodeType="afterEffect">
+                                  <p:stCondLst>
+                                    <p:cond delay="0"/>
+                                  </p:stCondLst>
+                                  <p:childTnLst>
+                                    <p:set>
+                                      <p:cBhvr>
+                                        <p:cTn id="6" dur="1" fill="hold">
+                                          <p:stCondLst>
+                                            <p:cond delay="0"/>
+                                          </p:stCondLst>
+                                        </p:cTn>
+                                        <p:tgtEl>
+                                          <p:spTgt spid="7"/>
+                                        </p:tgtEl>
+                                        <p:attrNameLst>
+                                          <p:attrName>style.visibility</p:attrName>
+                                        </p:attrNameLst>
+                                      </p:cBhvr>
+                                      <p:to>
+                                        <p:strVal val="visible"/>
+                                      </p:to>
+                                    </p:set>
+                                    <p:animEffect transition="in" filter="fade">
+                                      <p:cBhvr>
+                                        <p:cTn id="7" dur="500"/>
+                                        <p:tgtEl>
+                                          <p:spTgt spid="7"/>
+                                        </p:tgtEl>
+                                      </p:cBhvr>
+                                    </p:animEffect>
+                                  </p:childTnLst>
+                                </p:cTn>
+                              </p:par>
+                              <p:par>
+                                <p:cTn id="8" presetID="10" presetClass="entr" presetSubtype="0" fill="hold" nodeType="withEffect">
+                                  <p:stCondLst>
+                                    <p:cond delay="0"/>
+                                  </p:stCondLst>
+                                  <p:childTnLst>
+                                    <p:set>
+                                      <p:cBhvr>
+                                        <p:cTn id="9" dur="1" fill="hold">
+                                          <p:stCondLst>
+                                            <p:cond delay="0"/>
+                                          </p:stCondLst>
+                                        </p:cTn>
+                                        <p:tgtEl>
+                                          <p:spTgt spid="4"/>
+                                        </p:tgtEl>
+                                        <p:attrNameLst>
+                                          <p:attrName>style.visibility</p:attrName>
+                                        </p:attrNameLst>
+                                      </p:cBhvr>
+                                      <p:to>
+                                        <p:strVal val="visible"/>
+                                      </p:to>
+                                    </p:set>
+                                    <p:animEffect transition="in" filter="fade">
+                                      <p:cBhvr>
+                                        <p:cTn id="10" dur="500"/>
+                                        <p:tgtEl>
+                                          <p:spTgt spid="4"/>
+                                        </p:tgtEl>
+                                      </p:cBhvr>
+                                    </p:animEffect>
+                                  </p:childTnLst>
+                                </p:cTn>
+                              </p:par>
+                              <p:par>
+                                <p:cTn id="11" presetID="10" presetClass="entr" presetSubtype="0" fill="hold" nodeType="withEffect">
+                                  <p:stCondLst>
+                                    <p:cond delay="0"/>
+                                  </p:stCondLst>
+                                  <p:childTnLst>
+                                    <p:set>
+                                      <p:cBhvr>
+                                        <p:cTn id="12" dur="1" fill="hold">
+                                          <p:stCondLst>
+                                            <p:cond delay="0"/>
+                                          </p:stCondLst>
+                                        </p:cTn>
+                                        <p:tgtEl>
+                                          <p:spTgt spid="2"/>
+                                        </p:tgtEl>
+                                        <p:attrNameLst>
+                                          <p:attrName>style.visibility</p:attrName>
+                                        </p:attrNameLst>
+                                      </p:cBhvr>
+                                      <p:to>
+                                        <p:strVal val="visible"/>
+                                      </p:to>
+                                    </p:set>
+                                    <p:animEffect transition="in" filter="fade">
+                                      <p:cBhvr>
+                                        <p:cTn id="13" dur="500"/>
+                                        <p:tgtEl>
+                                          <p:spTgt spid="2"/>
+                                        </p:tgtEl>
+                                      </p:cBhvr>
+                                    </p:animEffect>
+                                  </p:childTnLst>
+                                </p:cTn>
+                              </p:par>
+                              <p:par>
+                                <p:cTn id="14" presetID="10" presetClass="entr" presetSubtype="0" fill="hold" nodeType="withEffect">
+                                  <p:stCondLst>
+                                    <p:cond delay="0"/>
+                                  </p:stCondLst>
+                                  <p:childTnLst>
+                                    <p:set>
+                                      <p:cBhvr>
+                                        <p:cTn id="15" dur="1" fill="hold">
+                                          <p:stCondLst>
+                                            <p:cond delay="0"/>
+                                          </p:stCondLst>
+                                        </p:cTn>
+                                        <p:tgtEl>
+                                          <p:spTgt spid="5"/>
+                                        </p:tgtEl>
+                                        <p:attrNameLst>
+                                          <p:attrName>style.visibility</p:attrName>
+                                        </p:attrNameLst>
+                                      </p:cBhvr>
+                                      <p:to>
+                                        <p:strVal val="visible"/>
+                                      </p:to>
+                                    </p:set>
+                                    <p:animEffect transition="in" filter="fade">
+                                      <p:cBhvr>
+                                        <p:cTn id="16" dur="500"/>
+                                        <p:tgtEl>
+                                          <p:spTgt spid="5"/>
+                                        </p:tgtEl>
+                                      </p:cBhvr>
+                                    </p:animEffect>
+                                  </p:childTnLst>
+                                </p:cTn>
+                              </p:par>
+                            </p:childTnLst>
+                          </p:cTn>
+                        </p:par>
+                      </p:childTnLst>
+                    </p:cTn>
+                  </p:par>
+                </p:childTnLst>
+              </p:cTn>
+              <p:prevCondLst>
+                <p:cond evt="onPrev" delay="0">
+                  <p:tgtEl>
+                    <p:sldTgt/>
+                  </p:tgtEl>
+                </p:cond>
+              </p:prevCondLst>
+              <p:nextCondLst>
+                <p:cond evt="onNext" delay="0">
+                  <p:tgtEl>
+                    <p:sldTgt/>
+                  </p:tgtEl>
+                </p:cond>
+              </p:nextCondLst>
+            </p:seq>
+          </p:childTnLst>
+        </p:cTn>
+      </p:par>
+    </p:tnLst>
+    <p:bldLst>
+      <p:bldP spid="7" grpId="0"/>
+    </p:bldLst>
+  </p:timing>
+</p:sld>
+</file>
+
+<file path=ppt/slides/slide8.xml><?xml version="1.0" encoding="utf-8"?>
+<p:sld xmlns:a="http://schemas.openxmlformats.org/drawingml/2006/main" xmlns:r="http://schemas.openxmlformats.org/officeDocument/2006/relationships" xmlns:p="http://schemas.openxmlformats.org/presentationml/2006/main">
+  <p:cSld>
+    <p:spTree>
+      <p:nvGrpSpPr>
+        <p:cNvPr id="1" name=""/>
+        <p:cNvGrpSpPr/>
+        <p:nvPr/>
+      </p:nvGrpSpPr>
+      <p:grpSpPr>
+        <a:xfrm>
+          <a:off x="0" y="0"/>
+          <a:ext cx="0" cy="0"/>
+          <a:chOff x="0" y="0"/>
+          <a:chExt cx="0" cy="0"/>
+        </a:xfrm>
+      </p:grpSpPr>
+      <p:sp>
+        <p:nvSpPr>
+          <p:cNvPr id="7" name="Título 1">
+            <a:extLst>
+              <a:ext uri="{FF2B5EF4-FFF2-40B4-BE49-F238E27FC236}">
+                <a16:creationId xmlns:a16="http://schemas.microsoft.com/office/drawing/2014/main" xmlns="" id="{99F76FBE-1BC2-4EE6-B90A-22263BF7BDCD}"/>
+              </a:ext>
+            </a:extLst>
+          </p:cNvPr>
+          <p:cNvSpPr txBox="1">
+            <a:spLocks/>
+          </p:cNvSpPr>
+          <p:nvPr/>
+        </p:nvSpPr>
+        <p:spPr>
+          <a:xfrm>
+            <a:off x="4162839" y="-183443"/>
+            <a:ext cx="3866322" cy="1325563"/>
+          </a:xfrm>
+          <a:prstGeom prst="rect">
+            <a:avLst/>
+          </a:prstGeom>
+        </p:spPr>
+        <p:txBody>
+          <a:bodyPr vert="horz" lIns="91440" tIns="45720" rIns="91440" bIns="45720" rtlCol="0" anchor="ctr">
+            <a:normAutofit/>
+          </a:bodyPr>
+          <a:lstStyle>
+            <a:lvl1pPr algn="l" defTabSz="914400" rtl="0" eaLnBrk="1" latinLnBrk="0" hangingPunct="1">
+              <a:lnSpc>
+                <a:spcPct val="90000"/>
+              </a:lnSpc>
+              <a:spcBef>
+                <a:spcPct val="0"/>
+              </a:spcBef>
+              <a:buNone/>
+              <a:defRPr sz="4400" kern="1200">
+                <a:solidFill>
+                  <a:schemeClr val="tx1"/>
+                </a:solidFill>
+                <a:latin typeface="+mj-lt"/>
+                <a:ea typeface="+mj-ea"/>
+                <a:cs typeface="+mj-cs"/>
+              </a:defRPr>
+            </a:lvl1pPr>
+          </a:lstStyle>
+          <a:p>
+            <a:pPr algn="ctr"/>
+            <a:r>
+              <a:rPr lang="pt-BR" dirty="0">
+                <a:solidFill>
+                  <a:schemeClr val="tx1">
+                    <a:lumMod val="75000"/>
+                    <a:lumOff val="25000"/>
+                  </a:schemeClr>
+                </a:solidFill>
+                <a:latin typeface="Bariol Bold" panose="02000506040000020003" pitchFamily="2" charset="0"/>
+              </a:rPr>
+              <a:t>LLD</a:t>
+            </a:r>
+          </a:p>
+        </p:txBody>
+      </p:sp>
+      <p:cxnSp>
+        <p:nvCxnSpPr>
+          <p:cNvPr id="2" name="Straight Arrow Connector 1">
+            <a:extLst>
+              <a:ext uri="{FF2B5EF4-FFF2-40B4-BE49-F238E27FC236}">
+                <a16:creationId xmlns:a16="http://schemas.microsoft.com/office/drawing/2014/main" xmlns="" id="{8BC350D6-EEE4-4369-B0B7-E605D1C2FDBA}"/>
               </a:ext>
             </a:extLst>
           </p:cNvPr>
@@ -10849,7 +11677,7 @@
           <p:cNvPr id="10" name="Imagem 9">
             <a:extLst>
               <a:ext uri="{FF2B5EF4-FFF2-40B4-BE49-F238E27FC236}">
-                <a16:creationId xmlns:a16="http://schemas.microsoft.com/office/drawing/2014/main" id="{65541928-1DD4-46FE-BA17-DB29347D81C5}"/>
+                <a16:creationId xmlns:a16="http://schemas.microsoft.com/office/drawing/2014/main" xmlns="" id="{65541928-1DD4-46FE-BA17-DB29347D81C5}"/>
               </a:ext>
             </a:extLst>
           </p:cNvPr>
@@ -10885,7 +11713,7 @@
           <p:cNvPr id="4" name="Picture 2">
             <a:extLst>
               <a:ext uri="{FF2B5EF4-FFF2-40B4-BE49-F238E27FC236}">
-                <a16:creationId xmlns:a16="http://schemas.microsoft.com/office/drawing/2014/main" id="{EF083EFE-E484-4847-A645-55EC0AADCCE5}"/>
+                <a16:creationId xmlns:a16="http://schemas.microsoft.com/office/drawing/2014/main" xmlns="" id="{EF083EFE-E484-4847-A645-55EC0AADCCE5}"/>
               </a:ext>
             </a:extLst>
           </p:cNvPr>
@@ -11146,431 +11974,6 @@
 </p:sld>
 </file>
 
-<file path=ppt/slides/slide8.xml><?xml version="1.0" encoding="utf-8"?>
-<p:sld xmlns:a="http://schemas.openxmlformats.org/drawingml/2006/main" xmlns:r="http://schemas.openxmlformats.org/officeDocument/2006/relationships" xmlns:p="http://schemas.openxmlformats.org/presentationml/2006/main">
-  <p:cSld>
-    <p:spTree>
-      <p:nvGrpSpPr>
-        <p:cNvPr id="1" name=""/>
-        <p:cNvGrpSpPr/>
-        <p:nvPr/>
-      </p:nvGrpSpPr>
-      <p:grpSpPr>
-        <a:xfrm>
-          <a:off x="0" y="0"/>
-          <a:ext cx="0" cy="0"/>
-          <a:chOff x="0" y="0"/>
-          <a:chExt cx="0" cy="0"/>
-        </a:xfrm>
-      </p:grpSpPr>
-      <p:sp>
-        <p:nvSpPr>
-          <p:cNvPr id="7" name="Título 1">
-            <a:extLst>
-              <a:ext uri="{FF2B5EF4-FFF2-40B4-BE49-F238E27FC236}">
-                <a16:creationId xmlns:a16="http://schemas.microsoft.com/office/drawing/2014/main" id="{99F76FBE-1BC2-4EE6-B90A-22263BF7BDCD}"/>
-              </a:ext>
-            </a:extLst>
-          </p:cNvPr>
-          <p:cNvSpPr txBox="1">
-            <a:spLocks/>
-          </p:cNvSpPr>
-          <p:nvPr/>
-        </p:nvSpPr>
-        <p:spPr>
-          <a:xfrm>
-            <a:off x="4162839" y="-183443"/>
-            <a:ext cx="3866322" cy="1325563"/>
-          </a:xfrm>
-          <a:prstGeom prst="rect">
-            <a:avLst/>
-          </a:prstGeom>
-        </p:spPr>
-        <p:txBody>
-          <a:bodyPr vert="horz" lIns="91440" tIns="45720" rIns="91440" bIns="45720" rtlCol="0" anchor="ctr">
-            <a:normAutofit/>
-          </a:bodyPr>
-          <a:lstStyle>
-            <a:lvl1pPr algn="l" defTabSz="914400" rtl="0" eaLnBrk="1" latinLnBrk="0" hangingPunct="1">
-              <a:lnSpc>
-                <a:spcPct val="90000"/>
-              </a:lnSpc>
-              <a:spcBef>
-                <a:spcPct val="0"/>
-              </a:spcBef>
-              <a:buNone/>
-              <a:defRPr sz="4400" kern="1200">
-                <a:solidFill>
-                  <a:schemeClr val="tx1"/>
-                </a:solidFill>
-                <a:latin typeface="+mj-lt"/>
-                <a:ea typeface="+mj-ea"/>
-                <a:cs typeface="+mj-cs"/>
-              </a:defRPr>
-            </a:lvl1pPr>
-          </a:lstStyle>
-          <a:p>
-            <a:pPr algn="ctr"/>
-            <a:r>
-              <a:rPr lang="pt-BR" dirty="0">
-                <a:solidFill>
-                  <a:schemeClr val="tx1">
-                    <a:lumMod val="75000"/>
-                    <a:lumOff val="25000"/>
-                  </a:schemeClr>
-                </a:solidFill>
-                <a:latin typeface="Bariol Bold" panose="02000506040000020003" pitchFamily="2" charset="0"/>
-              </a:rPr>
-              <a:t>HLD</a:t>
-            </a:r>
-          </a:p>
-        </p:txBody>
-      </p:sp>
-      <p:cxnSp>
-        <p:nvCxnSpPr>
-          <p:cNvPr id="2" name="Straight Arrow Connector 1">
-            <a:extLst>
-              <a:ext uri="{FF2B5EF4-FFF2-40B4-BE49-F238E27FC236}">
-                <a16:creationId xmlns:a16="http://schemas.microsoft.com/office/drawing/2014/main" id="{8BC350D6-EEE4-4369-B0B7-E605D1C2FDBA}"/>
-              </a:ext>
-            </a:extLst>
-          </p:cNvPr>
-          <p:cNvCxnSpPr>
-            <a:cxnSpLocks/>
-          </p:cNvCxnSpPr>
-          <p:nvPr/>
-        </p:nvCxnSpPr>
-        <p:spPr>
-          <a:xfrm>
-            <a:off x="5605670" y="766969"/>
-            <a:ext cx="1046921" cy="0"/>
-          </a:xfrm>
-          <a:prstGeom prst="straightConnector1">
-            <a:avLst/>
-          </a:prstGeom>
-          <a:ln>
-            <a:solidFill>
-              <a:srgbClr val="C00000"/>
-            </a:solidFill>
-          </a:ln>
-        </p:spPr>
-        <p:style>
-          <a:lnRef idx="3">
-            <a:schemeClr val="dk1"/>
-          </a:lnRef>
-          <a:fillRef idx="0">
-            <a:schemeClr val="dk1"/>
-          </a:fillRef>
-          <a:effectRef idx="2">
-            <a:schemeClr val="dk1"/>
-          </a:effectRef>
-          <a:fontRef idx="minor">
-            <a:schemeClr val="tx1"/>
-          </a:fontRef>
-        </p:style>
-      </p:cxnSp>
-      <p:pic>
-        <p:nvPicPr>
-          <p:cNvPr id="5" name="Imagem 4">
-            <a:extLst>
-              <a:ext uri="{FF2B5EF4-FFF2-40B4-BE49-F238E27FC236}">
-                <a16:creationId xmlns:a16="http://schemas.microsoft.com/office/drawing/2014/main" id="{F92141F6-050D-4FB0-8986-4F5D8D4F96B3}"/>
-              </a:ext>
-            </a:extLst>
-          </p:cNvPr>
-          <p:cNvPicPr>
-            <a:picLocks noChangeAspect="1"/>
-          </p:cNvPicPr>
-          <p:nvPr/>
-        </p:nvPicPr>
-        <p:blipFill>
-          <a:blip r:embed="rId2">
-            <a:extLst>
-              <a:ext uri="{28A0092B-C50C-407E-A947-70E740481C1C}">
-                <a14:useLocalDpi xmlns:a14="http://schemas.microsoft.com/office/drawing/2010/main" val="0"/>
-              </a:ext>
-            </a:extLst>
-          </a:blip>
-          <a:stretch>
-            <a:fillRect/>
-          </a:stretch>
-        </p:blipFill>
-        <p:spPr>
-          <a:xfrm>
-            <a:off x="1464365" y="1142120"/>
-            <a:ext cx="9329530" cy="5214506"/>
-          </a:xfrm>
-          <a:prstGeom prst="rect">
-            <a:avLst/>
-          </a:prstGeom>
-        </p:spPr>
-      </p:pic>
-      <p:pic>
-        <p:nvPicPr>
-          <p:cNvPr id="4" name="Picture 2">
-            <a:extLst>
-              <a:ext uri="{FF2B5EF4-FFF2-40B4-BE49-F238E27FC236}">
-                <a16:creationId xmlns:a16="http://schemas.microsoft.com/office/drawing/2014/main" id="{EF083EFE-E484-4847-A645-55EC0AADCCE5}"/>
-              </a:ext>
-            </a:extLst>
-          </p:cNvPr>
-          <p:cNvPicPr>
-            <a:picLocks noChangeAspect="1" noChangeArrowheads="1"/>
-          </p:cNvPicPr>
-          <p:nvPr/>
-        </p:nvPicPr>
-        <p:blipFill>
-          <a:blip r:embed="rId3" cstate="print">
-            <a:extLst>
-              <a:ext uri="{28A0092B-C50C-407E-A947-70E740481C1C}">
-                <a14:useLocalDpi xmlns:a14="http://schemas.microsoft.com/office/drawing/2010/main" val="0"/>
-              </a:ext>
-            </a:extLst>
-          </a:blip>
-          <a:srcRect/>
-          <a:stretch>
-            <a:fillRect/>
-          </a:stretch>
-        </p:blipFill>
-        <p:spPr bwMode="auto">
-          <a:xfrm>
-            <a:off x="10734262" y="6232246"/>
-            <a:ext cx="1143368" cy="473355"/>
-          </a:xfrm>
-          <a:prstGeom prst="rect">
-            <a:avLst/>
-          </a:prstGeom>
-          <a:noFill/>
-          <a:extLst>
-            <a:ext uri="{909E8E84-426E-40DD-AFC4-6F175D3DCCD1}">
-              <a14:hiddenFill xmlns:a14="http://schemas.microsoft.com/office/drawing/2010/main">
-                <a:solidFill>
-                  <a:srgbClr val="FFFFFF"/>
-                </a:solidFill>
-              </a14:hiddenFill>
-            </a:ext>
-          </a:extLst>
-        </p:spPr>
-      </p:pic>
-    </p:spTree>
-    <p:extLst>
-      <p:ext uri="{BB962C8B-B14F-4D97-AF65-F5344CB8AC3E}">
-        <p14:creationId xmlns:p14="http://schemas.microsoft.com/office/powerpoint/2010/main" val="2849501205"/>
-      </p:ext>
-    </p:extLst>
-  </p:cSld>
-  <p:clrMapOvr>
-    <a:masterClrMapping/>
-  </p:clrMapOvr>
-  <mc:AlternateContent xmlns:mc="http://schemas.openxmlformats.org/markup-compatibility/2006" xmlns:p14="http://schemas.microsoft.com/office/powerpoint/2010/main">
-    <mc:Choice Requires="p14">
-      <p:transition spd="med" p14:dur="700">
-        <p:fade/>
-      </p:transition>
-    </mc:Choice>
-    <mc:Fallback xmlns="">
-      <p:transition spd="med">
-        <p:fade/>
-      </p:transition>
-    </mc:Fallback>
-  </mc:AlternateContent>
-  <p:timing>
-    <p:tnLst>
-      <p:par>
-        <p:cTn id="1" dur="indefinite" restart="never" nodeType="tmRoot">
-          <p:childTnLst>
-            <p:seq concurrent="1" nextAc="seek">
-              <p:cTn id="2" dur="indefinite" nodeType="mainSeq">
-                <p:childTnLst>
-                  <p:par>
-                    <p:cTn id="3" fill="hold">
-                      <p:stCondLst>
-                        <p:cond delay="indefinite"/>
-                        <p:cond evt="onBegin" delay="0">
-                          <p:tn val="2"/>
-                        </p:cond>
-                      </p:stCondLst>
-                      <p:childTnLst>
-                        <p:par>
-                          <p:cTn id="4" fill="hold">
-                            <p:stCondLst>
-                              <p:cond delay="0"/>
-                            </p:stCondLst>
-                            <p:childTnLst>
-                              <p:par>
-                                <p:cTn id="5" presetID="10" presetClass="entr" presetSubtype="0" fill="hold" grpId="0" nodeType="afterEffect">
-                                  <p:stCondLst>
-                                    <p:cond delay="0"/>
-                                  </p:stCondLst>
-                                  <p:childTnLst>
-                                    <p:set>
-                                      <p:cBhvr>
-                                        <p:cTn id="6" dur="1" fill="hold">
-                                          <p:stCondLst>
-                                            <p:cond delay="0"/>
-                                          </p:stCondLst>
-                                        </p:cTn>
-                                        <p:tgtEl>
-                                          <p:spTgt spid="7"/>
-                                        </p:tgtEl>
-                                        <p:attrNameLst>
-                                          <p:attrName>style.visibility</p:attrName>
-                                        </p:attrNameLst>
-                                      </p:cBhvr>
-                                      <p:to>
-                                        <p:strVal val="visible"/>
-                                      </p:to>
-                                    </p:set>
-                                    <p:animEffect transition="in" filter="fade">
-                                      <p:cBhvr>
-                                        <p:cTn id="7" dur="500"/>
-                                        <p:tgtEl>
-                                          <p:spTgt spid="7"/>
-                                        </p:tgtEl>
-                                      </p:cBhvr>
-                                    </p:animEffect>
-                                  </p:childTnLst>
-                                </p:cTn>
-                              </p:par>
-                              <p:par>
-                                <p:cTn id="8" presetID="10" presetClass="entr" presetSubtype="0" fill="hold" nodeType="withEffect">
-                                  <p:stCondLst>
-                                    <p:cond delay="0"/>
-                                  </p:stCondLst>
-                                  <p:childTnLst>
-                                    <p:set>
-                                      <p:cBhvr>
-                                        <p:cTn id="9" dur="1" fill="hold">
-                                          <p:stCondLst>
-                                            <p:cond delay="0"/>
-                                          </p:stCondLst>
-                                        </p:cTn>
-                                        <p:tgtEl>
-                                          <p:spTgt spid="4"/>
-                                        </p:tgtEl>
-                                        <p:attrNameLst>
-                                          <p:attrName>style.visibility</p:attrName>
-                                        </p:attrNameLst>
-                                      </p:cBhvr>
-                                      <p:to>
-                                        <p:strVal val="visible"/>
-                                      </p:to>
-                                    </p:set>
-                                    <p:animEffect transition="in" filter="fade">
-                                      <p:cBhvr>
-                                        <p:cTn id="10" dur="500"/>
-                                        <p:tgtEl>
-                                          <p:spTgt spid="4"/>
-                                        </p:tgtEl>
-                                      </p:cBhvr>
-                                    </p:animEffect>
-                                  </p:childTnLst>
-                                </p:cTn>
-                              </p:par>
-                              <p:par>
-                                <p:cTn id="11" presetID="10" presetClass="entr" presetSubtype="0" fill="hold" nodeType="withEffect">
-                                  <p:stCondLst>
-                                    <p:cond delay="0"/>
-                                  </p:stCondLst>
-                                  <p:childTnLst>
-                                    <p:set>
-                                      <p:cBhvr>
-                                        <p:cTn id="12" dur="1" fill="hold">
-                                          <p:stCondLst>
-                                            <p:cond delay="0"/>
-                                          </p:stCondLst>
-                                        </p:cTn>
-                                        <p:tgtEl>
-                                          <p:spTgt spid="2"/>
-                                        </p:tgtEl>
-                                        <p:attrNameLst>
-                                          <p:attrName>style.visibility</p:attrName>
-                                        </p:attrNameLst>
-                                      </p:cBhvr>
-                                      <p:to>
-                                        <p:strVal val="visible"/>
-                                      </p:to>
-                                    </p:set>
-                                    <p:animEffect transition="in" filter="fade">
-                                      <p:cBhvr>
-                                        <p:cTn id="13" dur="500"/>
-                                        <p:tgtEl>
-                                          <p:spTgt spid="2"/>
-                                        </p:tgtEl>
-                                      </p:cBhvr>
-                                    </p:animEffect>
-                                  </p:childTnLst>
-                                </p:cTn>
-                              </p:par>
-                              <p:par>
-                                <p:cTn id="14" presetID="10" presetClass="entr" presetSubtype="0" fill="hold" nodeType="withEffect">
-                                  <p:stCondLst>
-                                    <p:cond delay="0"/>
-                                  </p:stCondLst>
-                                  <p:childTnLst>
-                                    <p:set>
-                                      <p:cBhvr>
-                                        <p:cTn id="15" dur="1" fill="hold">
-                                          <p:stCondLst>
-                                            <p:cond delay="0"/>
-                                          </p:stCondLst>
-                                        </p:cTn>
-                                        <p:tgtEl>
-                                          <p:spTgt spid="5"/>
-                                        </p:tgtEl>
-                                        <p:attrNameLst>
-                                          <p:attrName>style.visibility</p:attrName>
-                                        </p:attrNameLst>
-                                      </p:cBhvr>
-                                      <p:to>
-                                        <p:strVal val="visible"/>
-                                      </p:to>
-                                    </p:set>
-                                    <p:animEffect transition="in" filter="fade">
-                                      <p:cBhvr>
-                                        <p:cTn id="16" dur="500"/>
-                                        <p:tgtEl>
-                                          <p:spTgt spid="5"/>
-                                        </p:tgtEl>
-                                      </p:cBhvr>
-                                    </p:animEffect>
-                                  </p:childTnLst>
-                                </p:cTn>
-                              </p:par>
-                            </p:childTnLst>
-                          </p:cTn>
-                        </p:par>
-                      </p:childTnLst>
-                    </p:cTn>
-                  </p:par>
-                </p:childTnLst>
-              </p:cTn>
-              <p:prevCondLst>
-                <p:cond evt="onPrev" delay="0">
-                  <p:tgtEl>
-                    <p:sldTgt/>
-                  </p:tgtEl>
-                </p:cond>
-              </p:prevCondLst>
-              <p:nextCondLst>
-                <p:cond evt="onNext" delay="0">
-                  <p:tgtEl>
-                    <p:sldTgt/>
-                  </p:tgtEl>
-                </p:cond>
-              </p:nextCondLst>
-            </p:seq>
-          </p:childTnLst>
-        </p:cTn>
-      </p:par>
-    </p:tnLst>
-    <p:bldLst>
-      <p:bldP spid="7" grpId="0"/>
-    </p:bldLst>
-  </p:timing>
-</p:sld>
-</file>
-
 <file path=ppt/slides/slide9.xml><?xml version="1.0" encoding="utf-8"?>
 <p:sld xmlns:a="http://schemas.openxmlformats.org/drawingml/2006/main" xmlns:r="http://schemas.openxmlformats.org/officeDocument/2006/relationships" xmlns:p="http://schemas.openxmlformats.org/presentationml/2006/main">
   <p:cSld>
@@ -11593,7 +11996,7 @@
           <p:cNvPr id="7" name="Título 1">
             <a:extLst>
               <a:ext uri="{FF2B5EF4-FFF2-40B4-BE49-F238E27FC236}">
-                <a16:creationId xmlns:a16="http://schemas.microsoft.com/office/drawing/2014/main" id="{99F76FBE-1BC2-4EE6-B90A-22263BF7BDCD}"/>
+                <a16:creationId xmlns:a16="http://schemas.microsoft.com/office/drawing/2014/main" xmlns="" id="{99F76FBE-1BC2-4EE6-B90A-22263BF7BDCD}"/>
               </a:ext>
             </a:extLst>
           </p:cNvPr>
@@ -11656,7 +12059,7 @@
           <p:cNvPr id="5" name="Picture 2">
             <a:extLst>
               <a:ext uri="{FF2B5EF4-FFF2-40B4-BE49-F238E27FC236}">
-                <a16:creationId xmlns:a16="http://schemas.microsoft.com/office/drawing/2014/main" id="{5E6A065D-74B6-43C9-8951-4759FD99C85F}"/>
+                <a16:creationId xmlns:a16="http://schemas.microsoft.com/office/drawing/2014/main" xmlns="" id="{5E6A065D-74B6-43C9-8951-4759FD99C85F}"/>
               </a:ext>
             </a:extLst>
           </p:cNvPr>
@@ -11703,7 +12106,7 @@
           <p:cNvPr id="2" name="Straight Arrow Connector 1">
             <a:extLst>
               <a:ext uri="{FF2B5EF4-FFF2-40B4-BE49-F238E27FC236}">
-                <a16:creationId xmlns:a16="http://schemas.microsoft.com/office/drawing/2014/main" id="{102C7A15-5BE4-4E8E-826E-06C7E84CB27C}"/>
+                <a16:creationId xmlns:a16="http://schemas.microsoft.com/office/drawing/2014/main" xmlns="" id="{102C7A15-5BE4-4E8E-826E-06C7E84CB27C}"/>
               </a:ext>
             </a:extLst>
           </p:cNvPr>
@@ -11746,7 +12149,7 @@
           <p:cNvPr id="12" name="Imagem 11">
             <a:extLst>
               <a:ext uri="{FF2B5EF4-FFF2-40B4-BE49-F238E27FC236}">
-                <a16:creationId xmlns:a16="http://schemas.microsoft.com/office/drawing/2014/main" id="{A01150A3-5332-4792-A493-1C43638FC9F6}"/>
+                <a16:creationId xmlns:a16="http://schemas.microsoft.com/office/drawing/2014/main" xmlns="" id="{A01150A3-5332-4792-A493-1C43638FC9F6}"/>
               </a:ext>
             </a:extLst>
           </p:cNvPr>

</xml_diff>

<commit_message>
Slide 100 porcento atualizado telemon
</commit_message>
<xml_diff>
--- a/Documentação/slide v2.1.pptx
+++ b/Documentação/slide v2.1.pptx
@@ -2987,7 +2987,7 @@
           <p:cNvPr id="2" name="Rectangle: Rounded Corners 1">
             <a:extLst>
               <a:ext uri="{FF2B5EF4-FFF2-40B4-BE49-F238E27FC236}">
-                <a16:creationId xmlns:a16="http://schemas.microsoft.com/office/drawing/2014/main" xmlns="" id="{1678591B-5872-4D1A-943E-5BC3264C3CFB}"/>
+                <a16:creationId xmlns="" xmlns:a16="http://schemas.microsoft.com/office/drawing/2014/main" id="{1678591B-5872-4D1A-943E-5BC3264C3CFB}"/>
               </a:ext>
             </a:extLst>
           </p:cNvPr>
@@ -3041,7 +3041,7 @@
           <p:cNvPr id="2050" name="Picture 2">
             <a:extLst>
               <a:ext uri="{FF2B5EF4-FFF2-40B4-BE49-F238E27FC236}">
-                <a16:creationId xmlns:a16="http://schemas.microsoft.com/office/drawing/2014/main" xmlns="" id="{C727CAE5-80E2-41CE-B37E-BBFAE305DF84}"/>
+                <a16:creationId xmlns="" xmlns:a16="http://schemas.microsoft.com/office/drawing/2014/main" id="{C727CAE5-80E2-41CE-B37E-BBFAE305DF84}"/>
               </a:ext>
             </a:extLst>
           </p:cNvPr>
@@ -3088,7 +3088,7 @@
           <p:cNvPr id="4" name="Rectangle: Rounded Corners 3">
             <a:extLst>
               <a:ext uri="{FF2B5EF4-FFF2-40B4-BE49-F238E27FC236}">
-                <a16:creationId xmlns:a16="http://schemas.microsoft.com/office/drawing/2014/main" xmlns="" id="{C0D744C7-2B31-44CA-BA1F-D2700F2BF96D}"/>
+                <a16:creationId xmlns="" xmlns:a16="http://schemas.microsoft.com/office/drawing/2014/main" id="{C0D744C7-2B31-44CA-BA1F-D2700F2BF96D}"/>
               </a:ext>
             </a:extLst>
           </p:cNvPr>
@@ -3270,7 +3270,7 @@
           <p:cNvPr id="4" name="Straight Arrow Connector 3">
             <a:extLst>
               <a:ext uri="{FF2B5EF4-FFF2-40B4-BE49-F238E27FC236}">
-                <a16:creationId xmlns:a16="http://schemas.microsoft.com/office/drawing/2014/main" xmlns="" id="{2E47AAF4-0703-407A-9375-DE4A2497442E}"/>
+                <a16:creationId xmlns="" xmlns:a16="http://schemas.microsoft.com/office/drawing/2014/main" id="{2E47AAF4-0703-407A-9375-DE4A2497442E}"/>
               </a:ext>
             </a:extLst>
           </p:cNvPr>
@@ -3311,7 +3311,7 @@
           <p:cNvPr id="7" name="Título 1">
             <a:extLst>
               <a:ext uri="{FF2B5EF4-FFF2-40B4-BE49-F238E27FC236}">
-                <a16:creationId xmlns:a16="http://schemas.microsoft.com/office/drawing/2014/main" xmlns="" id="{99F76FBE-1BC2-4EE6-B90A-22263BF7BDCD}"/>
+                <a16:creationId xmlns="" xmlns:a16="http://schemas.microsoft.com/office/drawing/2014/main" id="{99F76FBE-1BC2-4EE6-B90A-22263BF7BDCD}"/>
               </a:ext>
             </a:extLst>
           </p:cNvPr>
@@ -3374,7 +3374,7 @@
           <p:cNvPr id="3" name="Picture 2">
             <a:extLst>
               <a:ext uri="{FF2B5EF4-FFF2-40B4-BE49-F238E27FC236}">
-                <a16:creationId xmlns:a16="http://schemas.microsoft.com/office/drawing/2014/main" xmlns="" id="{5C89B846-E8B4-41E5-A2FD-3C9F96F43158}"/>
+                <a16:creationId xmlns="" xmlns:a16="http://schemas.microsoft.com/office/drawing/2014/main" id="{5C89B846-E8B4-41E5-A2FD-3C9F96F43158}"/>
               </a:ext>
             </a:extLst>
           </p:cNvPr>
@@ -3421,7 +3421,7 @@
           <p:cNvPr id="5" name="Imagem 4" descr="Desenho de uma pessoa&#10;&#10;Descrição gerada automaticamente">
             <a:extLst>
               <a:ext uri="{FF2B5EF4-FFF2-40B4-BE49-F238E27FC236}">
-                <a16:creationId xmlns:a16="http://schemas.microsoft.com/office/drawing/2014/main" xmlns="" id="{65B6D792-5394-44C7-88F8-DC482A934804}"/>
+                <a16:creationId xmlns="" xmlns:a16="http://schemas.microsoft.com/office/drawing/2014/main" id="{65B6D792-5394-44C7-88F8-DC482A934804}"/>
               </a:ext>
             </a:extLst>
           </p:cNvPr>
@@ -3457,7 +3457,7 @@
           <p:cNvPr id="8" name="AutoShape 4">
             <a:extLst>
               <a:ext uri="{FF2B5EF4-FFF2-40B4-BE49-F238E27FC236}">
-                <a16:creationId xmlns:a16="http://schemas.microsoft.com/office/drawing/2014/main" xmlns="" id="{CBC49F37-024F-43BA-BF41-65835263DDCC}"/>
+                <a16:creationId xmlns="" xmlns:a16="http://schemas.microsoft.com/office/drawing/2014/main" id="{CBC49F37-024F-43BA-BF41-65835263DDCC}"/>
               </a:ext>
             </a:extLst>
           </p:cNvPr>
@@ -3502,7 +3502,7 @@
           <p:cNvPr id="10" name="Imagem 9" descr="Diagrama&#10;&#10;Descrição gerada automaticamente">
             <a:extLst>
               <a:ext uri="{FF2B5EF4-FFF2-40B4-BE49-F238E27FC236}">
-                <a16:creationId xmlns:a16="http://schemas.microsoft.com/office/drawing/2014/main" xmlns="" id="{EC31F9B0-BA3A-445B-901B-FC2332FEF663}"/>
+                <a16:creationId xmlns="" xmlns:a16="http://schemas.microsoft.com/office/drawing/2014/main" id="{EC31F9B0-BA3A-445B-901B-FC2332FEF663}"/>
               </a:ext>
             </a:extLst>
           </p:cNvPr>
@@ -3808,7 +3808,7 @@
           <p:cNvPr id="7" name="Título 1">
             <a:extLst>
               <a:ext uri="{FF2B5EF4-FFF2-40B4-BE49-F238E27FC236}">
-                <a16:creationId xmlns:a16="http://schemas.microsoft.com/office/drawing/2014/main" xmlns="" id="{99F76FBE-1BC2-4EE6-B90A-22263BF7BDCD}"/>
+                <a16:creationId xmlns="" xmlns:a16="http://schemas.microsoft.com/office/drawing/2014/main" id="{99F76FBE-1BC2-4EE6-B90A-22263BF7BDCD}"/>
               </a:ext>
             </a:extLst>
           </p:cNvPr>
@@ -3871,7 +3871,7 @@
           <p:cNvPr id="4" name="Picture 2">
             <a:extLst>
               <a:ext uri="{FF2B5EF4-FFF2-40B4-BE49-F238E27FC236}">
-                <a16:creationId xmlns:a16="http://schemas.microsoft.com/office/drawing/2014/main" xmlns="" id="{3CF36ED0-FCD8-45D8-A912-5D4DD5032DBE}"/>
+                <a16:creationId xmlns="" xmlns:a16="http://schemas.microsoft.com/office/drawing/2014/main" id="{3CF36ED0-FCD8-45D8-A912-5D4DD5032DBE}"/>
               </a:ext>
             </a:extLst>
           </p:cNvPr>
@@ -3918,7 +3918,7 @@
           <p:cNvPr id="2" name="Straight Arrow Connector 1">
             <a:extLst>
               <a:ext uri="{FF2B5EF4-FFF2-40B4-BE49-F238E27FC236}">
-                <a16:creationId xmlns:a16="http://schemas.microsoft.com/office/drawing/2014/main" xmlns="" id="{EF6676ED-9702-4820-B9D8-8B178C2BC9D8}"/>
+                <a16:creationId xmlns="" xmlns:a16="http://schemas.microsoft.com/office/drawing/2014/main" id="{EF6676ED-9702-4820-B9D8-8B178C2BC9D8}"/>
               </a:ext>
             </a:extLst>
           </p:cNvPr>
@@ -3959,7 +3959,7 @@
           <p:cNvPr id="19" name="Agrupar 18">
             <a:extLst>
               <a:ext uri="{FF2B5EF4-FFF2-40B4-BE49-F238E27FC236}">
-                <a16:creationId xmlns:a16="http://schemas.microsoft.com/office/drawing/2014/main" xmlns="" id="{84BF6789-3335-4920-AA85-D1861BE5B03E}"/>
+                <a16:creationId xmlns="" xmlns:a16="http://schemas.microsoft.com/office/drawing/2014/main" id="{84BF6789-3335-4920-AA85-D1861BE5B03E}"/>
               </a:ext>
             </a:extLst>
           </p:cNvPr>
@@ -3979,7 +3979,7 @@
             <p:cNvPr id="6" name="Google Shape;1752;p44">
               <a:extLst>
                 <a:ext uri="{FF2B5EF4-FFF2-40B4-BE49-F238E27FC236}">
-                  <a16:creationId xmlns:a16="http://schemas.microsoft.com/office/drawing/2014/main" xmlns="" id="{DB60E812-6938-4298-A78E-5CA545FDF3CB}"/>
+                  <a16:creationId xmlns="" xmlns:a16="http://schemas.microsoft.com/office/drawing/2014/main" id="{DB60E812-6938-4298-A78E-5CA545FDF3CB}"/>
                 </a:ext>
               </a:extLst>
             </p:cNvPr>
@@ -4005,7 +4005,7 @@
               <p:cNvPr id="8" name="Google Shape;1753;p44">
                 <a:extLst>
                   <a:ext uri="{FF2B5EF4-FFF2-40B4-BE49-F238E27FC236}">
-                    <a16:creationId xmlns:a16="http://schemas.microsoft.com/office/drawing/2014/main" xmlns="" id="{0DBB088E-379B-44B1-85B0-053B377E1558}"/>
+                    <a16:creationId xmlns="" xmlns:a16="http://schemas.microsoft.com/office/drawing/2014/main" id="{0DBB088E-379B-44B1-85B0-053B377E1558}"/>
                   </a:ext>
                 </a:extLst>
               </p:cNvPr>
@@ -4106,7 +4106,7 @@
               <p:cNvPr id="10" name="Google Shape;1754;p44">
                 <a:extLst>
                   <a:ext uri="{FF2B5EF4-FFF2-40B4-BE49-F238E27FC236}">
-                    <a16:creationId xmlns:a16="http://schemas.microsoft.com/office/drawing/2014/main" xmlns="" id="{3B04B96F-32C9-4ACA-B368-E0F84F216A79}"/>
+                    <a16:creationId xmlns="" xmlns:a16="http://schemas.microsoft.com/office/drawing/2014/main" id="{3B04B96F-32C9-4ACA-B368-E0F84F216A79}"/>
                   </a:ext>
                 </a:extLst>
               </p:cNvPr>
@@ -4192,7 +4192,7 @@
               <p:cNvPr id="11" name="Google Shape;1755;p44">
                 <a:extLst>
                   <a:ext uri="{FF2B5EF4-FFF2-40B4-BE49-F238E27FC236}">
-                    <a16:creationId xmlns:a16="http://schemas.microsoft.com/office/drawing/2014/main" xmlns="" id="{CF34BFC8-6B5D-4040-98EA-203295F3E25E}"/>
+                    <a16:creationId xmlns="" xmlns:a16="http://schemas.microsoft.com/office/drawing/2014/main" id="{CF34BFC8-6B5D-4040-98EA-203295F3E25E}"/>
                   </a:ext>
                 </a:extLst>
               </p:cNvPr>
@@ -4269,7 +4269,7 @@
             <p:cNvPr id="5" name="Imagem 4">
               <a:extLst>
                 <a:ext uri="{FF2B5EF4-FFF2-40B4-BE49-F238E27FC236}">
-                  <a16:creationId xmlns:a16="http://schemas.microsoft.com/office/drawing/2014/main" xmlns="" id="{760D5DD0-6CC9-481F-9766-56BD13589309}"/>
+                  <a16:creationId xmlns="" xmlns:a16="http://schemas.microsoft.com/office/drawing/2014/main" id="{760D5DD0-6CC9-481F-9766-56BD13589309}"/>
                 </a:ext>
               </a:extLst>
             </p:cNvPr>
@@ -4300,7 +4300,7 @@
           <p:cNvPr id="20" name="Agrupar 19">
             <a:extLst>
               <a:ext uri="{FF2B5EF4-FFF2-40B4-BE49-F238E27FC236}">
-                <a16:creationId xmlns:a16="http://schemas.microsoft.com/office/drawing/2014/main" xmlns="" id="{91CE4868-6806-4F0D-AD70-2D78D9090FA8}"/>
+                <a16:creationId xmlns="" xmlns:a16="http://schemas.microsoft.com/office/drawing/2014/main" id="{91CE4868-6806-4F0D-AD70-2D78D9090FA8}"/>
               </a:ext>
             </a:extLst>
           </p:cNvPr>
@@ -4320,7 +4320,7 @@
             <p:cNvPr id="13" name="Google Shape;1592;p73">
               <a:extLst>
                 <a:ext uri="{FF2B5EF4-FFF2-40B4-BE49-F238E27FC236}">
-                  <a16:creationId xmlns:a16="http://schemas.microsoft.com/office/drawing/2014/main" xmlns="" id="{9D82DDB8-54A1-4DD7-9030-06F75FEFFD86}"/>
+                  <a16:creationId xmlns="" xmlns:a16="http://schemas.microsoft.com/office/drawing/2014/main" id="{9D82DDB8-54A1-4DD7-9030-06F75FEFFD86}"/>
                 </a:ext>
               </a:extLst>
             </p:cNvPr>
@@ -4410,7 +4410,7 @@
             <p:cNvPr id="15" name="Imagem 14">
               <a:extLst>
                 <a:ext uri="{FF2B5EF4-FFF2-40B4-BE49-F238E27FC236}">
-                  <a16:creationId xmlns:a16="http://schemas.microsoft.com/office/drawing/2014/main" xmlns="" id="{3F367BA2-89AF-4926-8925-741DC524A38E}"/>
+                  <a16:creationId xmlns="" xmlns:a16="http://schemas.microsoft.com/office/drawing/2014/main" id="{3F367BA2-89AF-4926-8925-741DC524A38E}"/>
                 </a:ext>
               </a:extLst>
             </p:cNvPr>
@@ -4440,7 +4440,7 @@
           <p:cNvPr id="23" name="Agrupar 22">
             <a:extLst>
               <a:ext uri="{FF2B5EF4-FFF2-40B4-BE49-F238E27FC236}">
-                <a16:creationId xmlns:a16="http://schemas.microsoft.com/office/drawing/2014/main" xmlns="" id="{7E13A691-743F-4036-8B2B-FA415A2786A6}"/>
+                <a16:creationId xmlns="" xmlns:a16="http://schemas.microsoft.com/office/drawing/2014/main" id="{7E13A691-743F-4036-8B2B-FA415A2786A6}"/>
               </a:ext>
             </a:extLst>
           </p:cNvPr>
@@ -4460,7 +4460,7 @@
             <p:cNvPr id="16" name="Google Shape;1634;p74">
               <a:extLst>
                 <a:ext uri="{FF2B5EF4-FFF2-40B4-BE49-F238E27FC236}">
-                  <a16:creationId xmlns:a16="http://schemas.microsoft.com/office/drawing/2014/main" xmlns="" id="{8013B569-1E04-4E77-BAB8-7D2458AFDE47}"/>
+                  <a16:creationId xmlns="" xmlns:a16="http://schemas.microsoft.com/office/drawing/2014/main" id="{8013B569-1E04-4E77-BAB8-7D2458AFDE47}"/>
                 </a:ext>
               </a:extLst>
             </p:cNvPr>
@@ -4480,7 +4480,7 @@
               <p:cNvPr id="17" name="Google Shape;1635;p74">
                 <a:extLst>
                   <a:ext uri="{FF2B5EF4-FFF2-40B4-BE49-F238E27FC236}">
-                    <a16:creationId xmlns:a16="http://schemas.microsoft.com/office/drawing/2014/main" xmlns="" id="{8872BE14-B3C6-4215-AEB3-09725A52F24B}"/>
+                    <a16:creationId xmlns="" xmlns:a16="http://schemas.microsoft.com/office/drawing/2014/main" id="{8872BE14-B3C6-4215-AEB3-09725A52F24B}"/>
                   </a:ext>
                 </a:extLst>
               </p:cNvPr>
@@ -4570,7 +4570,7 @@
               <p:cNvPr id="18" name="Google Shape;1636;p74">
                 <a:extLst>
                   <a:ext uri="{FF2B5EF4-FFF2-40B4-BE49-F238E27FC236}">
-                    <a16:creationId xmlns:a16="http://schemas.microsoft.com/office/drawing/2014/main" xmlns="" id="{9B8CC2B5-5256-4C0B-9076-F8772294115C}"/>
+                    <a16:creationId xmlns="" xmlns:a16="http://schemas.microsoft.com/office/drawing/2014/main" id="{9B8CC2B5-5256-4C0B-9076-F8772294115C}"/>
                   </a:ext>
                 </a:extLst>
               </p:cNvPr>
@@ -4649,7 +4649,7 @@
             <p:cNvPr id="22" name="Imagem 21">
               <a:extLst>
                 <a:ext uri="{FF2B5EF4-FFF2-40B4-BE49-F238E27FC236}">
-                  <a16:creationId xmlns:a16="http://schemas.microsoft.com/office/drawing/2014/main" xmlns="" id="{4DE0FC26-C0D0-4230-84C8-5188379905E2}"/>
+                  <a16:creationId xmlns="" xmlns:a16="http://schemas.microsoft.com/office/drawing/2014/main" id="{4DE0FC26-C0D0-4230-84C8-5188379905E2}"/>
                 </a:ext>
               </a:extLst>
             </p:cNvPr>
@@ -4680,7 +4680,7 @@
           <p:cNvPr id="2050" name="Picture 2" descr="Useful sites for Learning HTML/CSS/Javacript – Sriki's Stack">
             <a:extLst>
               <a:ext uri="{FF2B5EF4-FFF2-40B4-BE49-F238E27FC236}">
-                <a16:creationId xmlns:a16="http://schemas.microsoft.com/office/drawing/2014/main" xmlns="" id="{F4798657-4CCC-4049-9AC1-551FB4D36DE7}"/>
+                <a16:creationId xmlns="" xmlns:a16="http://schemas.microsoft.com/office/drawing/2014/main" id="{F4798657-4CCC-4049-9AC1-551FB4D36DE7}"/>
               </a:ext>
             </a:extLst>
           </p:cNvPr>
@@ -4727,7 +4727,7 @@
           <p:cNvPr id="2052" name="Picture 4" descr="Bootstrap (and CSS) Useful Tips. I've been on some project in which I… | by  Fatah Nur Alam Majid | Medium">
             <a:extLst>
               <a:ext uri="{FF2B5EF4-FFF2-40B4-BE49-F238E27FC236}">
-                <a16:creationId xmlns:a16="http://schemas.microsoft.com/office/drawing/2014/main" xmlns="" id="{9EDFA597-D68D-47F3-BD54-A81339D58AA7}"/>
+                <a16:creationId xmlns="" xmlns:a16="http://schemas.microsoft.com/office/drawing/2014/main" id="{9EDFA597-D68D-47F3-BD54-A81339D58AA7}"/>
               </a:ext>
             </a:extLst>
           </p:cNvPr>
@@ -5150,7 +5150,7 @@
           <p:cNvPr id="7" name="Título 1">
             <a:extLst>
               <a:ext uri="{FF2B5EF4-FFF2-40B4-BE49-F238E27FC236}">
-                <a16:creationId xmlns:a16="http://schemas.microsoft.com/office/drawing/2014/main" xmlns="" id="{99F76FBE-1BC2-4EE6-B90A-22263BF7BDCD}"/>
+                <a16:creationId xmlns="" xmlns:a16="http://schemas.microsoft.com/office/drawing/2014/main" id="{99F76FBE-1BC2-4EE6-B90A-22263BF7BDCD}"/>
               </a:ext>
             </a:extLst>
           </p:cNvPr>
@@ -5213,7 +5213,7 @@
           <p:cNvPr id="4" name="Picture 2">
             <a:extLst>
               <a:ext uri="{FF2B5EF4-FFF2-40B4-BE49-F238E27FC236}">
-                <a16:creationId xmlns:a16="http://schemas.microsoft.com/office/drawing/2014/main" xmlns="" id="{3CF36ED0-FCD8-45D8-A912-5D4DD5032DBE}"/>
+                <a16:creationId xmlns="" xmlns:a16="http://schemas.microsoft.com/office/drawing/2014/main" id="{3CF36ED0-FCD8-45D8-A912-5D4DD5032DBE}"/>
               </a:ext>
             </a:extLst>
           </p:cNvPr>
@@ -5260,7 +5260,7 @@
           <p:cNvPr id="2" name="Straight Arrow Connector 1">
             <a:extLst>
               <a:ext uri="{FF2B5EF4-FFF2-40B4-BE49-F238E27FC236}">
-                <a16:creationId xmlns:a16="http://schemas.microsoft.com/office/drawing/2014/main" xmlns="" id="{EF6676ED-9702-4820-B9D8-8B178C2BC9D8}"/>
+                <a16:creationId xmlns="" xmlns:a16="http://schemas.microsoft.com/office/drawing/2014/main" id="{EF6676ED-9702-4820-B9D8-8B178C2BC9D8}"/>
               </a:ext>
             </a:extLst>
           </p:cNvPr>
@@ -5303,7 +5303,7 @@
           <p:cNvPr id="8" name="Google Shape;2568;p50">
             <a:extLst>
               <a:ext uri="{FF2B5EF4-FFF2-40B4-BE49-F238E27FC236}">
-                <a16:creationId xmlns:a16="http://schemas.microsoft.com/office/drawing/2014/main" xmlns="" id="{44646ED0-70CF-4F53-BCA6-F864DC8D8CE7}"/>
+                <a16:creationId xmlns="" xmlns:a16="http://schemas.microsoft.com/office/drawing/2014/main" id="{44646ED0-70CF-4F53-BCA6-F864DC8D8CE7}"/>
               </a:ext>
             </a:extLst>
           </p:cNvPr>
@@ -5323,7 +5323,7 @@
             <p:cNvPr id="9" name="Google Shape;2569;p50">
               <a:extLst>
                 <a:ext uri="{FF2B5EF4-FFF2-40B4-BE49-F238E27FC236}">
-                  <a16:creationId xmlns:a16="http://schemas.microsoft.com/office/drawing/2014/main" xmlns="" id="{FB65BD16-0480-48B4-9C70-4F7B1C20B16C}"/>
+                  <a16:creationId xmlns="" xmlns:a16="http://schemas.microsoft.com/office/drawing/2014/main" id="{FB65BD16-0480-48B4-9C70-4F7B1C20B16C}"/>
                 </a:ext>
               </a:extLst>
             </p:cNvPr>
@@ -5410,7 +5410,7 @@
             <p:cNvPr id="10" name="Google Shape;2570;p50">
               <a:extLst>
                 <a:ext uri="{FF2B5EF4-FFF2-40B4-BE49-F238E27FC236}">
-                  <a16:creationId xmlns:a16="http://schemas.microsoft.com/office/drawing/2014/main" xmlns="" id="{12A45219-8D11-4C29-9591-30268EABA08C}"/>
+                  <a16:creationId xmlns="" xmlns:a16="http://schemas.microsoft.com/office/drawing/2014/main" id="{12A45219-8D11-4C29-9591-30268EABA08C}"/>
                 </a:ext>
               </a:extLst>
             </p:cNvPr>
@@ -5487,7 +5487,7 @@
             <p:cNvPr id="11" name="Google Shape;2571;p50">
               <a:extLst>
                 <a:ext uri="{FF2B5EF4-FFF2-40B4-BE49-F238E27FC236}">
-                  <a16:creationId xmlns:a16="http://schemas.microsoft.com/office/drawing/2014/main" xmlns="" id="{F59228A5-A741-4378-BE36-B7E19A2718D5}"/>
+                  <a16:creationId xmlns="" xmlns:a16="http://schemas.microsoft.com/office/drawing/2014/main" id="{F59228A5-A741-4378-BE36-B7E19A2718D5}"/>
                 </a:ext>
               </a:extLst>
             </p:cNvPr>
@@ -5554,7 +5554,7 @@
             <p:cNvPr id="12" name="Google Shape;2572;p50">
               <a:extLst>
                 <a:ext uri="{FF2B5EF4-FFF2-40B4-BE49-F238E27FC236}">
-                  <a16:creationId xmlns:a16="http://schemas.microsoft.com/office/drawing/2014/main" xmlns="" id="{BD730A34-147B-4163-9308-7D0D671AD525}"/>
+                  <a16:creationId xmlns="" xmlns:a16="http://schemas.microsoft.com/office/drawing/2014/main" id="{BD730A34-147B-4163-9308-7D0D671AD525}"/>
                 </a:ext>
               </a:extLst>
             </p:cNvPr>
@@ -5617,6 +5617,30 @@
           </p:txBody>
         </p:sp>
       </p:grpSp>
+      <p:pic>
+        <p:nvPicPr>
+          <p:cNvPr id="3" name="Imagem 2"/>
+          <p:cNvPicPr>
+            <a:picLocks noChangeAspect="1"/>
+          </p:cNvPicPr>
+          <p:nvPr/>
+        </p:nvPicPr>
+        <p:blipFill>
+          <a:blip r:embed="rId3"/>
+          <a:stretch>
+            <a:fillRect/>
+          </a:stretch>
+        </p:blipFill>
+        <p:spPr>
+          <a:xfrm>
+            <a:off x="2296732" y="1311469"/>
+            <a:ext cx="7598536" cy="4555222"/>
+          </a:xfrm>
+          <a:prstGeom prst="rect">
+            <a:avLst/>
+          </a:prstGeom>
+        </p:spPr>
+      </p:pic>
     </p:spTree>
     <p:extLst>
       <p:ext uri="{BB962C8B-B14F-4D97-AF65-F5344CB8AC3E}">
@@ -5858,7 +5882,7 @@
           <p:cNvPr id="7" name="Título 1">
             <a:extLst>
               <a:ext uri="{FF2B5EF4-FFF2-40B4-BE49-F238E27FC236}">
-                <a16:creationId xmlns:a16="http://schemas.microsoft.com/office/drawing/2014/main" xmlns="" id="{99F76FBE-1BC2-4EE6-B90A-22263BF7BDCD}"/>
+                <a16:creationId xmlns="" xmlns:a16="http://schemas.microsoft.com/office/drawing/2014/main" id="{99F76FBE-1BC2-4EE6-B90A-22263BF7BDCD}"/>
               </a:ext>
             </a:extLst>
           </p:cNvPr>
@@ -5930,7 +5954,7 @@
           <p:cNvPr id="4" name="Picture 2">
             <a:extLst>
               <a:ext uri="{FF2B5EF4-FFF2-40B4-BE49-F238E27FC236}">
-                <a16:creationId xmlns:a16="http://schemas.microsoft.com/office/drawing/2014/main" xmlns="" id="{3CF36ED0-FCD8-45D8-A912-5D4DD5032DBE}"/>
+                <a16:creationId xmlns="" xmlns:a16="http://schemas.microsoft.com/office/drawing/2014/main" id="{3CF36ED0-FCD8-45D8-A912-5D4DD5032DBE}"/>
               </a:ext>
             </a:extLst>
           </p:cNvPr>
@@ -5977,7 +6001,7 @@
           <p:cNvPr id="2" name="Straight Arrow Connector 1">
             <a:extLst>
               <a:ext uri="{FF2B5EF4-FFF2-40B4-BE49-F238E27FC236}">
-                <a16:creationId xmlns:a16="http://schemas.microsoft.com/office/drawing/2014/main" xmlns="" id="{EF6676ED-9702-4820-B9D8-8B178C2BC9D8}"/>
+                <a16:creationId xmlns="" xmlns:a16="http://schemas.microsoft.com/office/drawing/2014/main" id="{EF6676ED-9702-4820-B9D8-8B178C2BC9D8}"/>
               </a:ext>
             </a:extLst>
           </p:cNvPr>
@@ -6245,7 +6269,7 @@
           <p:cNvPr id="7" name="Título 1">
             <a:extLst>
               <a:ext uri="{FF2B5EF4-FFF2-40B4-BE49-F238E27FC236}">
-                <a16:creationId xmlns:a16="http://schemas.microsoft.com/office/drawing/2014/main" xmlns="" id="{99F76FBE-1BC2-4EE6-B90A-22263BF7BDCD}"/>
+                <a16:creationId xmlns="" xmlns:a16="http://schemas.microsoft.com/office/drawing/2014/main" id="{99F76FBE-1BC2-4EE6-B90A-22263BF7BDCD}"/>
               </a:ext>
             </a:extLst>
           </p:cNvPr>
@@ -6308,7 +6332,7 @@
           <p:cNvPr id="3" name="Picture 2">
             <a:extLst>
               <a:ext uri="{FF2B5EF4-FFF2-40B4-BE49-F238E27FC236}">
-                <a16:creationId xmlns:a16="http://schemas.microsoft.com/office/drawing/2014/main" xmlns="" id="{A9070500-5C9F-415F-8DFF-FBCAA846F638}"/>
+                <a16:creationId xmlns="" xmlns:a16="http://schemas.microsoft.com/office/drawing/2014/main" id="{A9070500-5C9F-415F-8DFF-FBCAA846F638}"/>
               </a:ext>
             </a:extLst>
           </p:cNvPr>
@@ -6355,7 +6379,7 @@
           <p:cNvPr id="2" name="Straight Arrow Connector 1">
             <a:extLst>
               <a:ext uri="{FF2B5EF4-FFF2-40B4-BE49-F238E27FC236}">
-                <a16:creationId xmlns:a16="http://schemas.microsoft.com/office/drawing/2014/main" xmlns="" id="{4E523067-FB64-412F-AE09-1E914EEC9A82}"/>
+                <a16:creationId xmlns="" xmlns:a16="http://schemas.microsoft.com/office/drawing/2014/main" id="{4E523067-FB64-412F-AE09-1E914EEC9A82}"/>
               </a:ext>
             </a:extLst>
           </p:cNvPr>
@@ -6398,7 +6422,7 @@
           <p:cNvPr id="9" name="Imagem 8">
             <a:extLst>
               <a:ext uri="{FF2B5EF4-FFF2-40B4-BE49-F238E27FC236}">
-                <a16:creationId xmlns:a16="http://schemas.microsoft.com/office/drawing/2014/main" xmlns="" id="{814E4E03-513D-4D7F-B842-33DE1E24CA83}"/>
+                <a16:creationId xmlns="" xmlns:a16="http://schemas.microsoft.com/office/drawing/2014/main" id="{814E4E03-513D-4D7F-B842-33DE1E24CA83}"/>
               </a:ext>
             </a:extLst>
           </p:cNvPr>
@@ -6670,7 +6694,7 @@
           <p:cNvPr id="7" name="Título 1">
             <a:extLst>
               <a:ext uri="{FF2B5EF4-FFF2-40B4-BE49-F238E27FC236}">
-                <a16:creationId xmlns:a16="http://schemas.microsoft.com/office/drawing/2014/main" xmlns="" id="{99F76FBE-1BC2-4EE6-B90A-22263BF7BDCD}"/>
+                <a16:creationId xmlns="" xmlns:a16="http://schemas.microsoft.com/office/drawing/2014/main" id="{99F76FBE-1BC2-4EE6-B90A-22263BF7BDCD}"/>
               </a:ext>
             </a:extLst>
           </p:cNvPr>
@@ -6733,7 +6757,7 @@
           <p:cNvPr id="3" name="Imagem 2" descr="Desenho de uma pessoa&#10;&#10;Descrição gerada automaticamente">
             <a:extLst>
               <a:ext uri="{FF2B5EF4-FFF2-40B4-BE49-F238E27FC236}">
-                <a16:creationId xmlns:a16="http://schemas.microsoft.com/office/drawing/2014/main" xmlns="" id="{ED02D286-F5A0-4509-8E48-BFA54F34D076}"/>
+                <a16:creationId xmlns="" xmlns:a16="http://schemas.microsoft.com/office/drawing/2014/main" id="{ED02D286-F5A0-4509-8E48-BFA54F34D076}"/>
               </a:ext>
             </a:extLst>
           </p:cNvPr>
@@ -6769,7 +6793,7 @@
           <p:cNvPr id="4" name="Picture 2">
             <a:extLst>
               <a:ext uri="{FF2B5EF4-FFF2-40B4-BE49-F238E27FC236}">
-                <a16:creationId xmlns:a16="http://schemas.microsoft.com/office/drawing/2014/main" xmlns="" id="{CDDD861E-3766-442F-8F52-68E1AE2C3753}"/>
+                <a16:creationId xmlns="" xmlns:a16="http://schemas.microsoft.com/office/drawing/2014/main" id="{CDDD861E-3766-442F-8F52-68E1AE2C3753}"/>
               </a:ext>
             </a:extLst>
           </p:cNvPr>
@@ -6816,7 +6840,7 @@
           <p:cNvPr id="2" name="Straight Arrow Connector 1">
             <a:extLst>
               <a:ext uri="{FF2B5EF4-FFF2-40B4-BE49-F238E27FC236}">
-                <a16:creationId xmlns:a16="http://schemas.microsoft.com/office/drawing/2014/main" xmlns="" id="{825D95E1-8250-4172-ABA3-976541C2807C}"/>
+                <a16:creationId xmlns="" xmlns:a16="http://schemas.microsoft.com/office/drawing/2014/main" id="{825D95E1-8250-4172-ABA3-976541C2807C}"/>
               </a:ext>
             </a:extLst>
           </p:cNvPr>
@@ -7093,7 +7117,7 @@
           <p:cNvPr id="7" name="Título 1">
             <a:extLst>
               <a:ext uri="{FF2B5EF4-FFF2-40B4-BE49-F238E27FC236}">
-                <a16:creationId xmlns:a16="http://schemas.microsoft.com/office/drawing/2014/main" xmlns="" id="{99F76FBE-1BC2-4EE6-B90A-22263BF7BDCD}"/>
+                <a16:creationId xmlns="" xmlns:a16="http://schemas.microsoft.com/office/drawing/2014/main" id="{99F76FBE-1BC2-4EE6-B90A-22263BF7BDCD}"/>
               </a:ext>
             </a:extLst>
           </p:cNvPr>
@@ -7156,7 +7180,7 @@
           <p:cNvPr id="3" name="Picture 2">
             <a:extLst>
               <a:ext uri="{FF2B5EF4-FFF2-40B4-BE49-F238E27FC236}">
-                <a16:creationId xmlns:a16="http://schemas.microsoft.com/office/drawing/2014/main" xmlns="" id="{A5E95E14-1174-4815-814A-3FB16E71EF46}"/>
+                <a16:creationId xmlns="" xmlns:a16="http://schemas.microsoft.com/office/drawing/2014/main" id="{A5E95E14-1174-4815-814A-3FB16E71EF46}"/>
               </a:ext>
             </a:extLst>
           </p:cNvPr>
@@ -7203,7 +7227,7 @@
           <p:cNvPr id="4" name="Imagem 3" descr="Uma imagem contendo homem, atletismo, mulher, segurando&#10;&#10;Descrição gerada automaticamente">
             <a:extLst>
               <a:ext uri="{FF2B5EF4-FFF2-40B4-BE49-F238E27FC236}">
-                <a16:creationId xmlns:a16="http://schemas.microsoft.com/office/drawing/2014/main" xmlns="" id="{8C7F91F0-DCD8-4436-A809-E9763D748E22}"/>
+                <a16:creationId xmlns="" xmlns:a16="http://schemas.microsoft.com/office/drawing/2014/main" id="{8C7F91F0-DCD8-4436-A809-E9763D748E22}"/>
               </a:ext>
             </a:extLst>
           </p:cNvPr>
@@ -7239,7 +7263,7 @@
           <p:cNvPr id="6" name="Straight Arrow Connector 1">
             <a:extLst>
               <a:ext uri="{FF2B5EF4-FFF2-40B4-BE49-F238E27FC236}">
-                <a16:creationId xmlns:a16="http://schemas.microsoft.com/office/drawing/2014/main" xmlns="" id="{EF317FC1-ACAE-4693-9AF7-C538ED9B538A}"/>
+                <a16:creationId xmlns="" xmlns:a16="http://schemas.microsoft.com/office/drawing/2014/main" id="{EF317FC1-ACAE-4693-9AF7-C538ED9B538A}"/>
               </a:ext>
             </a:extLst>
           </p:cNvPr>
@@ -7516,7 +7540,7 @@
           <p:cNvPr id="3" name="Straight Arrow Connector 2">
             <a:extLst>
               <a:ext uri="{FF2B5EF4-FFF2-40B4-BE49-F238E27FC236}">
-                <a16:creationId xmlns:a16="http://schemas.microsoft.com/office/drawing/2014/main" xmlns="" id="{238B6891-9D9A-4548-BDE4-47054128BA41}"/>
+                <a16:creationId xmlns="" xmlns:a16="http://schemas.microsoft.com/office/drawing/2014/main" id="{238B6891-9D9A-4548-BDE4-47054128BA41}"/>
               </a:ext>
             </a:extLst>
           </p:cNvPr>
@@ -7557,7 +7581,7 @@
           <p:cNvPr id="7" name="Título 1">
             <a:extLst>
               <a:ext uri="{FF2B5EF4-FFF2-40B4-BE49-F238E27FC236}">
-                <a16:creationId xmlns:a16="http://schemas.microsoft.com/office/drawing/2014/main" xmlns="" id="{99F76FBE-1BC2-4EE6-B90A-22263BF7BDCD}"/>
+                <a16:creationId xmlns="" xmlns:a16="http://schemas.microsoft.com/office/drawing/2014/main" id="{99F76FBE-1BC2-4EE6-B90A-22263BF7BDCD}"/>
               </a:ext>
             </a:extLst>
           </p:cNvPr>
@@ -7620,7 +7644,7 @@
           <p:cNvPr id="10" name="Título 1">
             <a:extLst>
               <a:ext uri="{FF2B5EF4-FFF2-40B4-BE49-F238E27FC236}">
-                <a16:creationId xmlns:a16="http://schemas.microsoft.com/office/drawing/2014/main" xmlns="" id="{678E41F7-516A-49E2-B205-0A126C574C2E}"/>
+                <a16:creationId xmlns="" xmlns:a16="http://schemas.microsoft.com/office/drawing/2014/main" id="{678E41F7-516A-49E2-B205-0A126C574C2E}"/>
               </a:ext>
             </a:extLst>
           </p:cNvPr>
@@ -7698,7 +7722,7 @@
           <p:cNvPr id="11" name="Título 1">
             <a:extLst>
               <a:ext uri="{FF2B5EF4-FFF2-40B4-BE49-F238E27FC236}">
-                <a16:creationId xmlns:a16="http://schemas.microsoft.com/office/drawing/2014/main" xmlns="" id="{0CD946CA-FF61-4363-B296-4AF3D7FBC896}"/>
+                <a16:creationId xmlns="" xmlns:a16="http://schemas.microsoft.com/office/drawing/2014/main" id="{0CD946CA-FF61-4363-B296-4AF3D7FBC896}"/>
               </a:ext>
             </a:extLst>
           </p:cNvPr>
@@ -7776,7 +7800,7 @@
           <p:cNvPr id="12" name="Título 1">
             <a:extLst>
               <a:ext uri="{FF2B5EF4-FFF2-40B4-BE49-F238E27FC236}">
-                <a16:creationId xmlns:a16="http://schemas.microsoft.com/office/drawing/2014/main" xmlns="" id="{AB9726E8-CEB5-4829-BE8F-0EAF85278B5A}"/>
+                <a16:creationId xmlns="" xmlns:a16="http://schemas.microsoft.com/office/drawing/2014/main" id="{AB9726E8-CEB5-4829-BE8F-0EAF85278B5A}"/>
               </a:ext>
             </a:extLst>
           </p:cNvPr>
@@ -7854,7 +7878,7 @@
           <p:cNvPr id="15" name="Título 1">
             <a:extLst>
               <a:ext uri="{FF2B5EF4-FFF2-40B4-BE49-F238E27FC236}">
-                <a16:creationId xmlns:a16="http://schemas.microsoft.com/office/drawing/2014/main" xmlns="" id="{2EEDD670-B386-40A2-A879-9CF8F33DA40F}"/>
+                <a16:creationId xmlns="" xmlns:a16="http://schemas.microsoft.com/office/drawing/2014/main" id="{2EEDD670-B386-40A2-A879-9CF8F33DA40F}"/>
               </a:ext>
             </a:extLst>
           </p:cNvPr>
@@ -7932,7 +7956,7 @@
           <p:cNvPr id="16" name="Título 1">
             <a:extLst>
               <a:ext uri="{FF2B5EF4-FFF2-40B4-BE49-F238E27FC236}">
-                <a16:creationId xmlns:a16="http://schemas.microsoft.com/office/drawing/2014/main" xmlns="" id="{229589FA-FF5C-47DD-A54E-805F02B40D56}"/>
+                <a16:creationId xmlns="" xmlns:a16="http://schemas.microsoft.com/office/drawing/2014/main" id="{229589FA-FF5C-47DD-A54E-805F02B40D56}"/>
               </a:ext>
             </a:extLst>
           </p:cNvPr>
@@ -8010,7 +8034,7 @@
           <p:cNvPr id="17" name="Título 1">
             <a:extLst>
               <a:ext uri="{FF2B5EF4-FFF2-40B4-BE49-F238E27FC236}">
-                <a16:creationId xmlns:a16="http://schemas.microsoft.com/office/drawing/2014/main" xmlns="" id="{9A6A319D-B6D1-48C9-B967-DAB049B71962}"/>
+                <a16:creationId xmlns="" xmlns:a16="http://schemas.microsoft.com/office/drawing/2014/main" id="{9A6A319D-B6D1-48C9-B967-DAB049B71962}"/>
               </a:ext>
             </a:extLst>
           </p:cNvPr>
@@ -8088,7 +8112,7 @@
           <p:cNvPr id="18" name="Imagem 17">
             <a:extLst>
               <a:ext uri="{FF2B5EF4-FFF2-40B4-BE49-F238E27FC236}">
-                <a16:creationId xmlns:a16="http://schemas.microsoft.com/office/drawing/2014/main" xmlns="" id="{A69155FD-5341-487B-81D7-5E2880E09683}"/>
+                <a16:creationId xmlns="" xmlns:a16="http://schemas.microsoft.com/office/drawing/2014/main" id="{A69155FD-5341-487B-81D7-5E2880E09683}"/>
               </a:ext>
             </a:extLst>
           </p:cNvPr>
@@ -8124,7 +8148,7 @@
           <p:cNvPr id="5" name="Imagem 4" descr="Uma imagem contendo pessoa, no interior, homem, olhando&#10;&#10;Descrição gerada automaticamente">
             <a:extLst>
               <a:ext uri="{FF2B5EF4-FFF2-40B4-BE49-F238E27FC236}">
-                <a16:creationId xmlns:a16="http://schemas.microsoft.com/office/drawing/2014/main" xmlns="" id="{6C745D24-199A-4881-AE89-46E21608BE16}"/>
+                <a16:creationId xmlns="" xmlns:a16="http://schemas.microsoft.com/office/drawing/2014/main" id="{6C745D24-199A-4881-AE89-46E21608BE16}"/>
               </a:ext>
             </a:extLst>
           </p:cNvPr>
@@ -8160,7 +8184,7 @@
           <p:cNvPr id="8" name="Imagem 7" descr="Mulher de óculos posando para foto&#10;&#10;Descrição gerada automaticamente">
             <a:extLst>
               <a:ext uri="{FF2B5EF4-FFF2-40B4-BE49-F238E27FC236}">
-                <a16:creationId xmlns:a16="http://schemas.microsoft.com/office/drawing/2014/main" xmlns="" id="{FC4E1664-FD72-473B-9AA6-576FEBE87B95}"/>
+                <a16:creationId xmlns="" xmlns:a16="http://schemas.microsoft.com/office/drawing/2014/main" id="{FC4E1664-FD72-473B-9AA6-576FEBE87B95}"/>
               </a:ext>
             </a:extLst>
           </p:cNvPr>
@@ -8196,7 +8220,7 @@
           <p:cNvPr id="13" name="Imagem 12" descr="Menino sorrindo posando para foto&#10;&#10;Descrição gerada automaticamente">
             <a:extLst>
               <a:ext uri="{FF2B5EF4-FFF2-40B4-BE49-F238E27FC236}">
-                <a16:creationId xmlns:a16="http://schemas.microsoft.com/office/drawing/2014/main" xmlns="" id="{9CE75B2B-4F48-4749-8C51-76B8AF200AB6}"/>
+                <a16:creationId xmlns="" xmlns:a16="http://schemas.microsoft.com/office/drawing/2014/main" id="{9CE75B2B-4F48-4749-8C51-76B8AF200AB6}"/>
               </a:ext>
             </a:extLst>
           </p:cNvPr>
@@ -8232,7 +8256,7 @@
           <p:cNvPr id="19" name="Imagem 18" descr="Uma imagem contendo pessoa, vestuário, mulher, chapéu&#10;&#10;Descrição gerada automaticamente">
             <a:extLst>
               <a:ext uri="{FF2B5EF4-FFF2-40B4-BE49-F238E27FC236}">
-                <a16:creationId xmlns:a16="http://schemas.microsoft.com/office/drawing/2014/main" xmlns="" id="{EAADD116-6D5D-4F23-9BA1-67E971C3F6FD}"/>
+                <a16:creationId xmlns="" xmlns:a16="http://schemas.microsoft.com/office/drawing/2014/main" id="{EAADD116-6D5D-4F23-9BA1-67E971C3F6FD}"/>
               </a:ext>
             </a:extLst>
           </p:cNvPr>
@@ -8268,7 +8292,7 @@
           <p:cNvPr id="21" name="Imagem 20" descr="Menino de camisa preta&#10;&#10;Descrição gerada automaticamente">
             <a:extLst>
               <a:ext uri="{FF2B5EF4-FFF2-40B4-BE49-F238E27FC236}">
-                <a16:creationId xmlns:a16="http://schemas.microsoft.com/office/drawing/2014/main" xmlns="" id="{22A12B27-089B-438B-97E5-38C10B35395A}"/>
+                <a16:creationId xmlns="" xmlns:a16="http://schemas.microsoft.com/office/drawing/2014/main" id="{22A12B27-089B-438B-97E5-38C10B35395A}"/>
               </a:ext>
             </a:extLst>
           </p:cNvPr>
@@ -8304,7 +8328,7 @@
           <p:cNvPr id="20" name="Picture 2">
             <a:extLst>
               <a:ext uri="{FF2B5EF4-FFF2-40B4-BE49-F238E27FC236}">
-                <a16:creationId xmlns:a16="http://schemas.microsoft.com/office/drawing/2014/main" xmlns="" id="{5823B29F-7B62-4389-9250-63EBA3ABE63F}"/>
+                <a16:creationId xmlns="" xmlns:a16="http://schemas.microsoft.com/office/drawing/2014/main" id="{5823B29F-7B62-4389-9250-63EBA3ABE63F}"/>
               </a:ext>
             </a:extLst>
           </p:cNvPr>
@@ -8987,7 +9011,7 @@
           <p:cNvPr id="2" name="Straight Arrow Connector 1">
             <a:extLst>
               <a:ext uri="{FF2B5EF4-FFF2-40B4-BE49-F238E27FC236}">
-                <a16:creationId xmlns:a16="http://schemas.microsoft.com/office/drawing/2014/main" xmlns="" id="{2A50C13F-38CB-4726-A175-5BC057C23492}"/>
+                <a16:creationId xmlns="" xmlns:a16="http://schemas.microsoft.com/office/drawing/2014/main" id="{2A50C13F-38CB-4726-A175-5BC057C23492}"/>
               </a:ext>
             </a:extLst>
           </p:cNvPr>
@@ -9028,7 +9052,7 @@
           <p:cNvPr id="7" name="Título 1">
             <a:extLst>
               <a:ext uri="{FF2B5EF4-FFF2-40B4-BE49-F238E27FC236}">
-                <a16:creationId xmlns:a16="http://schemas.microsoft.com/office/drawing/2014/main" xmlns="" id="{99F76FBE-1BC2-4EE6-B90A-22263BF7BDCD}"/>
+                <a16:creationId xmlns="" xmlns:a16="http://schemas.microsoft.com/office/drawing/2014/main" id="{99F76FBE-1BC2-4EE6-B90A-22263BF7BDCD}"/>
               </a:ext>
             </a:extLst>
           </p:cNvPr>
@@ -9091,7 +9115,7 @@
           <p:cNvPr id="4098" name="Picture 2" descr="Imagens Telemarketing | Vetores, fotos de arquivo e PSD grátis">
             <a:extLst>
               <a:ext uri="{FF2B5EF4-FFF2-40B4-BE49-F238E27FC236}">
-                <a16:creationId xmlns:a16="http://schemas.microsoft.com/office/drawing/2014/main" xmlns="" id="{3E46EC94-A677-40FE-ADA9-5B9036F756D9}"/>
+                <a16:creationId xmlns="" xmlns:a16="http://schemas.microsoft.com/office/drawing/2014/main" id="{3E46EC94-A677-40FE-ADA9-5B9036F756D9}"/>
               </a:ext>
             </a:extLst>
           </p:cNvPr>
@@ -9138,7 +9162,7 @@
           <p:cNvPr id="4" name="Picture 2">
             <a:extLst>
               <a:ext uri="{FF2B5EF4-FFF2-40B4-BE49-F238E27FC236}">
-                <a16:creationId xmlns:a16="http://schemas.microsoft.com/office/drawing/2014/main" xmlns="" id="{95805BE3-4A1A-4523-A540-D89AD3DB5CFB}"/>
+                <a16:creationId xmlns="" xmlns:a16="http://schemas.microsoft.com/office/drawing/2014/main" id="{95805BE3-4A1A-4523-A540-D89AD3DB5CFB}"/>
               </a:ext>
             </a:extLst>
           </p:cNvPr>
@@ -9185,7 +9209,7 @@
           <p:cNvPr id="6" name="Título 1">
             <a:extLst>
               <a:ext uri="{FF2B5EF4-FFF2-40B4-BE49-F238E27FC236}">
-                <a16:creationId xmlns:a16="http://schemas.microsoft.com/office/drawing/2014/main" xmlns="" id="{B6F48679-00C5-4A77-A553-A620B378115E}"/>
+                <a16:creationId xmlns="" xmlns:a16="http://schemas.microsoft.com/office/drawing/2014/main" id="{B6F48679-00C5-4A77-A553-A620B378115E}"/>
               </a:ext>
             </a:extLst>
           </p:cNvPr>
@@ -9568,7 +9592,7 @@
           <p:cNvPr id="7" name="Título 1">
             <a:extLst>
               <a:ext uri="{FF2B5EF4-FFF2-40B4-BE49-F238E27FC236}">
-                <a16:creationId xmlns:a16="http://schemas.microsoft.com/office/drawing/2014/main" xmlns="" id="{99F76FBE-1BC2-4EE6-B90A-22263BF7BDCD}"/>
+                <a16:creationId xmlns="" xmlns:a16="http://schemas.microsoft.com/office/drawing/2014/main" id="{99F76FBE-1BC2-4EE6-B90A-22263BF7BDCD}"/>
               </a:ext>
             </a:extLst>
           </p:cNvPr>
@@ -9631,7 +9655,7 @@
           <p:cNvPr id="9" name="Imagem 8">
             <a:extLst>
               <a:ext uri="{FF2B5EF4-FFF2-40B4-BE49-F238E27FC236}">
-                <a16:creationId xmlns:a16="http://schemas.microsoft.com/office/drawing/2014/main" xmlns="" id="{CD24726A-903B-41C4-B6DF-760C4CFE61AA}"/>
+                <a16:creationId xmlns="" xmlns:a16="http://schemas.microsoft.com/office/drawing/2014/main" id="{CD24726A-903B-41C4-B6DF-760C4CFE61AA}"/>
               </a:ext>
             </a:extLst>
           </p:cNvPr>
@@ -9667,7 +9691,7 @@
           <p:cNvPr id="4" name="Picture 2">
             <a:extLst>
               <a:ext uri="{FF2B5EF4-FFF2-40B4-BE49-F238E27FC236}">
-                <a16:creationId xmlns:a16="http://schemas.microsoft.com/office/drawing/2014/main" xmlns="" id="{F42FB2A8-7F94-4D7A-BF31-87B8DC9FEACF}"/>
+                <a16:creationId xmlns="" xmlns:a16="http://schemas.microsoft.com/office/drawing/2014/main" id="{F42FB2A8-7F94-4D7A-BF31-87B8DC9FEACF}"/>
               </a:ext>
             </a:extLst>
           </p:cNvPr>
@@ -9714,7 +9738,7 @@
           <p:cNvPr id="2" name="Straight Arrow Connector 1">
             <a:extLst>
               <a:ext uri="{FF2B5EF4-FFF2-40B4-BE49-F238E27FC236}">
-                <a16:creationId xmlns:a16="http://schemas.microsoft.com/office/drawing/2014/main" xmlns="" id="{767E2C2F-9178-48A2-B56C-EB623F4CF011}"/>
+                <a16:creationId xmlns="" xmlns:a16="http://schemas.microsoft.com/office/drawing/2014/main" id="{767E2C2F-9178-48A2-B56C-EB623F4CF011}"/>
               </a:ext>
             </a:extLst>
           </p:cNvPr>
@@ -9755,7 +9779,7 @@
           <p:cNvPr id="8" name="Título 1">
             <a:extLst>
               <a:ext uri="{FF2B5EF4-FFF2-40B4-BE49-F238E27FC236}">
-                <a16:creationId xmlns:a16="http://schemas.microsoft.com/office/drawing/2014/main" xmlns="" id="{AC3CD658-6C4C-49F8-8B83-5AE503BD9F21}"/>
+                <a16:creationId xmlns="" xmlns:a16="http://schemas.microsoft.com/office/drawing/2014/main" id="{AC3CD658-6C4C-49F8-8B83-5AE503BD9F21}"/>
               </a:ext>
             </a:extLst>
           </p:cNvPr>
@@ -9853,13 +9877,7 @@
               <a:rPr lang="pt-BR" sz="2800" dirty="0" smtClean="0">
                 <a:latin typeface="Bariol Bold" panose="02000506040000020003"/>
               </a:rPr>
-              <a:t>Funcionários que tentam burlar regras</a:t>
-            </a:r>
-            <a:r>
-              <a:rPr lang="pt-BR" sz="2800" dirty="0" smtClean="0">
-                <a:latin typeface="Bariol Bold" panose="02000506040000020003"/>
-              </a:rPr>
-              <a:t>;</a:t>
+              <a:t>Funcionários que tentam burlar regras;</a:t>
             </a:r>
             <a:endParaRPr lang="pt-BR" sz="2800" dirty="0">
               <a:latin typeface="Bariol Bold" panose="02000506040000020003"/>
@@ -10153,7 +10171,7 @@
           <p:cNvPr id="2" name="Straight Arrow Connector 1">
             <a:extLst>
               <a:ext uri="{FF2B5EF4-FFF2-40B4-BE49-F238E27FC236}">
-                <a16:creationId xmlns:a16="http://schemas.microsoft.com/office/drawing/2014/main" xmlns="" id="{8067B5E4-5CC9-4738-A6C6-0C51E8FD5F7E}"/>
+                <a16:creationId xmlns="" xmlns:a16="http://schemas.microsoft.com/office/drawing/2014/main" id="{8067B5E4-5CC9-4738-A6C6-0C51E8FD5F7E}"/>
               </a:ext>
             </a:extLst>
           </p:cNvPr>
@@ -10194,7 +10212,7 @@
           <p:cNvPr id="7" name="Título 1">
             <a:extLst>
               <a:ext uri="{FF2B5EF4-FFF2-40B4-BE49-F238E27FC236}">
-                <a16:creationId xmlns:a16="http://schemas.microsoft.com/office/drawing/2014/main" xmlns="" id="{99F76FBE-1BC2-4EE6-B90A-22263BF7BDCD}"/>
+                <a16:creationId xmlns="" xmlns:a16="http://schemas.microsoft.com/office/drawing/2014/main" id="{99F76FBE-1BC2-4EE6-B90A-22263BF7BDCD}"/>
               </a:ext>
             </a:extLst>
           </p:cNvPr>
@@ -10257,7 +10275,7 @@
           <p:cNvPr id="3" name="Imagem 2" descr="Uma imagem contendo atletismo, homem, mulher, jovem&#10;&#10;Descrição gerada automaticamente">
             <a:extLst>
               <a:ext uri="{FF2B5EF4-FFF2-40B4-BE49-F238E27FC236}">
-                <a16:creationId xmlns:a16="http://schemas.microsoft.com/office/drawing/2014/main" xmlns="" id="{C1A98800-58DC-4483-87DF-2963DFDEA1E7}"/>
+                <a16:creationId xmlns="" xmlns:a16="http://schemas.microsoft.com/office/drawing/2014/main" id="{C1A98800-58DC-4483-87DF-2963DFDEA1E7}"/>
               </a:ext>
             </a:extLst>
           </p:cNvPr>
@@ -10293,7 +10311,7 @@
           <p:cNvPr id="4" name="Picture 2">
             <a:extLst>
               <a:ext uri="{FF2B5EF4-FFF2-40B4-BE49-F238E27FC236}">
-                <a16:creationId xmlns:a16="http://schemas.microsoft.com/office/drawing/2014/main" xmlns="" id="{81A7A57C-8BAD-40FC-9628-0A271DFBCD32}"/>
+                <a16:creationId xmlns="" xmlns:a16="http://schemas.microsoft.com/office/drawing/2014/main" id="{81A7A57C-8BAD-40FC-9628-0A271DFBCD32}"/>
               </a:ext>
             </a:extLst>
           </p:cNvPr>
@@ -10340,7 +10358,7 @@
           <p:cNvPr id="8" name="Título 1">
             <a:extLst>
               <a:ext uri="{FF2B5EF4-FFF2-40B4-BE49-F238E27FC236}">
-                <a16:creationId xmlns:a16="http://schemas.microsoft.com/office/drawing/2014/main" xmlns="" id="{D8EF5F0E-CD81-4152-8D0B-8902A213ECB2}"/>
+                <a16:creationId xmlns="" xmlns:a16="http://schemas.microsoft.com/office/drawing/2014/main" id="{D8EF5F0E-CD81-4152-8D0B-8902A213ECB2}"/>
               </a:ext>
             </a:extLst>
           </p:cNvPr>
@@ -10723,7 +10741,7 @@
           <p:cNvPr id="2" name="Straight Arrow Connector 1">
             <a:extLst>
               <a:ext uri="{FF2B5EF4-FFF2-40B4-BE49-F238E27FC236}">
-                <a16:creationId xmlns:a16="http://schemas.microsoft.com/office/drawing/2014/main" xmlns="" id="{E8D38C0A-F3C1-4051-ABE3-35FA8150390A}"/>
+                <a16:creationId xmlns="" xmlns:a16="http://schemas.microsoft.com/office/drawing/2014/main" id="{E8D38C0A-F3C1-4051-ABE3-35FA8150390A}"/>
               </a:ext>
             </a:extLst>
           </p:cNvPr>
@@ -10764,7 +10782,7 @@
           <p:cNvPr id="7" name="Título 1">
             <a:extLst>
               <a:ext uri="{FF2B5EF4-FFF2-40B4-BE49-F238E27FC236}">
-                <a16:creationId xmlns:a16="http://schemas.microsoft.com/office/drawing/2014/main" xmlns="" id="{99F76FBE-1BC2-4EE6-B90A-22263BF7BDCD}"/>
+                <a16:creationId xmlns="" xmlns:a16="http://schemas.microsoft.com/office/drawing/2014/main" id="{99F76FBE-1BC2-4EE6-B90A-22263BF7BDCD}"/>
               </a:ext>
             </a:extLst>
           </p:cNvPr>
@@ -10827,7 +10845,7 @@
           <p:cNvPr id="3" name="Imagem 2" descr="Uma imagem contendo mesa, atletismo&#10;&#10;Descrição gerada automaticamente">
             <a:extLst>
               <a:ext uri="{FF2B5EF4-FFF2-40B4-BE49-F238E27FC236}">
-                <a16:creationId xmlns:a16="http://schemas.microsoft.com/office/drawing/2014/main" xmlns="" id="{4F1DEA53-EAA9-41BE-AAAD-67147C20EFA3}"/>
+                <a16:creationId xmlns="" xmlns:a16="http://schemas.microsoft.com/office/drawing/2014/main" id="{4F1DEA53-EAA9-41BE-AAAD-67147C20EFA3}"/>
               </a:ext>
             </a:extLst>
           </p:cNvPr>
@@ -10863,7 +10881,7 @@
           <p:cNvPr id="4" name="Picture 2">
             <a:extLst>
               <a:ext uri="{FF2B5EF4-FFF2-40B4-BE49-F238E27FC236}">
-                <a16:creationId xmlns:a16="http://schemas.microsoft.com/office/drawing/2014/main" xmlns="" id="{D63799FE-FD58-46C7-8DD5-1902EEB7FE5C}"/>
+                <a16:creationId xmlns="" xmlns:a16="http://schemas.microsoft.com/office/drawing/2014/main" id="{D63799FE-FD58-46C7-8DD5-1902EEB7FE5C}"/>
               </a:ext>
             </a:extLst>
           </p:cNvPr>
@@ -11146,7 +11164,7 @@
           <p:cNvPr id="7" name="Título 1">
             <a:extLst>
               <a:ext uri="{FF2B5EF4-FFF2-40B4-BE49-F238E27FC236}">
-                <a16:creationId xmlns:a16="http://schemas.microsoft.com/office/drawing/2014/main" xmlns="" id="{99F76FBE-1BC2-4EE6-B90A-22263BF7BDCD}"/>
+                <a16:creationId xmlns="" xmlns:a16="http://schemas.microsoft.com/office/drawing/2014/main" id="{99F76FBE-1BC2-4EE6-B90A-22263BF7BDCD}"/>
               </a:ext>
             </a:extLst>
           </p:cNvPr>
@@ -11209,7 +11227,7 @@
           <p:cNvPr id="2" name="Straight Arrow Connector 1">
             <a:extLst>
               <a:ext uri="{FF2B5EF4-FFF2-40B4-BE49-F238E27FC236}">
-                <a16:creationId xmlns:a16="http://schemas.microsoft.com/office/drawing/2014/main" xmlns="" id="{8BC350D6-EEE4-4369-B0B7-E605D1C2FDBA}"/>
+                <a16:creationId xmlns="" xmlns:a16="http://schemas.microsoft.com/office/drawing/2014/main" id="{8BC350D6-EEE4-4369-B0B7-E605D1C2FDBA}"/>
               </a:ext>
             </a:extLst>
           </p:cNvPr>
@@ -11252,7 +11270,7 @@
           <p:cNvPr id="5" name="Imagem 4">
             <a:extLst>
               <a:ext uri="{FF2B5EF4-FFF2-40B4-BE49-F238E27FC236}">
-                <a16:creationId xmlns:a16="http://schemas.microsoft.com/office/drawing/2014/main" xmlns="" id="{F92141F6-050D-4FB0-8986-4F5D8D4F96B3}"/>
+                <a16:creationId xmlns="" xmlns:a16="http://schemas.microsoft.com/office/drawing/2014/main" id="{F92141F6-050D-4FB0-8986-4F5D8D4F96B3}"/>
               </a:ext>
             </a:extLst>
           </p:cNvPr>
@@ -11288,7 +11306,7 @@
           <p:cNvPr id="4" name="Picture 2">
             <a:extLst>
               <a:ext uri="{FF2B5EF4-FFF2-40B4-BE49-F238E27FC236}">
-                <a16:creationId xmlns:a16="http://schemas.microsoft.com/office/drawing/2014/main" xmlns="" id="{EF083EFE-E484-4847-A645-55EC0AADCCE5}"/>
+                <a16:creationId xmlns="" xmlns:a16="http://schemas.microsoft.com/office/drawing/2014/main" id="{EF083EFE-E484-4847-A645-55EC0AADCCE5}"/>
               </a:ext>
             </a:extLst>
           </p:cNvPr>
@@ -11571,7 +11589,7 @@
           <p:cNvPr id="7" name="Título 1">
             <a:extLst>
               <a:ext uri="{FF2B5EF4-FFF2-40B4-BE49-F238E27FC236}">
-                <a16:creationId xmlns:a16="http://schemas.microsoft.com/office/drawing/2014/main" xmlns="" id="{99F76FBE-1BC2-4EE6-B90A-22263BF7BDCD}"/>
+                <a16:creationId xmlns="" xmlns:a16="http://schemas.microsoft.com/office/drawing/2014/main" id="{99F76FBE-1BC2-4EE6-B90A-22263BF7BDCD}"/>
               </a:ext>
             </a:extLst>
           </p:cNvPr>
@@ -11634,7 +11652,7 @@
           <p:cNvPr id="2" name="Straight Arrow Connector 1">
             <a:extLst>
               <a:ext uri="{FF2B5EF4-FFF2-40B4-BE49-F238E27FC236}">
-                <a16:creationId xmlns:a16="http://schemas.microsoft.com/office/drawing/2014/main" xmlns="" id="{8BC350D6-EEE4-4369-B0B7-E605D1C2FDBA}"/>
+                <a16:creationId xmlns="" xmlns:a16="http://schemas.microsoft.com/office/drawing/2014/main" id="{8BC350D6-EEE4-4369-B0B7-E605D1C2FDBA}"/>
               </a:ext>
             </a:extLst>
           </p:cNvPr>
@@ -11677,7 +11695,7 @@
           <p:cNvPr id="10" name="Imagem 9">
             <a:extLst>
               <a:ext uri="{FF2B5EF4-FFF2-40B4-BE49-F238E27FC236}">
-                <a16:creationId xmlns:a16="http://schemas.microsoft.com/office/drawing/2014/main" xmlns="" id="{65541928-1DD4-46FE-BA17-DB29347D81C5}"/>
+                <a16:creationId xmlns="" xmlns:a16="http://schemas.microsoft.com/office/drawing/2014/main" id="{65541928-1DD4-46FE-BA17-DB29347D81C5}"/>
               </a:ext>
             </a:extLst>
           </p:cNvPr>
@@ -11713,7 +11731,7 @@
           <p:cNvPr id="4" name="Picture 2">
             <a:extLst>
               <a:ext uri="{FF2B5EF4-FFF2-40B4-BE49-F238E27FC236}">
-                <a16:creationId xmlns:a16="http://schemas.microsoft.com/office/drawing/2014/main" xmlns="" id="{EF083EFE-E484-4847-A645-55EC0AADCCE5}"/>
+                <a16:creationId xmlns="" xmlns:a16="http://schemas.microsoft.com/office/drawing/2014/main" id="{EF083EFE-E484-4847-A645-55EC0AADCCE5}"/>
               </a:ext>
             </a:extLst>
           </p:cNvPr>
@@ -11996,7 +12014,7 @@
           <p:cNvPr id="7" name="Título 1">
             <a:extLst>
               <a:ext uri="{FF2B5EF4-FFF2-40B4-BE49-F238E27FC236}">
-                <a16:creationId xmlns:a16="http://schemas.microsoft.com/office/drawing/2014/main" xmlns="" id="{99F76FBE-1BC2-4EE6-B90A-22263BF7BDCD}"/>
+                <a16:creationId xmlns="" xmlns:a16="http://schemas.microsoft.com/office/drawing/2014/main" id="{99F76FBE-1BC2-4EE6-B90A-22263BF7BDCD}"/>
               </a:ext>
             </a:extLst>
           </p:cNvPr>
@@ -12059,7 +12077,7 @@
           <p:cNvPr id="5" name="Picture 2">
             <a:extLst>
               <a:ext uri="{FF2B5EF4-FFF2-40B4-BE49-F238E27FC236}">
-                <a16:creationId xmlns:a16="http://schemas.microsoft.com/office/drawing/2014/main" xmlns="" id="{5E6A065D-74B6-43C9-8951-4759FD99C85F}"/>
+                <a16:creationId xmlns="" xmlns:a16="http://schemas.microsoft.com/office/drawing/2014/main" id="{5E6A065D-74B6-43C9-8951-4759FD99C85F}"/>
               </a:ext>
             </a:extLst>
           </p:cNvPr>
@@ -12106,7 +12124,7 @@
           <p:cNvPr id="2" name="Straight Arrow Connector 1">
             <a:extLst>
               <a:ext uri="{FF2B5EF4-FFF2-40B4-BE49-F238E27FC236}">
-                <a16:creationId xmlns:a16="http://schemas.microsoft.com/office/drawing/2014/main" xmlns="" id="{102C7A15-5BE4-4E8E-826E-06C7E84CB27C}"/>
+                <a16:creationId xmlns="" xmlns:a16="http://schemas.microsoft.com/office/drawing/2014/main" id="{102C7A15-5BE4-4E8E-826E-06C7E84CB27C}"/>
               </a:ext>
             </a:extLst>
           </p:cNvPr>
@@ -12149,7 +12167,7 @@
           <p:cNvPr id="12" name="Imagem 11">
             <a:extLst>
               <a:ext uri="{FF2B5EF4-FFF2-40B4-BE49-F238E27FC236}">
-                <a16:creationId xmlns:a16="http://schemas.microsoft.com/office/drawing/2014/main" xmlns="" id="{A01150A3-5332-4792-A493-1C43638FC9F6}"/>
+                <a16:creationId xmlns="" xmlns:a16="http://schemas.microsoft.com/office/drawing/2014/main" id="{A01150A3-5332-4792-A493-1C43638FC9F6}"/>
               </a:ext>
             </a:extLst>
           </p:cNvPr>

</xml_diff>

<commit_message>
Atuaização slide e java
</commit_message>
<xml_diff>
--- a/Documentação/slide v2.1.pptx
+++ b/Documentação/slide v2.1.pptx
@@ -275,7 +275,7 @@
           <a:p>
             <a:fld id="{F50B35C2-D55D-43EC-A9F9-87B33DB15AB7}" type="datetimeFigureOut">
               <a:rPr lang="pt-BR" smtClean="0"/>
-              <a:t>26/10/2020</a:t>
+              <a:t>27/10/2020</a:t>
             </a:fld>
             <a:endParaRPr lang="pt-BR"/>
           </a:p>
@@ -443,7 +443,7 @@
           <a:p>
             <a:fld id="{F50B35C2-D55D-43EC-A9F9-87B33DB15AB7}" type="datetimeFigureOut">
               <a:rPr lang="pt-BR" smtClean="0"/>
-              <a:t>26/10/2020</a:t>
+              <a:t>27/10/2020</a:t>
             </a:fld>
             <a:endParaRPr lang="pt-BR"/>
           </a:p>
@@ -621,7 +621,7 @@
           <a:p>
             <a:fld id="{F50B35C2-D55D-43EC-A9F9-87B33DB15AB7}" type="datetimeFigureOut">
               <a:rPr lang="pt-BR" smtClean="0"/>
-              <a:t>26/10/2020</a:t>
+              <a:t>27/10/2020</a:t>
             </a:fld>
             <a:endParaRPr lang="pt-BR"/>
           </a:p>
@@ -789,7 +789,7 @@
           <a:p>
             <a:fld id="{F50B35C2-D55D-43EC-A9F9-87B33DB15AB7}" type="datetimeFigureOut">
               <a:rPr lang="pt-BR" smtClean="0"/>
-              <a:t>26/10/2020</a:t>
+              <a:t>27/10/2020</a:t>
             </a:fld>
             <a:endParaRPr lang="pt-BR"/>
           </a:p>
@@ -1034,7 +1034,7 @@
           <a:p>
             <a:fld id="{F50B35C2-D55D-43EC-A9F9-87B33DB15AB7}" type="datetimeFigureOut">
               <a:rPr lang="pt-BR" smtClean="0"/>
-              <a:t>26/10/2020</a:t>
+              <a:t>27/10/2020</a:t>
             </a:fld>
             <a:endParaRPr lang="pt-BR"/>
           </a:p>
@@ -1263,7 +1263,7 @@
           <a:p>
             <a:fld id="{F50B35C2-D55D-43EC-A9F9-87B33DB15AB7}" type="datetimeFigureOut">
               <a:rPr lang="pt-BR" smtClean="0"/>
-              <a:t>26/10/2020</a:t>
+              <a:t>27/10/2020</a:t>
             </a:fld>
             <a:endParaRPr lang="pt-BR"/>
           </a:p>
@@ -1627,7 +1627,7 @@
           <a:p>
             <a:fld id="{F50B35C2-D55D-43EC-A9F9-87B33DB15AB7}" type="datetimeFigureOut">
               <a:rPr lang="pt-BR" smtClean="0"/>
-              <a:t>26/10/2020</a:t>
+              <a:t>27/10/2020</a:t>
             </a:fld>
             <a:endParaRPr lang="pt-BR"/>
           </a:p>
@@ -1744,7 +1744,7 @@
           <a:p>
             <a:fld id="{F50B35C2-D55D-43EC-A9F9-87B33DB15AB7}" type="datetimeFigureOut">
               <a:rPr lang="pt-BR" smtClean="0"/>
-              <a:t>26/10/2020</a:t>
+              <a:t>27/10/2020</a:t>
             </a:fld>
             <a:endParaRPr lang="pt-BR"/>
           </a:p>
@@ -1839,7 +1839,7 @@
           <a:p>
             <a:fld id="{F50B35C2-D55D-43EC-A9F9-87B33DB15AB7}" type="datetimeFigureOut">
               <a:rPr lang="pt-BR" smtClean="0"/>
-              <a:t>26/10/2020</a:t>
+              <a:t>27/10/2020</a:t>
             </a:fld>
             <a:endParaRPr lang="pt-BR"/>
           </a:p>
@@ -2114,7 +2114,7 @@
           <a:p>
             <a:fld id="{F50B35C2-D55D-43EC-A9F9-87B33DB15AB7}" type="datetimeFigureOut">
               <a:rPr lang="pt-BR" smtClean="0"/>
-              <a:t>26/10/2020</a:t>
+              <a:t>27/10/2020</a:t>
             </a:fld>
             <a:endParaRPr lang="pt-BR"/>
           </a:p>
@@ -2366,7 +2366,7 @@
           <a:p>
             <a:fld id="{F50B35C2-D55D-43EC-A9F9-87B33DB15AB7}" type="datetimeFigureOut">
               <a:rPr lang="pt-BR" smtClean="0"/>
-              <a:t>26/10/2020</a:t>
+              <a:t>27/10/2020</a:t>
             </a:fld>
             <a:endParaRPr lang="pt-BR"/>
           </a:p>
@@ -2577,7 +2577,7 @@
           <a:p>
             <a:fld id="{F50B35C2-D55D-43EC-A9F9-87B33DB15AB7}" type="datetimeFigureOut">
               <a:rPr lang="pt-BR" smtClean="0"/>
-              <a:t>26/10/2020</a:t>
+              <a:t>27/10/2020</a:t>
             </a:fld>
             <a:endParaRPr lang="pt-BR"/>
           </a:p>
@@ -2987,7 +2987,7 @@
           <p:cNvPr id="2" name="Rectangle: Rounded Corners 1">
             <a:extLst>
               <a:ext uri="{FF2B5EF4-FFF2-40B4-BE49-F238E27FC236}">
-                <a16:creationId xmlns="" xmlns:a16="http://schemas.microsoft.com/office/drawing/2014/main" id="{1678591B-5872-4D1A-943E-5BC3264C3CFB}"/>
+                <a16:creationId xmlns:a16="http://schemas.microsoft.com/office/drawing/2014/main" xmlns="" id="{1678591B-5872-4D1A-943E-5BC3264C3CFB}"/>
               </a:ext>
             </a:extLst>
           </p:cNvPr>
@@ -3041,7 +3041,7 @@
           <p:cNvPr id="2050" name="Picture 2">
             <a:extLst>
               <a:ext uri="{FF2B5EF4-FFF2-40B4-BE49-F238E27FC236}">
-                <a16:creationId xmlns="" xmlns:a16="http://schemas.microsoft.com/office/drawing/2014/main" id="{C727CAE5-80E2-41CE-B37E-BBFAE305DF84}"/>
+                <a16:creationId xmlns:a16="http://schemas.microsoft.com/office/drawing/2014/main" xmlns="" id="{C727CAE5-80E2-41CE-B37E-BBFAE305DF84}"/>
               </a:ext>
             </a:extLst>
           </p:cNvPr>
@@ -3088,7 +3088,7 @@
           <p:cNvPr id="4" name="Rectangle: Rounded Corners 3">
             <a:extLst>
               <a:ext uri="{FF2B5EF4-FFF2-40B4-BE49-F238E27FC236}">
-                <a16:creationId xmlns="" xmlns:a16="http://schemas.microsoft.com/office/drawing/2014/main" id="{C0D744C7-2B31-44CA-BA1F-D2700F2BF96D}"/>
+                <a16:creationId xmlns:a16="http://schemas.microsoft.com/office/drawing/2014/main" xmlns="" id="{C0D744C7-2B31-44CA-BA1F-D2700F2BF96D}"/>
               </a:ext>
             </a:extLst>
           </p:cNvPr>
@@ -3270,7 +3270,7 @@
           <p:cNvPr id="4" name="Straight Arrow Connector 3">
             <a:extLst>
               <a:ext uri="{FF2B5EF4-FFF2-40B4-BE49-F238E27FC236}">
-                <a16:creationId xmlns="" xmlns:a16="http://schemas.microsoft.com/office/drawing/2014/main" id="{2E47AAF4-0703-407A-9375-DE4A2497442E}"/>
+                <a16:creationId xmlns:a16="http://schemas.microsoft.com/office/drawing/2014/main" xmlns="" id="{2E47AAF4-0703-407A-9375-DE4A2497442E}"/>
               </a:ext>
             </a:extLst>
           </p:cNvPr>
@@ -3311,7 +3311,7 @@
           <p:cNvPr id="7" name="Título 1">
             <a:extLst>
               <a:ext uri="{FF2B5EF4-FFF2-40B4-BE49-F238E27FC236}">
-                <a16:creationId xmlns="" xmlns:a16="http://schemas.microsoft.com/office/drawing/2014/main" id="{99F76FBE-1BC2-4EE6-B90A-22263BF7BDCD}"/>
+                <a16:creationId xmlns:a16="http://schemas.microsoft.com/office/drawing/2014/main" xmlns="" id="{99F76FBE-1BC2-4EE6-B90A-22263BF7BDCD}"/>
               </a:ext>
             </a:extLst>
           </p:cNvPr>
@@ -3374,7 +3374,7 @@
           <p:cNvPr id="3" name="Picture 2">
             <a:extLst>
               <a:ext uri="{FF2B5EF4-FFF2-40B4-BE49-F238E27FC236}">
-                <a16:creationId xmlns="" xmlns:a16="http://schemas.microsoft.com/office/drawing/2014/main" id="{5C89B846-E8B4-41E5-A2FD-3C9F96F43158}"/>
+                <a16:creationId xmlns:a16="http://schemas.microsoft.com/office/drawing/2014/main" xmlns="" id="{5C89B846-E8B4-41E5-A2FD-3C9F96F43158}"/>
               </a:ext>
             </a:extLst>
           </p:cNvPr>
@@ -3421,7 +3421,7 @@
           <p:cNvPr id="5" name="Imagem 4" descr="Desenho de uma pessoa&#10;&#10;Descrição gerada automaticamente">
             <a:extLst>
               <a:ext uri="{FF2B5EF4-FFF2-40B4-BE49-F238E27FC236}">
-                <a16:creationId xmlns="" xmlns:a16="http://schemas.microsoft.com/office/drawing/2014/main" id="{65B6D792-5394-44C7-88F8-DC482A934804}"/>
+                <a16:creationId xmlns:a16="http://schemas.microsoft.com/office/drawing/2014/main" xmlns="" id="{65B6D792-5394-44C7-88F8-DC482A934804}"/>
               </a:ext>
             </a:extLst>
           </p:cNvPr>
@@ -3457,7 +3457,7 @@
           <p:cNvPr id="8" name="AutoShape 4">
             <a:extLst>
               <a:ext uri="{FF2B5EF4-FFF2-40B4-BE49-F238E27FC236}">
-                <a16:creationId xmlns="" xmlns:a16="http://schemas.microsoft.com/office/drawing/2014/main" id="{CBC49F37-024F-43BA-BF41-65835263DDCC}"/>
+                <a16:creationId xmlns:a16="http://schemas.microsoft.com/office/drawing/2014/main" xmlns="" id="{CBC49F37-024F-43BA-BF41-65835263DDCC}"/>
               </a:ext>
             </a:extLst>
           </p:cNvPr>
@@ -3502,7 +3502,7 @@
           <p:cNvPr id="10" name="Imagem 9" descr="Diagrama&#10;&#10;Descrição gerada automaticamente">
             <a:extLst>
               <a:ext uri="{FF2B5EF4-FFF2-40B4-BE49-F238E27FC236}">
-                <a16:creationId xmlns="" xmlns:a16="http://schemas.microsoft.com/office/drawing/2014/main" id="{EC31F9B0-BA3A-445B-901B-FC2332FEF663}"/>
+                <a16:creationId xmlns:a16="http://schemas.microsoft.com/office/drawing/2014/main" xmlns="" id="{EC31F9B0-BA3A-445B-901B-FC2332FEF663}"/>
               </a:ext>
             </a:extLst>
           </p:cNvPr>
@@ -3808,7 +3808,7 @@
           <p:cNvPr id="7" name="Título 1">
             <a:extLst>
               <a:ext uri="{FF2B5EF4-FFF2-40B4-BE49-F238E27FC236}">
-                <a16:creationId xmlns="" xmlns:a16="http://schemas.microsoft.com/office/drawing/2014/main" id="{99F76FBE-1BC2-4EE6-B90A-22263BF7BDCD}"/>
+                <a16:creationId xmlns:a16="http://schemas.microsoft.com/office/drawing/2014/main" xmlns="" id="{99F76FBE-1BC2-4EE6-B90A-22263BF7BDCD}"/>
               </a:ext>
             </a:extLst>
           </p:cNvPr>
@@ -3871,7 +3871,7 @@
           <p:cNvPr id="4" name="Picture 2">
             <a:extLst>
               <a:ext uri="{FF2B5EF4-FFF2-40B4-BE49-F238E27FC236}">
-                <a16:creationId xmlns="" xmlns:a16="http://schemas.microsoft.com/office/drawing/2014/main" id="{3CF36ED0-FCD8-45D8-A912-5D4DD5032DBE}"/>
+                <a16:creationId xmlns:a16="http://schemas.microsoft.com/office/drawing/2014/main" xmlns="" id="{3CF36ED0-FCD8-45D8-A912-5D4DD5032DBE}"/>
               </a:ext>
             </a:extLst>
           </p:cNvPr>
@@ -3918,7 +3918,7 @@
           <p:cNvPr id="2" name="Straight Arrow Connector 1">
             <a:extLst>
               <a:ext uri="{FF2B5EF4-FFF2-40B4-BE49-F238E27FC236}">
-                <a16:creationId xmlns="" xmlns:a16="http://schemas.microsoft.com/office/drawing/2014/main" id="{EF6676ED-9702-4820-B9D8-8B178C2BC9D8}"/>
+                <a16:creationId xmlns:a16="http://schemas.microsoft.com/office/drawing/2014/main" xmlns="" id="{EF6676ED-9702-4820-B9D8-8B178C2BC9D8}"/>
               </a:ext>
             </a:extLst>
           </p:cNvPr>
@@ -3959,7 +3959,7 @@
           <p:cNvPr id="19" name="Agrupar 18">
             <a:extLst>
               <a:ext uri="{FF2B5EF4-FFF2-40B4-BE49-F238E27FC236}">
-                <a16:creationId xmlns="" xmlns:a16="http://schemas.microsoft.com/office/drawing/2014/main" id="{84BF6789-3335-4920-AA85-D1861BE5B03E}"/>
+                <a16:creationId xmlns:a16="http://schemas.microsoft.com/office/drawing/2014/main" xmlns="" id="{84BF6789-3335-4920-AA85-D1861BE5B03E}"/>
               </a:ext>
             </a:extLst>
           </p:cNvPr>
@@ -3979,7 +3979,7 @@
             <p:cNvPr id="6" name="Google Shape;1752;p44">
               <a:extLst>
                 <a:ext uri="{FF2B5EF4-FFF2-40B4-BE49-F238E27FC236}">
-                  <a16:creationId xmlns="" xmlns:a16="http://schemas.microsoft.com/office/drawing/2014/main" id="{DB60E812-6938-4298-A78E-5CA545FDF3CB}"/>
+                  <a16:creationId xmlns:a16="http://schemas.microsoft.com/office/drawing/2014/main" xmlns="" id="{DB60E812-6938-4298-A78E-5CA545FDF3CB}"/>
                 </a:ext>
               </a:extLst>
             </p:cNvPr>
@@ -4005,7 +4005,7 @@
               <p:cNvPr id="8" name="Google Shape;1753;p44">
                 <a:extLst>
                   <a:ext uri="{FF2B5EF4-FFF2-40B4-BE49-F238E27FC236}">
-                    <a16:creationId xmlns="" xmlns:a16="http://schemas.microsoft.com/office/drawing/2014/main" id="{0DBB088E-379B-44B1-85B0-053B377E1558}"/>
+                    <a16:creationId xmlns:a16="http://schemas.microsoft.com/office/drawing/2014/main" xmlns="" id="{0DBB088E-379B-44B1-85B0-053B377E1558}"/>
                   </a:ext>
                 </a:extLst>
               </p:cNvPr>
@@ -4106,7 +4106,7 @@
               <p:cNvPr id="10" name="Google Shape;1754;p44">
                 <a:extLst>
                   <a:ext uri="{FF2B5EF4-FFF2-40B4-BE49-F238E27FC236}">
-                    <a16:creationId xmlns="" xmlns:a16="http://schemas.microsoft.com/office/drawing/2014/main" id="{3B04B96F-32C9-4ACA-B368-E0F84F216A79}"/>
+                    <a16:creationId xmlns:a16="http://schemas.microsoft.com/office/drawing/2014/main" xmlns="" id="{3B04B96F-32C9-4ACA-B368-E0F84F216A79}"/>
                   </a:ext>
                 </a:extLst>
               </p:cNvPr>
@@ -4192,7 +4192,7 @@
               <p:cNvPr id="11" name="Google Shape;1755;p44">
                 <a:extLst>
                   <a:ext uri="{FF2B5EF4-FFF2-40B4-BE49-F238E27FC236}">
-                    <a16:creationId xmlns="" xmlns:a16="http://schemas.microsoft.com/office/drawing/2014/main" id="{CF34BFC8-6B5D-4040-98EA-203295F3E25E}"/>
+                    <a16:creationId xmlns:a16="http://schemas.microsoft.com/office/drawing/2014/main" xmlns="" id="{CF34BFC8-6B5D-4040-98EA-203295F3E25E}"/>
                   </a:ext>
                 </a:extLst>
               </p:cNvPr>
@@ -4269,7 +4269,7 @@
             <p:cNvPr id="5" name="Imagem 4">
               <a:extLst>
                 <a:ext uri="{FF2B5EF4-FFF2-40B4-BE49-F238E27FC236}">
-                  <a16:creationId xmlns="" xmlns:a16="http://schemas.microsoft.com/office/drawing/2014/main" id="{760D5DD0-6CC9-481F-9766-56BD13589309}"/>
+                  <a16:creationId xmlns:a16="http://schemas.microsoft.com/office/drawing/2014/main" xmlns="" id="{760D5DD0-6CC9-481F-9766-56BD13589309}"/>
                 </a:ext>
               </a:extLst>
             </p:cNvPr>
@@ -4300,7 +4300,7 @@
           <p:cNvPr id="20" name="Agrupar 19">
             <a:extLst>
               <a:ext uri="{FF2B5EF4-FFF2-40B4-BE49-F238E27FC236}">
-                <a16:creationId xmlns="" xmlns:a16="http://schemas.microsoft.com/office/drawing/2014/main" id="{91CE4868-6806-4F0D-AD70-2D78D9090FA8}"/>
+                <a16:creationId xmlns:a16="http://schemas.microsoft.com/office/drawing/2014/main" xmlns="" id="{91CE4868-6806-4F0D-AD70-2D78D9090FA8}"/>
               </a:ext>
             </a:extLst>
           </p:cNvPr>
@@ -4320,7 +4320,7 @@
             <p:cNvPr id="13" name="Google Shape;1592;p73">
               <a:extLst>
                 <a:ext uri="{FF2B5EF4-FFF2-40B4-BE49-F238E27FC236}">
-                  <a16:creationId xmlns="" xmlns:a16="http://schemas.microsoft.com/office/drawing/2014/main" id="{9D82DDB8-54A1-4DD7-9030-06F75FEFFD86}"/>
+                  <a16:creationId xmlns:a16="http://schemas.microsoft.com/office/drawing/2014/main" xmlns="" id="{9D82DDB8-54A1-4DD7-9030-06F75FEFFD86}"/>
                 </a:ext>
               </a:extLst>
             </p:cNvPr>
@@ -4410,7 +4410,7 @@
             <p:cNvPr id="15" name="Imagem 14">
               <a:extLst>
                 <a:ext uri="{FF2B5EF4-FFF2-40B4-BE49-F238E27FC236}">
-                  <a16:creationId xmlns="" xmlns:a16="http://schemas.microsoft.com/office/drawing/2014/main" id="{3F367BA2-89AF-4926-8925-741DC524A38E}"/>
+                  <a16:creationId xmlns:a16="http://schemas.microsoft.com/office/drawing/2014/main" xmlns="" id="{3F367BA2-89AF-4926-8925-741DC524A38E}"/>
                 </a:ext>
               </a:extLst>
             </p:cNvPr>
@@ -4440,7 +4440,7 @@
           <p:cNvPr id="23" name="Agrupar 22">
             <a:extLst>
               <a:ext uri="{FF2B5EF4-FFF2-40B4-BE49-F238E27FC236}">
-                <a16:creationId xmlns="" xmlns:a16="http://schemas.microsoft.com/office/drawing/2014/main" id="{7E13A691-743F-4036-8B2B-FA415A2786A6}"/>
+                <a16:creationId xmlns:a16="http://schemas.microsoft.com/office/drawing/2014/main" xmlns="" id="{7E13A691-743F-4036-8B2B-FA415A2786A6}"/>
               </a:ext>
             </a:extLst>
           </p:cNvPr>
@@ -4460,7 +4460,7 @@
             <p:cNvPr id="16" name="Google Shape;1634;p74">
               <a:extLst>
                 <a:ext uri="{FF2B5EF4-FFF2-40B4-BE49-F238E27FC236}">
-                  <a16:creationId xmlns="" xmlns:a16="http://schemas.microsoft.com/office/drawing/2014/main" id="{8013B569-1E04-4E77-BAB8-7D2458AFDE47}"/>
+                  <a16:creationId xmlns:a16="http://schemas.microsoft.com/office/drawing/2014/main" xmlns="" id="{8013B569-1E04-4E77-BAB8-7D2458AFDE47}"/>
                 </a:ext>
               </a:extLst>
             </p:cNvPr>
@@ -4480,7 +4480,7 @@
               <p:cNvPr id="17" name="Google Shape;1635;p74">
                 <a:extLst>
                   <a:ext uri="{FF2B5EF4-FFF2-40B4-BE49-F238E27FC236}">
-                    <a16:creationId xmlns="" xmlns:a16="http://schemas.microsoft.com/office/drawing/2014/main" id="{8872BE14-B3C6-4215-AEB3-09725A52F24B}"/>
+                    <a16:creationId xmlns:a16="http://schemas.microsoft.com/office/drawing/2014/main" xmlns="" id="{8872BE14-B3C6-4215-AEB3-09725A52F24B}"/>
                   </a:ext>
                 </a:extLst>
               </p:cNvPr>
@@ -4570,7 +4570,7 @@
               <p:cNvPr id="18" name="Google Shape;1636;p74">
                 <a:extLst>
                   <a:ext uri="{FF2B5EF4-FFF2-40B4-BE49-F238E27FC236}">
-                    <a16:creationId xmlns="" xmlns:a16="http://schemas.microsoft.com/office/drawing/2014/main" id="{9B8CC2B5-5256-4C0B-9076-F8772294115C}"/>
+                    <a16:creationId xmlns:a16="http://schemas.microsoft.com/office/drawing/2014/main" xmlns="" id="{9B8CC2B5-5256-4C0B-9076-F8772294115C}"/>
                   </a:ext>
                 </a:extLst>
               </p:cNvPr>
@@ -4649,7 +4649,7 @@
             <p:cNvPr id="22" name="Imagem 21">
               <a:extLst>
                 <a:ext uri="{FF2B5EF4-FFF2-40B4-BE49-F238E27FC236}">
-                  <a16:creationId xmlns="" xmlns:a16="http://schemas.microsoft.com/office/drawing/2014/main" id="{4DE0FC26-C0D0-4230-84C8-5188379905E2}"/>
+                  <a16:creationId xmlns:a16="http://schemas.microsoft.com/office/drawing/2014/main" xmlns="" id="{4DE0FC26-C0D0-4230-84C8-5188379905E2}"/>
                 </a:ext>
               </a:extLst>
             </p:cNvPr>
@@ -4680,7 +4680,7 @@
           <p:cNvPr id="2050" name="Picture 2" descr="Useful sites for Learning HTML/CSS/Javacript – Sriki's Stack">
             <a:extLst>
               <a:ext uri="{FF2B5EF4-FFF2-40B4-BE49-F238E27FC236}">
-                <a16:creationId xmlns="" xmlns:a16="http://schemas.microsoft.com/office/drawing/2014/main" id="{F4798657-4CCC-4049-9AC1-551FB4D36DE7}"/>
+                <a16:creationId xmlns:a16="http://schemas.microsoft.com/office/drawing/2014/main" xmlns="" id="{F4798657-4CCC-4049-9AC1-551FB4D36DE7}"/>
               </a:ext>
             </a:extLst>
           </p:cNvPr>
@@ -4727,7 +4727,7 @@
           <p:cNvPr id="2052" name="Picture 4" descr="Bootstrap (and CSS) Useful Tips. I've been on some project in which I… | by  Fatah Nur Alam Majid | Medium">
             <a:extLst>
               <a:ext uri="{FF2B5EF4-FFF2-40B4-BE49-F238E27FC236}">
-                <a16:creationId xmlns="" xmlns:a16="http://schemas.microsoft.com/office/drawing/2014/main" id="{9EDFA597-D68D-47F3-BD54-A81339D58AA7}"/>
+                <a16:creationId xmlns:a16="http://schemas.microsoft.com/office/drawing/2014/main" xmlns="" id="{9EDFA597-D68D-47F3-BD54-A81339D58AA7}"/>
               </a:ext>
             </a:extLst>
           </p:cNvPr>
@@ -5150,7 +5150,7 @@
           <p:cNvPr id="7" name="Título 1">
             <a:extLst>
               <a:ext uri="{FF2B5EF4-FFF2-40B4-BE49-F238E27FC236}">
-                <a16:creationId xmlns="" xmlns:a16="http://schemas.microsoft.com/office/drawing/2014/main" id="{99F76FBE-1BC2-4EE6-B90A-22263BF7BDCD}"/>
+                <a16:creationId xmlns:a16="http://schemas.microsoft.com/office/drawing/2014/main" xmlns="" id="{99F76FBE-1BC2-4EE6-B90A-22263BF7BDCD}"/>
               </a:ext>
             </a:extLst>
           </p:cNvPr>
@@ -5213,7 +5213,7 @@
           <p:cNvPr id="4" name="Picture 2">
             <a:extLst>
               <a:ext uri="{FF2B5EF4-FFF2-40B4-BE49-F238E27FC236}">
-                <a16:creationId xmlns="" xmlns:a16="http://schemas.microsoft.com/office/drawing/2014/main" id="{3CF36ED0-FCD8-45D8-A912-5D4DD5032DBE}"/>
+                <a16:creationId xmlns:a16="http://schemas.microsoft.com/office/drawing/2014/main" xmlns="" id="{3CF36ED0-FCD8-45D8-A912-5D4DD5032DBE}"/>
               </a:ext>
             </a:extLst>
           </p:cNvPr>
@@ -5260,7 +5260,7 @@
           <p:cNvPr id="2" name="Straight Arrow Connector 1">
             <a:extLst>
               <a:ext uri="{FF2B5EF4-FFF2-40B4-BE49-F238E27FC236}">
-                <a16:creationId xmlns="" xmlns:a16="http://schemas.microsoft.com/office/drawing/2014/main" id="{EF6676ED-9702-4820-B9D8-8B178C2BC9D8}"/>
+                <a16:creationId xmlns:a16="http://schemas.microsoft.com/office/drawing/2014/main" xmlns="" id="{EF6676ED-9702-4820-B9D8-8B178C2BC9D8}"/>
               </a:ext>
             </a:extLst>
           </p:cNvPr>
@@ -5303,7 +5303,7 @@
           <p:cNvPr id="8" name="Google Shape;2568;p50">
             <a:extLst>
               <a:ext uri="{FF2B5EF4-FFF2-40B4-BE49-F238E27FC236}">
-                <a16:creationId xmlns="" xmlns:a16="http://schemas.microsoft.com/office/drawing/2014/main" id="{44646ED0-70CF-4F53-BCA6-F864DC8D8CE7}"/>
+                <a16:creationId xmlns:a16="http://schemas.microsoft.com/office/drawing/2014/main" xmlns="" id="{44646ED0-70CF-4F53-BCA6-F864DC8D8CE7}"/>
               </a:ext>
             </a:extLst>
           </p:cNvPr>
@@ -5323,7 +5323,7 @@
             <p:cNvPr id="9" name="Google Shape;2569;p50">
               <a:extLst>
                 <a:ext uri="{FF2B5EF4-FFF2-40B4-BE49-F238E27FC236}">
-                  <a16:creationId xmlns="" xmlns:a16="http://schemas.microsoft.com/office/drawing/2014/main" id="{FB65BD16-0480-48B4-9C70-4F7B1C20B16C}"/>
+                  <a16:creationId xmlns:a16="http://schemas.microsoft.com/office/drawing/2014/main" xmlns="" id="{FB65BD16-0480-48B4-9C70-4F7B1C20B16C}"/>
                 </a:ext>
               </a:extLst>
             </p:cNvPr>
@@ -5410,7 +5410,7 @@
             <p:cNvPr id="10" name="Google Shape;2570;p50">
               <a:extLst>
                 <a:ext uri="{FF2B5EF4-FFF2-40B4-BE49-F238E27FC236}">
-                  <a16:creationId xmlns="" xmlns:a16="http://schemas.microsoft.com/office/drawing/2014/main" id="{12A45219-8D11-4C29-9591-30268EABA08C}"/>
+                  <a16:creationId xmlns:a16="http://schemas.microsoft.com/office/drawing/2014/main" xmlns="" id="{12A45219-8D11-4C29-9591-30268EABA08C}"/>
                 </a:ext>
               </a:extLst>
             </p:cNvPr>
@@ -5487,7 +5487,7 @@
             <p:cNvPr id="11" name="Google Shape;2571;p50">
               <a:extLst>
                 <a:ext uri="{FF2B5EF4-FFF2-40B4-BE49-F238E27FC236}">
-                  <a16:creationId xmlns="" xmlns:a16="http://schemas.microsoft.com/office/drawing/2014/main" id="{F59228A5-A741-4378-BE36-B7E19A2718D5}"/>
+                  <a16:creationId xmlns:a16="http://schemas.microsoft.com/office/drawing/2014/main" xmlns="" id="{F59228A5-A741-4378-BE36-B7E19A2718D5}"/>
                 </a:ext>
               </a:extLst>
             </p:cNvPr>
@@ -5554,7 +5554,7 @@
             <p:cNvPr id="12" name="Google Shape;2572;p50">
               <a:extLst>
                 <a:ext uri="{FF2B5EF4-FFF2-40B4-BE49-F238E27FC236}">
-                  <a16:creationId xmlns="" xmlns:a16="http://schemas.microsoft.com/office/drawing/2014/main" id="{BD730A34-147B-4163-9308-7D0D671AD525}"/>
+                  <a16:creationId xmlns:a16="http://schemas.microsoft.com/office/drawing/2014/main" xmlns="" id="{BD730A34-147B-4163-9308-7D0D671AD525}"/>
                 </a:ext>
               </a:extLst>
             </p:cNvPr>
@@ -5882,7 +5882,7 @@
           <p:cNvPr id="7" name="Título 1">
             <a:extLst>
               <a:ext uri="{FF2B5EF4-FFF2-40B4-BE49-F238E27FC236}">
-                <a16:creationId xmlns="" xmlns:a16="http://schemas.microsoft.com/office/drawing/2014/main" id="{99F76FBE-1BC2-4EE6-B90A-22263BF7BDCD}"/>
+                <a16:creationId xmlns:a16="http://schemas.microsoft.com/office/drawing/2014/main" xmlns="" id="{99F76FBE-1BC2-4EE6-B90A-22263BF7BDCD}"/>
               </a:ext>
             </a:extLst>
           </p:cNvPr>
@@ -5954,7 +5954,7 @@
           <p:cNvPr id="4" name="Picture 2">
             <a:extLst>
               <a:ext uri="{FF2B5EF4-FFF2-40B4-BE49-F238E27FC236}">
-                <a16:creationId xmlns="" xmlns:a16="http://schemas.microsoft.com/office/drawing/2014/main" id="{3CF36ED0-FCD8-45D8-A912-5D4DD5032DBE}"/>
+                <a16:creationId xmlns:a16="http://schemas.microsoft.com/office/drawing/2014/main" xmlns="" id="{3CF36ED0-FCD8-45D8-A912-5D4DD5032DBE}"/>
               </a:ext>
             </a:extLst>
           </p:cNvPr>
@@ -6001,7 +6001,7 @@
           <p:cNvPr id="2" name="Straight Arrow Connector 1">
             <a:extLst>
               <a:ext uri="{FF2B5EF4-FFF2-40B4-BE49-F238E27FC236}">
-                <a16:creationId xmlns="" xmlns:a16="http://schemas.microsoft.com/office/drawing/2014/main" id="{EF6676ED-9702-4820-B9D8-8B178C2BC9D8}"/>
+                <a16:creationId xmlns:a16="http://schemas.microsoft.com/office/drawing/2014/main" xmlns="" id="{EF6676ED-9702-4820-B9D8-8B178C2BC9D8}"/>
               </a:ext>
             </a:extLst>
           </p:cNvPr>
@@ -6269,7 +6269,7 @@
           <p:cNvPr id="7" name="Título 1">
             <a:extLst>
               <a:ext uri="{FF2B5EF4-FFF2-40B4-BE49-F238E27FC236}">
-                <a16:creationId xmlns="" xmlns:a16="http://schemas.microsoft.com/office/drawing/2014/main" id="{99F76FBE-1BC2-4EE6-B90A-22263BF7BDCD}"/>
+                <a16:creationId xmlns:a16="http://schemas.microsoft.com/office/drawing/2014/main" xmlns="" id="{99F76FBE-1BC2-4EE6-B90A-22263BF7BDCD}"/>
               </a:ext>
             </a:extLst>
           </p:cNvPr>
@@ -6332,7 +6332,7 @@
           <p:cNvPr id="3" name="Picture 2">
             <a:extLst>
               <a:ext uri="{FF2B5EF4-FFF2-40B4-BE49-F238E27FC236}">
-                <a16:creationId xmlns="" xmlns:a16="http://schemas.microsoft.com/office/drawing/2014/main" id="{A9070500-5C9F-415F-8DFF-FBCAA846F638}"/>
+                <a16:creationId xmlns:a16="http://schemas.microsoft.com/office/drawing/2014/main" xmlns="" id="{A9070500-5C9F-415F-8DFF-FBCAA846F638}"/>
               </a:ext>
             </a:extLst>
           </p:cNvPr>
@@ -6379,7 +6379,7 @@
           <p:cNvPr id="2" name="Straight Arrow Connector 1">
             <a:extLst>
               <a:ext uri="{FF2B5EF4-FFF2-40B4-BE49-F238E27FC236}">
-                <a16:creationId xmlns="" xmlns:a16="http://schemas.microsoft.com/office/drawing/2014/main" id="{4E523067-FB64-412F-AE09-1E914EEC9A82}"/>
+                <a16:creationId xmlns:a16="http://schemas.microsoft.com/office/drawing/2014/main" xmlns="" id="{4E523067-FB64-412F-AE09-1E914EEC9A82}"/>
               </a:ext>
             </a:extLst>
           </p:cNvPr>
@@ -6422,7 +6422,7 @@
           <p:cNvPr id="9" name="Imagem 8">
             <a:extLst>
               <a:ext uri="{FF2B5EF4-FFF2-40B4-BE49-F238E27FC236}">
-                <a16:creationId xmlns="" xmlns:a16="http://schemas.microsoft.com/office/drawing/2014/main" id="{814E4E03-513D-4D7F-B842-33DE1E24CA83}"/>
+                <a16:creationId xmlns:a16="http://schemas.microsoft.com/office/drawing/2014/main" xmlns="" id="{814E4E03-513D-4D7F-B842-33DE1E24CA83}"/>
               </a:ext>
             </a:extLst>
           </p:cNvPr>
@@ -6694,7 +6694,7 @@
           <p:cNvPr id="7" name="Título 1">
             <a:extLst>
               <a:ext uri="{FF2B5EF4-FFF2-40B4-BE49-F238E27FC236}">
-                <a16:creationId xmlns="" xmlns:a16="http://schemas.microsoft.com/office/drawing/2014/main" id="{99F76FBE-1BC2-4EE6-B90A-22263BF7BDCD}"/>
+                <a16:creationId xmlns:a16="http://schemas.microsoft.com/office/drawing/2014/main" xmlns="" id="{99F76FBE-1BC2-4EE6-B90A-22263BF7BDCD}"/>
               </a:ext>
             </a:extLst>
           </p:cNvPr>
@@ -6757,7 +6757,7 @@
           <p:cNvPr id="3" name="Imagem 2" descr="Desenho de uma pessoa&#10;&#10;Descrição gerada automaticamente">
             <a:extLst>
               <a:ext uri="{FF2B5EF4-FFF2-40B4-BE49-F238E27FC236}">
-                <a16:creationId xmlns="" xmlns:a16="http://schemas.microsoft.com/office/drawing/2014/main" id="{ED02D286-F5A0-4509-8E48-BFA54F34D076}"/>
+                <a16:creationId xmlns:a16="http://schemas.microsoft.com/office/drawing/2014/main" xmlns="" id="{ED02D286-F5A0-4509-8E48-BFA54F34D076}"/>
               </a:ext>
             </a:extLst>
           </p:cNvPr>
@@ -6793,7 +6793,7 @@
           <p:cNvPr id="4" name="Picture 2">
             <a:extLst>
               <a:ext uri="{FF2B5EF4-FFF2-40B4-BE49-F238E27FC236}">
-                <a16:creationId xmlns="" xmlns:a16="http://schemas.microsoft.com/office/drawing/2014/main" id="{CDDD861E-3766-442F-8F52-68E1AE2C3753}"/>
+                <a16:creationId xmlns:a16="http://schemas.microsoft.com/office/drawing/2014/main" xmlns="" id="{CDDD861E-3766-442F-8F52-68E1AE2C3753}"/>
               </a:ext>
             </a:extLst>
           </p:cNvPr>
@@ -6840,7 +6840,7 @@
           <p:cNvPr id="2" name="Straight Arrow Connector 1">
             <a:extLst>
               <a:ext uri="{FF2B5EF4-FFF2-40B4-BE49-F238E27FC236}">
-                <a16:creationId xmlns="" xmlns:a16="http://schemas.microsoft.com/office/drawing/2014/main" id="{825D95E1-8250-4172-ABA3-976541C2807C}"/>
+                <a16:creationId xmlns:a16="http://schemas.microsoft.com/office/drawing/2014/main" xmlns="" id="{825D95E1-8250-4172-ABA3-976541C2807C}"/>
               </a:ext>
             </a:extLst>
           </p:cNvPr>
@@ -7117,7 +7117,7 @@
           <p:cNvPr id="7" name="Título 1">
             <a:extLst>
               <a:ext uri="{FF2B5EF4-FFF2-40B4-BE49-F238E27FC236}">
-                <a16:creationId xmlns="" xmlns:a16="http://schemas.microsoft.com/office/drawing/2014/main" id="{99F76FBE-1BC2-4EE6-B90A-22263BF7BDCD}"/>
+                <a16:creationId xmlns:a16="http://schemas.microsoft.com/office/drawing/2014/main" xmlns="" id="{99F76FBE-1BC2-4EE6-B90A-22263BF7BDCD}"/>
               </a:ext>
             </a:extLst>
           </p:cNvPr>
@@ -7180,7 +7180,7 @@
           <p:cNvPr id="3" name="Picture 2">
             <a:extLst>
               <a:ext uri="{FF2B5EF4-FFF2-40B4-BE49-F238E27FC236}">
-                <a16:creationId xmlns="" xmlns:a16="http://schemas.microsoft.com/office/drawing/2014/main" id="{A5E95E14-1174-4815-814A-3FB16E71EF46}"/>
+                <a16:creationId xmlns:a16="http://schemas.microsoft.com/office/drawing/2014/main" xmlns="" id="{A5E95E14-1174-4815-814A-3FB16E71EF46}"/>
               </a:ext>
             </a:extLst>
           </p:cNvPr>
@@ -7227,7 +7227,7 @@
           <p:cNvPr id="4" name="Imagem 3" descr="Uma imagem contendo homem, atletismo, mulher, segurando&#10;&#10;Descrição gerada automaticamente">
             <a:extLst>
               <a:ext uri="{FF2B5EF4-FFF2-40B4-BE49-F238E27FC236}">
-                <a16:creationId xmlns="" xmlns:a16="http://schemas.microsoft.com/office/drawing/2014/main" id="{8C7F91F0-DCD8-4436-A809-E9763D748E22}"/>
+                <a16:creationId xmlns:a16="http://schemas.microsoft.com/office/drawing/2014/main" xmlns="" id="{8C7F91F0-DCD8-4436-A809-E9763D748E22}"/>
               </a:ext>
             </a:extLst>
           </p:cNvPr>
@@ -7263,7 +7263,7 @@
           <p:cNvPr id="6" name="Straight Arrow Connector 1">
             <a:extLst>
               <a:ext uri="{FF2B5EF4-FFF2-40B4-BE49-F238E27FC236}">
-                <a16:creationId xmlns="" xmlns:a16="http://schemas.microsoft.com/office/drawing/2014/main" id="{EF317FC1-ACAE-4693-9AF7-C538ED9B538A}"/>
+                <a16:creationId xmlns:a16="http://schemas.microsoft.com/office/drawing/2014/main" xmlns="" id="{EF317FC1-ACAE-4693-9AF7-C538ED9B538A}"/>
               </a:ext>
             </a:extLst>
           </p:cNvPr>
@@ -7540,7 +7540,7 @@
           <p:cNvPr id="3" name="Straight Arrow Connector 2">
             <a:extLst>
               <a:ext uri="{FF2B5EF4-FFF2-40B4-BE49-F238E27FC236}">
-                <a16:creationId xmlns="" xmlns:a16="http://schemas.microsoft.com/office/drawing/2014/main" id="{238B6891-9D9A-4548-BDE4-47054128BA41}"/>
+                <a16:creationId xmlns:a16="http://schemas.microsoft.com/office/drawing/2014/main" xmlns="" id="{238B6891-9D9A-4548-BDE4-47054128BA41}"/>
               </a:ext>
             </a:extLst>
           </p:cNvPr>
@@ -7581,7 +7581,7 @@
           <p:cNvPr id="7" name="Título 1">
             <a:extLst>
               <a:ext uri="{FF2B5EF4-FFF2-40B4-BE49-F238E27FC236}">
-                <a16:creationId xmlns="" xmlns:a16="http://schemas.microsoft.com/office/drawing/2014/main" id="{99F76FBE-1BC2-4EE6-B90A-22263BF7BDCD}"/>
+                <a16:creationId xmlns:a16="http://schemas.microsoft.com/office/drawing/2014/main" xmlns="" id="{99F76FBE-1BC2-4EE6-B90A-22263BF7BDCD}"/>
               </a:ext>
             </a:extLst>
           </p:cNvPr>
@@ -7644,7 +7644,7 @@
           <p:cNvPr id="10" name="Título 1">
             <a:extLst>
               <a:ext uri="{FF2B5EF4-FFF2-40B4-BE49-F238E27FC236}">
-                <a16:creationId xmlns="" xmlns:a16="http://schemas.microsoft.com/office/drawing/2014/main" id="{678E41F7-516A-49E2-B205-0A126C574C2E}"/>
+                <a16:creationId xmlns:a16="http://schemas.microsoft.com/office/drawing/2014/main" xmlns="" id="{678E41F7-516A-49E2-B205-0A126C574C2E}"/>
               </a:ext>
             </a:extLst>
           </p:cNvPr>
@@ -7722,7 +7722,7 @@
           <p:cNvPr id="11" name="Título 1">
             <a:extLst>
               <a:ext uri="{FF2B5EF4-FFF2-40B4-BE49-F238E27FC236}">
-                <a16:creationId xmlns="" xmlns:a16="http://schemas.microsoft.com/office/drawing/2014/main" id="{0CD946CA-FF61-4363-B296-4AF3D7FBC896}"/>
+                <a16:creationId xmlns:a16="http://schemas.microsoft.com/office/drawing/2014/main" xmlns="" id="{0CD946CA-FF61-4363-B296-4AF3D7FBC896}"/>
               </a:ext>
             </a:extLst>
           </p:cNvPr>
@@ -7800,7 +7800,7 @@
           <p:cNvPr id="12" name="Título 1">
             <a:extLst>
               <a:ext uri="{FF2B5EF4-FFF2-40B4-BE49-F238E27FC236}">
-                <a16:creationId xmlns="" xmlns:a16="http://schemas.microsoft.com/office/drawing/2014/main" id="{AB9726E8-CEB5-4829-BE8F-0EAF85278B5A}"/>
+                <a16:creationId xmlns:a16="http://schemas.microsoft.com/office/drawing/2014/main" xmlns="" id="{AB9726E8-CEB5-4829-BE8F-0EAF85278B5A}"/>
               </a:ext>
             </a:extLst>
           </p:cNvPr>
@@ -7878,7 +7878,7 @@
           <p:cNvPr id="15" name="Título 1">
             <a:extLst>
               <a:ext uri="{FF2B5EF4-FFF2-40B4-BE49-F238E27FC236}">
-                <a16:creationId xmlns="" xmlns:a16="http://schemas.microsoft.com/office/drawing/2014/main" id="{2EEDD670-B386-40A2-A879-9CF8F33DA40F}"/>
+                <a16:creationId xmlns:a16="http://schemas.microsoft.com/office/drawing/2014/main" xmlns="" id="{2EEDD670-B386-40A2-A879-9CF8F33DA40F}"/>
               </a:ext>
             </a:extLst>
           </p:cNvPr>
@@ -7956,7 +7956,7 @@
           <p:cNvPr id="16" name="Título 1">
             <a:extLst>
               <a:ext uri="{FF2B5EF4-FFF2-40B4-BE49-F238E27FC236}">
-                <a16:creationId xmlns="" xmlns:a16="http://schemas.microsoft.com/office/drawing/2014/main" id="{229589FA-FF5C-47DD-A54E-805F02B40D56}"/>
+                <a16:creationId xmlns:a16="http://schemas.microsoft.com/office/drawing/2014/main" xmlns="" id="{229589FA-FF5C-47DD-A54E-805F02B40D56}"/>
               </a:ext>
             </a:extLst>
           </p:cNvPr>
@@ -8034,7 +8034,7 @@
           <p:cNvPr id="17" name="Título 1">
             <a:extLst>
               <a:ext uri="{FF2B5EF4-FFF2-40B4-BE49-F238E27FC236}">
-                <a16:creationId xmlns="" xmlns:a16="http://schemas.microsoft.com/office/drawing/2014/main" id="{9A6A319D-B6D1-48C9-B967-DAB049B71962}"/>
+                <a16:creationId xmlns:a16="http://schemas.microsoft.com/office/drawing/2014/main" xmlns="" id="{9A6A319D-B6D1-48C9-B967-DAB049B71962}"/>
               </a:ext>
             </a:extLst>
           </p:cNvPr>
@@ -8112,7 +8112,7 @@
           <p:cNvPr id="18" name="Imagem 17">
             <a:extLst>
               <a:ext uri="{FF2B5EF4-FFF2-40B4-BE49-F238E27FC236}">
-                <a16:creationId xmlns="" xmlns:a16="http://schemas.microsoft.com/office/drawing/2014/main" id="{A69155FD-5341-487B-81D7-5E2880E09683}"/>
+                <a16:creationId xmlns:a16="http://schemas.microsoft.com/office/drawing/2014/main" xmlns="" id="{A69155FD-5341-487B-81D7-5E2880E09683}"/>
               </a:ext>
             </a:extLst>
           </p:cNvPr>
@@ -8148,7 +8148,7 @@
           <p:cNvPr id="5" name="Imagem 4" descr="Uma imagem contendo pessoa, no interior, homem, olhando&#10;&#10;Descrição gerada automaticamente">
             <a:extLst>
               <a:ext uri="{FF2B5EF4-FFF2-40B4-BE49-F238E27FC236}">
-                <a16:creationId xmlns="" xmlns:a16="http://schemas.microsoft.com/office/drawing/2014/main" id="{6C745D24-199A-4881-AE89-46E21608BE16}"/>
+                <a16:creationId xmlns:a16="http://schemas.microsoft.com/office/drawing/2014/main" xmlns="" id="{6C745D24-199A-4881-AE89-46E21608BE16}"/>
               </a:ext>
             </a:extLst>
           </p:cNvPr>
@@ -8184,7 +8184,7 @@
           <p:cNvPr id="8" name="Imagem 7" descr="Mulher de óculos posando para foto&#10;&#10;Descrição gerada automaticamente">
             <a:extLst>
               <a:ext uri="{FF2B5EF4-FFF2-40B4-BE49-F238E27FC236}">
-                <a16:creationId xmlns="" xmlns:a16="http://schemas.microsoft.com/office/drawing/2014/main" id="{FC4E1664-FD72-473B-9AA6-576FEBE87B95}"/>
+                <a16:creationId xmlns:a16="http://schemas.microsoft.com/office/drawing/2014/main" xmlns="" id="{FC4E1664-FD72-473B-9AA6-576FEBE87B95}"/>
               </a:ext>
             </a:extLst>
           </p:cNvPr>
@@ -8220,7 +8220,7 @@
           <p:cNvPr id="13" name="Imagem 12" descr="Menino sorrindo posando para foto&#10;&#10;Descrição gerada automaticamente">
             <a:extLst>
               <a:ext uri="{FF2B5EF4-FFF2-40B4-BE49-F238E27FC236}">
-                <a16:creationId xmlns="" xmlns:a16="http://schemas.microsoft.com/office/drawing/2014/main" id="{9CE75B2B-4F48-4749-8C51-76B8AF200AB6}"/>
+                <a16:creationId xmlns:a16="http://schemas.microsoft.com/office/drawing/2014/main" xmlns="" id="{9CE75B2B-4F48-4749-8C51-76B8AF200AB6}"/>
               </a:ext>
             </a:extLst>
           </p:cNvPr>
@@ -8256,7 +8256,7 @@
           <p:cNvPr id="19" name="Imagem 18" descr="Uma imagem contendo pessoa, vestuário, mulher, chapéu&#10;&#10;Descrição gerada automaticamente">
             <a:extLst>
               <a:ext uri="{FF2B5EF4-FFF2-40B4-BE49-F238E27FC236}">
-                <a16:creationId xmlns="" xmlns:a16="http://schemas.microsoft.com/office/drawing/2014/main" id="{EAADD116-6D5D-4F23-9BA1-67E971C3F6FD}"/>
+                <a16:creationId xmlns:a16="http://schemas.microsoft.com/office/drawing/2014/main" xmlns="" id="{EAADD116-6D5D-4F23-9BA1-67E971C3F6FD}"/>
               </a:ext>
             </a:extLst>
           </p:cNvPr>
@@ -8292,7 +8292,7 @@
           <p:cNvPr id="21" name="Imagem 20" descr="Menino de camisa preta&#10;&#10;Descrição gerada automaticamente">
             <a:extLst>
               <a:ext uri="{FF2B5EF4-FFF2-40B4-BE49-F238E27FC236}">
-                <a16:creationId xmlns="" xmlns:a16="http://schemas.microsoft.com/office/drawing/2014/main" id="{22A12B27-089B-438B-97E5-38C10B35395A}"/>
+                <a16:creationId xmlns:a16="http://schemas.microsoft.com/office/drawing/2014/main" xmlns="" id="{22A12B27-089B-438B-97E5-38C10B35395A}"/>
               </a:ext>
             </a:extLst>
           </p:cNvPr>
@@ -8328,7 +8328,7 @@
           <p:cNvPr id="20" name="Picture 2">
             <a:extLst>
               <a:ext uri="{FF2B5EF4-FFF2-40B4-BE49-F238E27FC236}">
-                <a16:creationId xmlns="" xmlns:a16="http://schemas.microsoft.com/office/drawing/2014/main" id="{5823B29F-7B62-4389-9250-63EBA3ABE63F}"/>
+                <a16:creationId xmlns:a16="http://schemas.microsoft.com/office/drawing/2014/main" xmlns="" id="{5823B29F-7B62-4389-9250-63EBA3ABE63F}"/>
               </a:ext>
             </a:extLst>
           </p:cNvPr>
@@ -9011,7 +9011,7 @@
           <p:cNvPr id="2" name="Straight Arrow Connector 1">
             <a:extLst>
               <a:ext uri="{FF2B5EF4-FFF2-40B4-BE49-F238E27FC236}">
-                <a16:creationId xmlns="" xmlns:a16="http://schemas.microsoft.com/office/drawing/2014/main" id="{2A50C13F-38CB-4726-A175-5BC057C23492}"/>
+                <a16:creationId xmlns:a16="http://schemas.microsoft.com/office/drawing/2014/main" xmlns="" id="{2A50C13F-38CB-4726-A175-5BC057C23492}"/>
               </a:ext>
             </a:extLst>
           </p:cNvPr>
@@ -9052,7 +9052,7 @@
           <p:cNvPr id="7" name="Título 1">
             <a:extLst>
               <a:ext uri="{FF2B5EF4-FFF2-40B4-BE49-F238E27FC236}">
-                <a16:creationId xmlns="" xmlns:a16="http://schemas.microsoft.com/office/drawing/2014/main" id="{99F76FBE-1BC2-4EE6-B90A-22263BF7BDCD}"/>
+                <a16:creationId xmlns:a16="http://schemas.microsoft.com/office/drawing/2014/main" xmlns="" id="{99F76FBE-1BC2-4EE6-B90A-22263BF7BDCD}"/>
               </a:ext>
             </a:extLst>
           </p:cNvPr>
@@ -9115,7 +9115,7 @@
           <p:cNvPr id="4098" name="Picture 2" descr="Imagens Telemarketing | Vetores, fotos de arquivo e PSD grátis">
             <a:extLst>
               <a:ext uri="{FF2B5EF4-FFF2-40B4-BE49-F238E27FC236}">
-                <a16:creationId xmlns="" xmlns:a16="http://schemas.microsoft.com/office/drawing/2014/main" id="{3E46EC94-A677-40FE-ADA9-5B9036F756D9}"/>
+                <a16:creationId xmlns:a16="http://schemas.microsoft.com/office/drawing/2014/main" xmlns="" id="{3E46EC94-A677-40FE-ADA9-5B9036F756D9}"/>
               </a:ext>
             </a:extLst>
           </p:cNvPr>
@@ -9162,7 +9162,7 @@
           <p:cNvPr id="4" name="Picture 2">
             <a:extLst>
               <a:ext uri="{FF2B5EF4-FFF2-40B4-BE49-F238E27FC236}">
-                <a16:creationId xmlns="" xmlns:a16="http://schemas.microsoft.com/office/drawing/2014/main" id="{95805BE3-4A1A-4523-A540-D89AD3DB5CFB}"/>
+                <a16:creationId xmlns:a16="http://schemas.microsoft.com/office/drawing/2014/main" xmlns="" id="{95805BE3-4A1A-4523-A540-D89AD3DB5CFB}"/>
               </a:ext>
             </a:extLst>
           </p:cNvPr>
@@ -9209,7 +9209,7 @@
           <p:cNvPr id="6" name="Título 1">
             <a:extLst>
               <a:ext uri="{FF2B5EF4-FFF2-40B4-BE49-F238E27FC236}">
-                <a16:creationId xmlns="" xmlns:a16="http://schemas.microsoft.com/office/drawing/2014/main" id="{B6F48679-00C5-4A77-A553-A620B378115E}"/>
+                <a16:creationId xmlns:a16="http://schemas.microsoft.com/office/drawing/2014/main" xmlns="" id="{B6F48679-00C5-4A77-A553-A620B378115E}"/>
               </a:ext>
             </a:extLst>
           </p:cNvPr>
@@ -9592,7 +9592,7 @@
           <p:cNvPr id="7" name="Título 1">
             <a:extLst>
               <a:ext uri="{FF2B5EF4-FFF2-40B4-BE49-F238E27FC236}">
-                <a16:creationId xmlns="" xmlns:a16="http://schemas.microsoft.com/office/drawing/2014/main" id="{99F76FBE-1BC2-4EE6-B90A-22263BF7BDCD}"/>
+                <a16:creationId xmlns:a16="http://schemas.microsoft.com/office/drawing/2014/main" xmlns="" id="{99F76FBE-1BC2-4EE6-B90A-22263BF7BDCD}"/>
               </a:ext>
             </a:extLst>
           </p:cNvPr>
@@ -9655,7 +9655,7 @@
           <p:cNvPr id="9" name="Imagem 8">
             <a:extLst>
               <a:ext uri="{FF2B5EF4-FFF2-40B4-BE49-F238E27FC236}">
-                <a16:creationId xmlns="" xmlns:a16="http://schemas.microsoft.com/office/drawing/2014/main" id="{CD24726A-903B-41C4-B6DF-760C4CFE61AA}"/>
+                <a16:creationId xmlns:a16="http://schemas.microsoft.com/office/drawing/2014/main" xmlns="" id="{CD24726A-903B-41C4-B6DF-760C4CFE61AA}"/>
               </a:ext>
             </a:extLst>
           </p:cNvPr>
@@ -9691,7 +9691,7 @@
           <p:cNvPr id="4" name="Picture 2">
             <a:extLst>
               <a:ext uri="{FF2B5EF4-FFF2-40B4-BE49-F238E27FC236}">
-                <a16:creationId xmlns="" xmlns:a16="http://schemas.microsoft.com/office/drawing/2014/main" id="{F42FB2A8-7F94-4D7A-BF31-87B8DC9FEACF}"/>
+                <a16:creationId xmlns:a16="http://schemas.microsoft.com/office/drawing/2014/main" xmlns="" id="{F42FB2A8-7F94-4D7A-BF31-87B8DC9FEACF}"/>
               </a:ext>
             </a:extLst>
           </p:cNvPr>
@@ -9738,7 +9738,7 @@
           <p:cNvPr id="2" name="Straight Arrow Connector 1">
             <a:extLst>
               <a:ext uri="{FF2B5EF4-FFF2-40B4-BE49-F238E27FC236}">
-                <a16:creationId xmlns="" xmlns:a16="http://schemas.microsoft.com/office/drawing/2014/main" id="{767E2C2F-9178-48A2-B56C-EB623F4CF011}"/>
+                <a16:creationId xmlns:a16="http://schemas.microsoft.com/office/drawing/2014/main" xmlns="" id="{767E2C2F-9178-48A2-B56C-EB623F4CF011}"/>
               </a:ext>
             </a:extLst>
           </p:cNvPr>
@@ -9779,7 +9779,7 @@
           <p:cNvPr id="8" name="Título 1">
             <a:extLst>
               <a:ext uri="{FF2B5EF4-FFF2-40B4-BE49-F238E27FC236}">
-                <a16:creationId xmlns="" xmlns:a16="http://schemas.microsoft.com/office/drawing/2014/main" id="{AC3CD658-6C4C-49F8-8B83-5AE503BD9F21}"/>
+                <a16:creationId xmlns:a16="http://schemas.microsoft.com/office/drawing/2014/main" xmlns="" id="{AC3CD658-6C4C-49F8-8B83-5AE503BD9F21}"/>
               </a:ext>
             </a:extLst>
           </p:cNvPr>
@@ -10171,7 +10171,7 @@
           <p:cNvPr id="2" name="Straight Arrow Connector 1">
             <a:extLst>
               <a:ext uri="{FF2B5EF4-FFF2-40B4-BE49-F238E27FC236}">
-                <a16:creationId xmlns="" xmlns:a16="http://schemas.microsoft.com/office/drawing/2014/main" id="{8067B5E4-5CC9-4738-A6C6-0C51E8FD5F7E}"/>
+                <a16:creationId xmlns:a16="http://schemas.microsoft.com/office/drawing/2014/main" xmlns="" id="{8067B5E4-5CC9-4738-A6C6-0C51E8FD5F7E}"/>
               </a:ext>
             </a:extLst>
           </p:cNvPr>
@@ -10212,7 +10212,7 @@
           <p:cNvPr id="7" name="Título 1">
             <a:extLst>
               <a:ext uri="{FF2B5EF4-FFF2-40B4-BE49-F238E27FC236}">
-                <a16:creationId xmlns="" xmlns:a16="http://schemas.microsoft.com/office/drawing/2014/main" id="{99F76FBE-1BC2-4EE6-B90A-22263BF7BDCD}"/>
+                <a16:creationId xmlns:a16="http://schemas.microsoft.com/office/drawing/2014/main" xmlns="" id="{99F76FBE-1BC2-4EE6-B90A-22263BF7BDCD}"/>
               </a:ext>
             </a:extLst>
           </p:cNvPr>
@@ -10275,7 +10275,7 @@
           <p:cNvPr id="3" name="Imagem 2" descr="Uma imagem contendo atletismo, homem, mulher, jovem&#10;&#10;Descrição gerada automaticamente">
             <a:extLst>
               <a:ext uri="{FF2B5EF4-FFF2-40B4-BE49-F238E27FC236}">
-                <a16:creationId xmlns="" xmlns:a16="http://schemas.microsoft.com/office/drawing/2014/main" id="{C1A98800-58DC-4483-87DF-2963DFDEA1E7}"/>
+                <a16:creationId xmlns:a16="http://schemas.microsoft.com/office/drawing/2014/main" xmlns="" id="{C1A98800-58DC-4483-87DF-2963DFDEA1E7}"/>
               </a:ext>
             </a:extLst>
           </p:cNvPr>
@@ -10311,7 +10311,7 @@
           <p:cNvPr id="4" name="Picture 2">
             <a:extLst>
               <a:ext uri="{FF2B5EF4-FFF2-40B4-BE49-F238E27FC236}">
-                <a16:creationId xmlns="" xmlns:a16="http://schemas.microsoft.com/office/drawing/2014/main" id="{81A7A57C-8BAD-40FC-9628-0A271DFBCD32}"/>
+                <a16:creationId xmlns:a16="http://schemas.microsoft.com/office/drawing/2014/main" xmlns="" id="{81A7A57C-8BAD-40FC-9628-0A271DFBCD32}"/>
               </a:ext>
             </a:extLst>
           </p:cNvPr>
@@ -10358,7 +10358,7 @@
           <p:cNvPr id="8" name="Título 1">
             <a:extLst>
               <a:ext uri="{FF2B5EF4-FFF2-40B4-BE49-F238E27FC236}">
-                <a16:creationId xmlns="" xmlns:a16="http://schemas.microsoft.com/office/drawing/2014/main" id="{D8EF5F0E-CD81-4152-8D0B-8902A213ECB2}"/>
+                <a16:creationId xmlns:a16="http://schemas.microsoft.com/office/drawing/2014/main" xmlns="" id="{D8EF5F0E-CD81-4152-8D0B-8902A213ECB2}"/>
               </a:ext>
             </a:extLst>
           </p:cNvPr>
@@ -10741,7 +10741,7 @@
           <p:cNvPr id="2" name="Straight Arrow Connector 1">
             <a:extLst>
               <a:ext uri="{FF2B5EF4-FFF2-40B4-BE49-F238E27FC236}">
-                <a16:creationId xmlns="" xmlns:a16="http://schemas.microsoft.com/office/drawing/2014/main" id="{E8D38C0A-F3C1-4051-ABE3-35FA8150390A}"/>
+                <a16:creationId xmlns:a16="http://schemas.microsoft.com/office/drawing/2014/main" xmlns="" id="{E8D38C0A-F3C1-4051-ABE3-35FA8150390A}"/>
               </a:ext>
             </a:extLst>
           </p:cNvPr>
@@ -10782,7 +10782,7 @@
           <p:cNvPr id="7" name="Título 1">
             <a:extLst>
               <a:ext uri="{FF2B5EF4-FFF2-40B4-BE49-F238E27FC236}">
-                <a16:creationId xmlns="" xmlns:a16="http://schemas.microsoft.com/office/drawing/2014/main" id="{99F76FBE-1BC2-4EE6-B90A-22263BF7BDCD}"/>
+                <a16:creationId xmlns:a16="http://schemas.microsoft.com/office/drawing/2014/main" xmlns="" id="{99F76FBE-1BC2-4EE6-B90A-22263BF7BDCD}"/>
               </a:ext>
             </a:extLst>
           </p:cNvPr>
@@ -10845,7 +10845,7 @@
           <p:cNvPr id="3" name="Imagem 2" descr="Uma imagem contendo mesa, atletismo&#10;&#10;Descrição gerada automaticamente">
             <a:extLst>
               <a:ext uri="{FF2B5EF4-FFF2-40B4-BE49-F238E27FC236}">
-                <a16:creationId xmlns="" xmlns:a16="http://schemas.microsoft.com/office/drawing/2014/main" id="{4F1DEA53-EAA9-41BE-AAAD-67147C20EFA3}"/>
+                <a16:creationId xmlns:a16="http://schemas.microsoft.com/office/drawing/2014/main" xmlns="" id="{4F1DEA53-EAA9-41BE-AAAD-67147C20EFA3}"/>
               </a:ext>
             </a:extLst>
           </p:cNvPr>
@@ -10868,7 +10868,7 @@
         </p:blipFill>
         <p:spPr>
           <a:xfrm>
-            <a:off x="3238500" y="1663715"/>
+            <a:off x="6574128" y="1470532"/>
             <a:ext cx="5435201" cy="4221565"/>
           </a:xfrm>
           <a:prstGeom prst="rect">
@@ -10881,7 +10881,7 @@
           <p:cNvPr id="4" name="Picture 2">
             <a:extLst>
               <a:ext uri="{FF2B5EF4-FFF2-40B4-BE49-F238E27FC236}">
-                <a16:creationId xmlns="" xmlns:a16="http://schemas.microsoft.com/office/drawing/2014/main" id="{D63799FE-FD58-46C7-8DD5-1902EEB7FE5C}"/>
+                <a16:creationId xmlns:a16="http://schemas.microsoft.com/office/drawing/2014/main" xmlns="" id="{D63799FE-FD58-46C7-8DD5-1902EEB7FE5C}"/>
               </a:ext>
             </a:extLst>
           </p:cNvPr>
@@ -10923,6 +10923,114 @@
           </a:extLst>
         </p:spPr>
       </p:pic>
+      <p:sp>
+        <p:nvSpPr>
+          <p:cNvPr id="5" name="Retângulo 4"/>
+          <p:cNvSpPr/>
+          <p:nvPr/>
+        </p:nvSpPr>
+        <p:spPr>
+          <a:xfrm>
+            <a:off x="1791238" y="2329933"/>
+            <a:ext cx="4042891" cy="2923877"/>
+          </a:xfrm>
+          <a:prstGeom prst="rect">
+            <a:avLst/>
+          </a:prstGeom>
+        </p:spPr>
+        <p:txBody>
+          <a:bodyPr wrap="square">
+            <a:spAutoFit/>
+          </a:bodyPr>
+          <a:lstStyle/>
+          <a:p>
+            <a:pPr marL="285750" indent="-285750">
+              <a:buFont typeface="Wingdings" panose="05000000000000000000" pitchFamily="2" charset="2"/>
+              <a:buChar char="ü"/>
+            </a:pPr>
+            <a:r>
+              <a:rPr lang="pt-BR" sz="2800" dirty="0" smtClean="0">
+                <a:latin typeface="Bariol Bold" panose="02000506040000020003"/>
+              </a:rPr>
+              <a:t> Conexão das máquinas </a:t>
+            </a:r>
+            <a:r>
+              <a:rPr lang="pt-BR" dirty="0" smtClean="0">
+                <a:latin typeface="Bariol Bold" panose="02000506040000020003"/>
+              </a:rPr>
+              <a:t>;</a:t>
+            </a:r>
+          </a:p>
+          <a:p>
+            <a:endParaRPr lang="pt-BR" dirty="0" smtClean="0">
+              <a:latin typeface="Bariol Bold" panose="02000506040000020003"/>
+            </a:endParaRPr>
+          </a:p>
+          <a:p>
+            <a:pPr marL="285750" indent="-285750">
+              <a:buFont typeface="Wingdings" panose="05000000000000000000" pitchFamily="2" charset="2"/>
+              <a:buChar char="ü"/>
+            </a:pPr>
+            <a:r>
+              <a:rPr lang="pt-BR" sz="2800" dirty="0" smtClean="0">
+                <a:latin typeface="Bariol Bold" panose="02000506040000020003"/>
+              </a:rPr>
+              <a:t> Processos indevidos;</a:t>
+            </a:r>
+          </a:p>
+          <a:p>
+            <a:pPr marL="285750" indent="-285750">
+              <a:buFont typeface="Wingdings" panose="05000000000000000000" pitchFamily="2" charset="2"/>
+              <a:buChar char="ü"/>
+            </a:pPr>
+            <a:endParaRPr lang="pt-BR" sz="2800" dirty="0">
+              <a:latin typeface="Bariol Bold" panose="02000506040000020003"/>
+            </a:endParaRPr>
+          </a:p>
+          <a:p>
+            <a:pPr marL="285750" indent="-285750">
+              <a:buFont typeface="Wingdings" panose="05000000000000000000" pitchFamily="2" charset="2"/>
+              <a:buChar char="ü"/>
+            </a:pPr>
+            <a:r>
+              <a:rPr lang="pt-BR" sz="2800" dirty="0" smtClean="0">
+                <a:latin typeface="Bariol Bold" panose="02000506040000020003"/>
+              </a:rPr>
+              <a:t> Envio de mensagens;</a:t>
+            </a:r>
+            <a:endParaRPr lang="pt-BR" sz="2800" dirty="0">
+              <a:latin typeface="Bariol Bold" panose="02000506040000020003"/>
+            </a:endParaRPr>
+          </a:p>
+          <a:p>
+            <a:pPr marL="285750" indent="-285750">
+              <a:buFont typeface="Wingdings" panose="05000000000000000000" pitchFamily="2" charset="2"/>
+              <a:buChar char="ü"/>
+            </a:pPr>
+            <a:endParaRPr lang="pt-BR" dirty="0">
+              <a:latin typeface="Bariol Bold" panose="02000506040000020003"/>
+            </a:endParaRPr>
+          </a:p>
+          <a:p>
+            <a:pPr marL="285750" indent="-285750">
+              <a:buFont typeface="Wingdings" panose="05000000000000000000" pitchFamily="2" charset="2"/>
+              <a:buChar char="ü"/>
+            </a:pPr>
+            <a:endParaRPr lang="pt-BR" dirty="0" smtClean="0">
+              <a:latin typeface="Bariol Bold" panose="02000506040000020003"/>
+            </a:endParaRPr>
+          </a:p>
+          <a:p>
+            <a:pPr marL="285750" indent="-285750">
+              <a:buFont typeface="Wingdings" panose="05000000000000000000" pitchFamily="2" charset="2"/>
+              <a:buChar char="ü"/>
+            </a:pPr>
+            <a:endParaRPr lang="pt-BR" dirty="0">
+              <a:latin typeface="Bariol Bold" panose="02000506040000020003"/>
+            </a:endParaRPr>
+          </a:p>
+        </p:txBody>
+      </p:sp>
     </p:spTree>
     <p:extLst>
       <p:ext uri="{BB962C8B-B14F-4D97-AF65-F5344CB8AC3E}">
@@ -11164,7 +11272,7 @@
           <p:cNvPr id="7" name="Título 1">
             <a:extLst>
               <a:ext uri="{FF2B5EF4-FFF2-40B4-BE49-F238E27FC236}">
-                <a16:creationId xmlns="" xmlns:a16="http://schemas.microsoft.com/office/drawing/2014/main" id="{99F76FBE-1BC2-4EE6-B90A-22263BF7BDCD}"/>
+                <a16:creationId xmlns:a16="http://schemas.microsoft.com/office/drawing/2014/main" xmlns="" id="{99F76FBE-1BC2-4EE6-B90A-22263BF7BDCD}"/>
               </a:ext>
             </a:extLst>
           </p:cNvPr>
@@ -11227,7 +11335,7 @@
           <p:cNvPr id="2" name="Straight Arrow Connector 1">
             <a:extLst>
               <a:ext uri="{FF2B5EF4-FFF2-40B4-BE49-F238E27FC236}">
-                <a16:creationId xmlns="" xmlns:a16="http://schemas.microsoft.com/office/drawing/2014/main" id="{8BC350D6-EEE4-4369-B0B7-E605D1C2FDBA}"/>
+                <a16:creationId xmlns:a16="http://schemas.microsoft.com/office/drawing/2014/main" xmlns="" id="{8BC350D6-EEE4-4369-B0B7-E605D1C2FDBA}"/>
               </a:ext>
             </a:extLst>
           </p:cNvPr>
@@ -11270,7 +11378,7 @@
           <p:cNvPr id="5" name="Imagem 4">
             <a:extLst>
               <a:ext uri="{FF2B5EF4-FFF2-40B4-BE49-F238E27FC236}">
-                <a16:creationId xmlns="" xmlns:a16="http://schemas.microsoft.com/office/drawing/2014/main" id="{F92141F6-050D-4FB0-8986-4F5D8D4F96B3}"/>
+                <a16:creationId xmlns:a16="http://schemas.microsoft.com/office/drawing/2014/main" xmlns="" id="{F92141F6-050D-4FB0-8986-4F5D8D4F96B3}"/>
               </a:ext>
             </a:extLst>
           </p:cNvPr>
@@ -11306,7 +11414,7 @@
           <p:cNvPr id="4" name="Picture 2">
             <a:extLst>
               <a:ext uri="{FF2B5EF4-FFF2-40B4-BE49-F238E27FC236}">
-                <a16:creationId xmlns="" xmlns:a16="http://schemas.microsoft.com/office/drawing/2014/main" id="{EF083EFE-E484-4847-A645-55EC0AADCCE5}"/>
+                <a16:creationId xmlns:a16="http://schemas.microsoft.com/office/drawing/2014/main" xmlns="" id="{EF083EFE-E484-4847-A645-55EC0AADCCE5}"/>
               </a:ext>
             </a:extLst>
           </p:cNvPr>
@@ -11589,7 +11697,7 @@
           <p:cNvPr id="7" name="Título 1">
             <a:extLst>
               <a:ext uri="{FF2B5EF4-FFF2-40B4-BE49-F238E27FC236}">
-                <a16:creationId xmlns="" xmlns:a16="http://schemas.microsoft.com/office/drawing/2014/main" id="{99F76FBE-1BC2-4EE6-B90A-22263BF7BDCD}"/>
+                <a16:creationId xmlns:a16="http://schemas.microsoft.com/office/drawing/2014/main" xmlns="" id="{99F76FBE-1BC2-4EE6-B90A-22263BF7BDCD}"/>
               </a:ext>
             </a:extLst>
           </p:cNvPr>
@@ -11652,7 +11760,7 @@
           <p:cNvPr id="2" name="Straight Arrow Connector 1">
             <a:extLst>
               <a:ext uri="{FF2B5EF4-FFF2-40B4-BE49-F238E27FC236}">
-                <a16:creationId xmlns="" xmlns:a16="http://schemas.microsoft.com/office/drawing/2014/main" id="{8BC350D6-EEE4-4369-B0B7-E605D1C2FDBA}"/>
+                <a16:creationId xmlns:a16="http://schemas.microsoft.com/office/drawing/2014/main" xmlns="" id="{8BC350D6-EEE4-4369-B0B7-E605D1C2FDBA}"/>
               </a:ext>
             </a:extLst>
           </p:cNvPr>
@@ -11695,7 +11803,7 @@
           <p:cNvPr id="10" name="Imagem 9">
             <a:extLst>
               <a:ext uri="{FF2B5EF4-FFF2-40B4-BE49-F238E27FC236}">
-                <a16:creationId xmlns="" xmlns:a16="http://schemas.microsoft.com/office/drawing/2014/main" id="{65541928-1DD4-46FE-BA17-DB29347D81C5}"/>
+                <a16:creationId xmlns:a16="http://schemas.microsoft.com/office/drawing/2014/main" xmlns="" id="{65541928-1DD4-46FE-BA17-DB29347D81C5}"/>
               </a:ext>
             </a:extLst>
           </p:cNvPr>
@@ -11731,7 +11839,7 @@
           <p:cNvPr id="4" name="Picture 2">
             <a:extLst>
               <a:ext uri="{FF2B5EF4-FFF2-40B4-BE49-F238E27FC236}">
-                <a16:creationId xmlns="" xmlns:a16="http://schemas.microsoft.com/office/drawing/2014/main" id="{EF083EFE-E484-4847-A645-55EC0AADCCE5}"/>
+                <a16:creationId xmlns:a16="http://schemas.microsoft.com/office/drawing/2014/main" xmlns="" id="{EF083EFE-E484-4847-A645-55EC0AADCCE5}"/>
               </a:ext>
             </a:extLst>
           </p:cNvPr>
@@ -12014,7 +12122,7 @@
           <p:cNvPr id="7" name="Título 1">
             <a:extLst>
               <a:ext uri="{FF2B5EF4-FFF2-40B4-BE49-F238E27FC236}">
-                <a16:creationId xmlns="" xmlns:a16="http://schemas.microsoft.com/office/drawing/2014/main" id="{99F76FBE-1BC2-4EE6-B90A-22263BF7BDCD}"/>
+                <a16:creationId xmlns:a16="http://schemas.microsoft.com/office/drawing/2014/main" xmlns="" id="{99F76FBE-1BC2-4EE6-B90A-22263BF7BDCD}"/>
               </a:ext>
             </a:extLst>
           </p:cNvPr>
@@ -12077,7 +12185,7 @@
           <p:cNvPr id="5" name="Picture 2">
             <a:extLst>
               <a:ext uri="{FF2B5EF4-FFF2-40B4-BE49-F238E27FC236}">
-                <a16:creationId xmlns="" xmlns:a16="http://schemas.microsoft.com/office/drawing/2014/main" id="{5E6A065D-74B6-43C9-8951-4759FD99C85F}"/>
+                <a16:creationId xmlns:a16="http://schemas.microsoft.com/office/drawing/2014/main" xmlns="" id="{5E6A065D-74B6-43C9-8951-4759FD99C85F}"/>
               </a:ext>
             </a:extLst>
           </p:cNvPr>
@@ -12124,7 +12232,7 @@
           <p:cNvPr id="2" name="Straight Arrow Connector 1">
             <a:extLst>
               <a:ext uri="{FF2B5EF4-FFF2-40B4-BE49-F238E27FC236}">
-                <a16:creationId xmlns="" xmlns:a16="http://schemas.microsoft.com/office/drawing/2014/main" id="{102C7A15-5BE4-4E8E-826E-06C7E84CB27C}"/>
+                <a16:creationId xmlns:a16="http://schemas.microsoft.com/office/drawing/2014/main" xmlns="" id="{102C7A15-5BE4-4E8E-826E-06C7E84CB27C}"/>
               </a:ext>
             </a:extLst>
           </p:cNvPr>
@@ -12167,7 +12275,7 @@
           <p:cNvPr id="12" name="Imagem 11">
             <a:extLst>
               <a:ext uri="{FF2B5EF4-FFF2-40B4-BE49-F238E27FC236}">
-                <a16:creationId xmlns="" xmlns:a16="http://schemas.microsoft.com/office/drawing/2014/main" id="{A01150A3-5332-4792-A493-1C43638FC9F6}"/>
+                <a16:creationId xmlns:a16="http://schemas.microsoft.com/office/drawing/2014/main" xmlns="" id="{A01150A3-5332-4792-A493-1C43638FC9F6}"/>
               </a:ext>
             </a:extLst>
           </p:cNvPr>

</xml_diff>